<commit_message>
various fixes, added architecture diagram, slow day...
</commit_message>
<xml_diff>
--- a/docs/vldb15/figures/figs.pptx
+++ b/docs/vldb15/figures/figs.pptx
@@ -7,6 +7,7 @@
   <p:sldIdLst>
     <p:sldId id="256" r:id="rId2"/>
     <p:sldId id="257" r:id="rId3"/>
+    <p:sldId id="258" r:id="rId4"/>
   </p:sldIdLst>
   <p:sldSz cx="9144000" cy="6858000" type="screen4x3"/>
   <p:notesSz cx="6858000" cy="9144000"/>
@@ -289,7 +290,7 @@
           <a:p>
             <a:fld id="{E53DFF73-D480-144E-A535-5E58F29F2980}" type="datetimeFigureOut">
               <a:rPr lang="en-US" smtClean="0"/>
-              <a:t>1/26/15</a:t>
+              <a:t>2/23/15</a:t>
             </a:fld>
             <a:endParaRPr lang="en-US"/>
           </a:p>
@@ -459,7 +460,7 @@
           <a:p>
             <a:fld id="{E53DFF73-D480-144E-A535-5E58F29F2980}" type="datetimeFigureOut">
               <a:rPr lang="en-US" smtClean="0"/>
-              <a:t>1/26/15</a:t>
+              <a:t>2/23/15</a:t>
             </a:fld>
             <a:endParaRPr lang="en-US"/>
           </a:p>
@@ -639,7 +640,7 @@
           <a:p>
             <a:fld id="{E53DFF73-D480-144E-A535-5E58F29F2980}" type="datetimeFigureOut">
               <a:rPr lang="en-US" smtClean="0"/>
-              <a:t>1/26/15</a:t>
+              <a:t>2/23/15</a:t>
             </a:fld>
             <a:endParaRPr lang="en-US"/>
           </a:p>
@@ -809,7 +810,7 @@
           <a:p>
             <a:fld id="{E53DFF73-D480-144E-A535-5E58F29F2980}" type="datetimeFigureOut">
               <a:rPr lang="en-US" smtClean="0"/>
-              <a:t>1/26/15</a:t>
+              <a:t>2/23/15</a:t>
             </a:fld>
             <a:endParaRPr lang="en-US"/>
           </a:p>
@@ -1055,7 +1056,7 @@
           <a:p>
             <a:fld id="{E53DFF73-D480-144E-A535-5E58F29F2980}" type="datetimeFigureOut">
               <a:rPr lang="en-US" smtClean="0"/>
-              <a:t>1/26/15</a:t>
+              <a:t>2/23/15</a:t>
             </a:fld>
             <a:endParaRPr lang="en-US"/>
           </a:p>
@@ -1343,7 +1344,7 @@
           <a:p>
             <a:fld id="{E53DFF73-D480-144E-A535-5E58F29F2980}" type="datetimeFigureOut">
               <a:rPr lang="en-US" smtClean="0"/>
-              <a:t>1/26/15</a:t>
+              <a:t>2/23/15</a:t>
             </a:fld>
             <a:endParaRPr lang="en-US"/>
           </a:p>
@@ -1765,7 +1766,7 @@
           <a:p>
             <a:fld id="{E53DFF73-D480-144E-A535-5E58F29F2980}" type="datetimeFigureOut">
               <a:rPr lang="en-US" smtClean="0"/>
-              <a:t>1/26/15</a:t>
+              <a:t>2/23/15</a:t>
             </a:fld>
             <a:endParaRPr lang="en-US"/>
           </a:p>
@@ -1883,7 +1884,7 @@
           <a:p>
             <a:fld id="{E53DFF73-D480-144E-A535-5E58F29F2980}" type="datetimeFigureOut">
               <a:rPr lang="en-US" smtClean="0"/>
-              <a:t>1/26/15</a:t>
+              <a:t>2/23/15</a:t>
             </a:fld>
             <a:endParaRPr lang="en-US"/>
           </a:p>
@@ -1978,7 +1979,7 @@
           <a:p>
             <a:fld id="{E53DFF73-D480-144E-A535-5E58F29F2980}" type="datetimeFigureOut">
               <a:rPr lang="en-US" smtClean="0"/>
-              <a:t>1/26/15</a:t>
+              <a:t>2/23/15</a:t>
             </a:fld>
             <a:endParaRPr lang="en-US"/>
           </a:p>
@@ -2255,7 +2256,7 @@
           <a:p>
             <a:fld id="{E53DFF73-D480-144E-A535-5E58F29F2980}" type="datetimeFigureOut">
               <a:rPr lang="en-US" smtClean="0"/>
-              <a:t>1/26/15</a:t>
+              <a:t>2/23/15</a:t>
             </a:fld>
             <a:endParaRPr lang="en-US"/>
           </a:p>
@@ -2508,7 +2509,7 @@
           <a:p>
             <a:fld id="{E53DFF73-D480-144E-A535-5E58F29F2980}" type="datetimeFigureOut">
               <a:rPr lang="en-US" smtClean="0"/>
-              <a:t>1/26/15</a:t>
+              <a:t>2/23/15</a:t>
             </a:fld>
             <a:endParaRPr lang="en-US"/>
           </a:p>
@@ -2721,7 +2722,7 @@
           <a:p>
             <a:fld id="{E53DFF73-D480-144E-A535-5E58F29F2980}" type="datetimeFigureOut">
               <a:rPr lang="en-US" smtClean="0"/>
-              <a:t>1/26/15</a:t>
+              <a:t>2/23/15</a:t>
             </a:fld>
             <a:endParaRPr lang="en-US"/>
           </a:p>
@@ -4281,6 +4282,2389 @@
       </p:par>
     </p:tnLst>
   </p:timing>
+</p:sld>
+</file>
+
+<file path=ppt/slides/slide3.xml><?xml version="1.0" encoding="utf-8"?>
+<p:sld xmlns:a="http://schemas.openxmlformats.org/drawingml/2006/main" xmlns:r="http://schemas.openxmlformats.org/officeDocument/2006/relationships" xmlns:p="http://schemas.openxmlformats.org/presentationml/2006/main">
+  <p:cSld>
+    <p:spTree>
+      <p:nvGrpSpPr>
+        <p:cNvPr id="1" name=""/>
+        <p:cNvGrpSpPr/>
+        <p:nvPr/>
+      </p:nvGrpSpPr>
+      <p:grpSpPr>
+        <a:xfrm>
+          <a:off x="0" y="0"/>
+          <a:ext cx="0" cy="0"/>
+          <a:chOff x="0" y="0"/>
+          <a:chExt cx="0" cy="0"/>
+        </a:xfrm>
+      </p:grpSpPr>
+      <p:sp>
+        <p:nvSpPr>
+          <p:cNvPr id="52" name="Down Arrow 51"/>
+          <p:cNvSpPr/>
+          <p:nvPr/>
+        </p:nvSpPr>
+        <p:spPr>
+          <a:xfrm rot="10800000">
+            <a:off x="6067867" y="1481419"/>
+            <a:ext cx="1914120" cy="957293"/>
+          </a:xfrm>
+          <a:prstGeom prst="downArrow">
+            <a:avLst>
+              <a:gd name="adj1" fmla="val 63385"/>
+              <a:gd name="adj2" fmla="val 50000"/>
+            </a:avLst>
+          </a:prstGeom>
+          <a:solidFill>
+            <a:srgbClr val="FFFFFF"/>
+          </a:solidFill>
+          <a:ln>
+            <a:solidFill>
+              <a:srgbClr val="595959"/>
+            </a:solidFill>
+            <a:prstDash val="solid"/>
+          </a:ln>
+          <a:effectLst/>
+        </p:spPr>
+        <p:style>
+          <a:lnRef idx="1">
+            <a:schemeClr val="accent1"/>
+          </a:lnRef>
+          <a:fillRef idx="3">
+            <a:schemeClr val="accent1"/>
+          </a:fillRef>
+          <a:effectRef idx="2">
+            <a:schemeClr val="accent1"/>
+          </a:effectRef>
+          <a:fontRef idx="minor">
+            <a:schemeClr val="lt1"/>
+          </a:fontRef>
+        </p:style>
+        <p:txBody>
+          <a:bodyPr rtlCol="0" anchor="ctr"/>
+          <a:lstStyle/>
+          <a:p>
+            <a:pPr algn="ctr"/>
+            <a:endParaRPr lang="en-US"/>
+          </a:p>
+        </p:txBody>
+      </p:sp>
+      <p:sp>
+        <p:nvSpPr>
+          <p:cNvPr id="50" name="Rounded Rectangle 49"/>
+          <p:cNvSpPr/>
+          <p:nvPr/>
+        </p:nvSpPr>
+        <p:spPr>
+          <a:xfrm>
+            <a:off x="3067530" y="2413169"/>
+            <a:ext cx="5063801" cy="3305206"/>
+          </a:xfrm>
+          <a:custGeom>
+            <a:avLst/>
+            <a:gdLst/>
+            <a:ahLst/>
+            <a:cxnLst/>
+            <a:rect l="l" t="t" r="r" b="b"/>
+            <a:pathLst>
+              <a:path w="5137259" h="3305206">
+                <a:moveTo>
+                  <a:pt x="3088825" y="0"/>
+                </a:moveTo>
+                <a:lnTo>
+                  <a:pt x="4924404" y="0"/>
+                </a:lnTo>
+                <a:cubicBezTo>
+                  <a:pt x="5041961" y="0"/>
+                  <a:pt x="5137259" y="95298"/>
+                  <a:pt x="5137259" y="212855"/>
+                </a:cubicBezTo>
+                <a:lnTo>
+                  <a:pt x="5137259" y="754941"/>
+                </a:lnTo>
+                <a:lnTo>
+                  <a:pt x="5137259" y="2602411"/>
+                </a:lnTo>
+                <a:lnTo>
+                  <a:pt x="5137259" y="3040205"/>
+                </a:lnTo>
+                <a:cubicBezTo>
+                  <a:pt x="5137259" y="3186561"/>
+                  <a:pt x="5018614" y="3305206"/>
+                  <a:pt x="4872258" y="3305206"/>
+                </a:cubicBezTo>
+                <a:lnTo>
+                  <a:pt x="265001" y="3305206"/>
+                </a:lnTo>
+                <a:cubicBezTo>
+                  <a:pt x="118645" y="3305206"/>
+                  <a:pt x="0" y="3186561"/>
+                  <a:pt x="0" y="3040205"/>
+                </a:cubicBezTo>
+                <a:lnTo>
+                  <a:pt x="0" y="754941"/>
+                </a:lnTo>
+                <a:cubicBezTo>
+                  <a:pt x="0" y="608585"/>
+                  <a:pt x="118645" y="489940"/>
+                  <a:pt x="265001" y="489940"/>
+                </a:cubicBezTo>
+                <a:lnTo>
+                  <a:pt x="2875970" y="489940"/>
+                </a:lnTo>
+                <a:lnTo>
+                  <a:pt x="2875970" y="212855"/>
+                </a:lnTo>
+                <a:cubicBezTo>
+                  <a:pt x="2875970" y="95298"/>
+                  <a:pt x="2971268" y="0"/>
+                  <a:pt x="3088825" y="0"/>
+                </a:cubicBezTo>
+                <a:close/>
+              </a:path>
+            </a:pathLst>
+          </a:custGeom>
+          <a:solidFill>
+            <a:srgbClr val="FFFFFF"/>
+          </a:solidFill>
+          <a:ln>
+            <a:solidFill>
+              <a:srgbClr val="595959"/>
+            </a:solidFill>
+            <a:prstDash val="sysDash"/>
+          </a:ln>
+          <a:effectLst/>
+        </p:spPr>
+        <p:style>
+          <a:lnRef idx="1">
+            <a:schemeClr val="accent1"/>
+          </a:lnRef>
+          <a:fillRef idx="3">
+            <a:schemeClr val="accent1"/>
+          </a:fillRef>
+          <a:effectRef idx="2">
+            <a:schemeClr val="accent1"/>
+          </a:effectRef>
+          <a:fontRef idx="minor">
+            <a:schemeClr val="lt1"/>
+          </a:fontRef>
+        </p:style>
+        <p:txBody>
+          <a:bodyPr rtlCol="0" anchor="ctr"/>
+          <a:lstStyle/>
+          <a:p>
+            <a:pPr algn="ctr"/>
+            <a:endParaRPr lang="en-US"/>
+          </a:p>
+        </p:txBody>
+      </p:sp>
+      <p:sp>
+        <p:nvSpPr>
+          <p:cNvPr id="54" name="Rounded Rectangle 53"/>
+          <p:cNvSpPr/>
+          <p:nvPr/>
+        </p:nvSpPr>
+        <p:spPr>
+          <a:xfrm>
+            <a:off x="5637209" y="2955192"/>
+            <a:ext cx="2429185" cy="2673836"/>
+          </a:xfrm>
+          <a:custGeom>
+            <a:avLst/>
+            <a:gdLst/>
+            <a:ahLst/>
+            <a:cxnLst/>
+            <a:rect l="l" t="t" r="r" b="b"/>
+            <a:pathLst>
+              <a:path w="2429185" h="2673836">
+                <a:moveTo>
+                  <a:pt x="1027397" y="0"/>
+                </a:moveTo>
+                <a:lnTo>
+                  <a:pt x="2319171" y="0"/>
+                </a:lnTo>
+                <a:cubicBezTo>
+                  <a:pt x="2379930" y="0"/>
+                  <a:pt x="2429185" y="49255"/>
+                  <a:pt x="2429185" y="110014"/>
+                </a:cubicBezTo>
+                <a:lnTo>
+                  <a:pt x="2429185" y="625549"/>
+                </a:lnTo>
+                <a:lnTo>
+                  <a:pt x="2429185" y="1493214"/>
+                </a:lnTo>
+                <a:lnTo>
+                  <a:pt x="2429185" y="2513084"/>
+                </a:lnTo>
+                <a:cubicBezTo>
+                  <a:pt x="2429185" y="2601865"/>
+                  <a:pt x="2357214" y="2673836"/>
+                  <a:pt x="2268433" y="2673836"/>
+                </a:cubicBezTo>
+                <a:lnTo>
+                  <a:pt x="160752" y="2673836"/>
+                </a:lnTo>
+                <a:cubicBezTo>
+                  <a:pt x="71971" y="2673836"/>
+                  <a:pt x="0" y="2601865"/>
+                  <a:pt x="0" y="2513084"/>
+                </a:cubicBezTo>
+                <a:lnTo>
+                  <a:pt x="0" y="625549"/>
+                </a:lnTo>
+                <a:cubicBezTo>
+                  <a:pt x="0" y="536768"/>
+                  <a:pt x="71971" y="464797"/>
+                  <a:pt x="160752" y="464797"/>
+                </a:cubicBezTo>
+                <a:lnTo>
+                  <a:pt x="917383" y="464797"/>
+                </a:lnTo>
+                <a:lnTo>
+                  <a:pt x="917383" y="110014"/>
+                </a:lnTo>
+                <a:cubicBezTo>
+                  <a:pt x="917383" y="49255"/>
+                  <a:pt x="966638" y="0"/>
+                  <a:pt x="1027397" y="0"/>
+                </a:cubicBezTo>
+                <a:close/>
+              </a:path>
+            </a:pathLst>
+          </a:custGeom>
+          <a:solidFill>
+            <a:schemeClr val="bg1">
+              <a:lumMod val="95000"/>
+            </a:schemeClr>
+          </a:solidFill>
+          <a:ln>
+            <a:solidFill>
+              <a:srgbClr val="595959"/>
+            </a:solidFill>
+            <a:prstDash val="sysDash"/>
+          </a:ln>
+          <a:effectLst/>
+        </p:spPr>
+        <p:style>
+          <a:lnRef idx="1">
+            <a:schemeClr val="accent1"/>
+          </a:lnRef>
+          <a:fillRef idx="3">
+            <a:schemeClr val="accent1"/>
+          </a:fillRef>
+          <a:effectRef idx="2">
+            <a:schemeClr val="accent1"/>
+          </a:effectRef>
+          <a:fontRef idx="minor">
+            <a:schemeClr val="lt1"/>
+          </a:fontRef>
+        </p:style>
+        <p:txBody>
+          <a:bodyPr rtlCol="0" anchor="ctr"/>
+          <a:lstStyle/>
+          <a:p>
+            <a:pPr algn="ctr"/>
+            <a:endParaRPr lang="en-US"/>
+          </a:p>
+        </p:txBody>
+      </p:sp>
+      <p:sp>
+        <p:nvSpPr>
+          <p:cNvPr id="39" name="Down Arrow 38"/>
+          <p:cNvSpPr/>
+          <p:nvPr/>
+        </p:nvSpPr>
+        <p:spPr>
+          <a:xfrm rot="16200000">
+            <a:off x="1826597" y="4281472"/>
+            <a:ext cx="1914120" cy="957293"/>
+          </a:xfrm>
+          <a:prstGeom prst="downArrow">
+            <a:avLst>
+              <a:gd name="adj1" fmla="val 63385"/>
+              <a:gd name="adj2" fmla="val 50000"/>
+            </a:avLst>
+          </a:prstGeom>
+          <a:solidFill>
+            <a:srgbClr val="FFFFFF"/>
+          </a:solidFill>
+          <a:ln>
+            <a:solidFill>
+              <a:srgbClr val="595959"/>
+            </a:solidFill>
+            <a:prstDash val="solid"/>
+          </a:ln>
+          <a:effectLst/>
+        </p:spPr>
+        <p:style>
+          <a:lnRef idx="1">
+            <a:schemeClr val="accent1"/>
+          </a:lnRef>
+          <a:fillRef idx="3">
+            <a:schemeClr val="accent1"/>
+          </a:fillRef>
+          <a:effectRef idx="2">
+            <a:schemeClr val="accent1"/>
+          </a:effectRef>
+          <a:fontRef idx="minor">
+            <a:schemeClr val="lt1"/>
+          </a:fontRef>
+        </p:style>
+        <p:txBody>
+          <a:bodyPr rtlCol="0" anchor="ctr"/>
+          <a:lstStyle/>
+          <a:p>
+            <a:pPr algn="ctr"/>
+            <a:endParaRPr lang="en-US"/>
+          </a:p>
+        </p:txBody>
+      </p:sp>
+      <p:sp>
+        <p:nvSpPr>
+          <p:cNvPr id="38" name="Down Arrow 37"/>
+          <p:cNvSpPr/>
+          <p:nvPr/>
+        </p:nvSpPr>
+        <p:spPr>
+          <a:xfrm>
+            <a:off x="3039846" y="2164508"/>
+            <a:ext cx="2405245" cy="946530"/>
+          </a:xfrm>
+          <a:prstGeom prst="downArrow">
+            <a:avLst>
+              <a:gd name="adj1" fmla="val 63385"/>
+              <a:gd name="adj2" fmla="val 50000"/>
+            </a:avLst>
+          </a:prstGeom>
+          <a:solidFill>
+            <a:schemeClr val="bg1"/>
+          </a:solidFill>
+          <a:ln>
+            <a:solidFill>
+              <a:srgbClr val="595959"/>
+            </a:solidFill>
+            <a:prstDash val="solid"/>
+          </a:ln>
+          <a:effectLst/>
+        </p:spPr>
+        <p:style>
+          <a:lnRef idx="1">
+            <a:schemeClr val="accent1"/>
+          </a:lnRef>
+          <a:fillRef idx="3">
+            <a:schemeClr val="accent1"/>
+          </a:fillRef>
+          <a:effectRef idx="2">
+            <a:schemeClr val="accent1"/>
+          </a:effectRef>
+          <a:fontRef idx="minor">
+            <a:schemeClr val="lt1"/>
+          </a:fontRef>
+        </p:style>
+        <p:txBody>
+          <a:bodyPr rtlCol="0" anchor="ctr"/>
+          <a:lstStyle/>
+          <a:p>
+            <a:pPr algn="ctr"/>
+            <a:endParaRPr lang="en-US"/>
+          </a:p>
+        </p:txBody>
+      </p:sp>
+      <p:sp>
+        <p:nvSpPr>
+          <p:cNvPr id="5" name="Folded Corner 4"/>
+          <p:cNvSpPr/>
+          <p:nvPr/>
+        </p:nvSpPr>
+        <p:spPr>
+          <a:xfrm>
+            <a:off x="891367" y="3207045"/>
+            <a:ext cx="1438083" cy="2511330"/>
+          </a:xfrm>
+          <a:prstGeom prst="foldedCorner">
+            <a:avLst/>
+          </a:prstGeom>
+          <a:solidFill>
+            <a:schemeClr val="bg1"/>
+          </a:solidFill>
+          <a:ln>
+            <a:solidFill>
+              <a:schemeClr val="tx1">
+                <a:lumMod val="65000"/>
+                <a:lumOff val="35000"/>
+              </a:schemeClr>
+            </a:solidFill>
+          </a:ln>
+        </p:spPr>
+        <p:style>
+          <a:lnRef idx="1">
+            <a:schemeClr val="accent1"/>
+          </a:lnRef>
+          <a:fillRef idx="3">
+            <a:schemeClr val="accent1"/>
+          </a:fillRef>
+          <a:effectRef idx="2">
+            <a:schemeClr val="accent1"/>
+          </a:effectRef>
+          <a:fontRef idx="minor">
+            <a:schemeClr val="lt1"/>
+          </a:fontRef>
+        </p:style>
+        <p:txBody>
+          <a:bodyPr rtlCol="0" anchor="ctr"/>
+          <a:lstStyle/>
+          <a:p>
+            <a:pPr algn="ctr"/>
+            <a:endParaRPr lang="en-US"/>
+          </a:p>
+        </p:txBody>
+      </p:sp>
+      <p:sp>
+        <p:nvSpPr>
+          <p:cNvPr id="4" name="TextBox 3"/>
+          <p:cNvSpPr txBox="1"/>
+          <p:nvPr/>
+        </p:nvSpPr>
+        <p:spPr>
+          <a:xfrm>
+            <a:off x="891367" y="3635689"/>
+            <a:ext cx="1484152" cy="1977464"/>
+          </a:xfrm>
+          <a:prstGeom prst="rect">
+            <a:avLst/>
+          </a:prstGeom>
+          <a:noFill/>
+        </p:spPr>
+        <p:txBody>
+          <a:bodyPr wrap="square" rtlCol="0">
+            <a:spAutoFit/>
+          </a:bodyPr>
+          <a:lstStyle/>
+          <a:p>
+            <a:r>
+              <a:rPr lang="en-US" sz="350" dirty="0" smtClean="0">
+                <a:solidFill>
+                  <a:schemeClr val="tx1">
+                    <a:lumMod val="65000"/>
+                    <a:lumOff val="35000"/>
+                  </a:schemeClr>
+                </a:solidFill>
+                <a:latin typeface="Courier"/>
+                <a:cs typeface="Courier"/>
+              </a:rPr>
+              <a:t>UPDATE CUSTOMER SET C_BALANCE = C_BALANCE + ? WHERE C_ID = ? AND C_D_ID = ? AND C_W_ID = ? UPDATE CUSTOMER SET C_BALANCE = ?, C_YTD_PAYMENT = ?, C_PAYMENT_CNT = ?, C_DATA = ? WHERE C_W_ID = ? AND C_D_ID = ? AND C_ID = ?</a:t>
+            </a:r>
+          </a:p>
+          <a:p>
+            <a:r>
+              <a:rPr lang="en-US" sz="350" dirty="0" smtClean="0">
+                <a:solidFill>
+                  <a:schemeClr val="tx1">
+                    <a:lumMod val="65000"/>
+                    <a:lumOff val="35000"/>
+                  </a:schemeClr>
+                </a:solidFill>
+                <a:latin typeface="Courier"/>
+                <a:cs typeface="Courier"/>
+              </a:rPr>
+              <a:t>UPDATE WAREHOUSE SET W_YTD = W_YTD + ? WHERE W_ID = ? </a:t>
+            </a:r>
+          </a:p>
+          <a:p>
+            <a:r>
+              <a:rPr lang="en-US" sz="350" dirty="0" smtClean="0">
+                <a:solidFill>
+                  <a:schemeClr val="tx1">
+                    <a:lumMod val="65000"/>
+                    <a:lumOff val="35000"/>
+                  </a:schemeClr>
+                </a:solidFill>
+                <a:latin typeface="Courier"/>
+                <a:cs typeface="Courier"/>
+              </a:rPr>
+              <a:t>UPDATE ORDERS SET O_CARRIER_ID = ? WHERE O_ID = ? AND O_D_ID = ? AND O_W_ID = ?</a:t>
+            </a:r>
+          </a:p>
+          <a:p>
+            <a:r>
+              <a:rPr lang="en-US" sz="350" dirty="0" smtClean="0">
+                <a:solidFill>
+                  <a:schemeClr val="tx1">
+                    <a:lumMod val="65000"/>
+                    <a:lumOff val="35000"/>
+                  </a:schemeClr>
+                </a:solidFill>
+                <a:latin typeface="Courier"/>
+                <a:cs typeface="Courier"/>
+              </a:rPr>
+              <a:t>UPDATE CUSTOMER SET C_BALANCE = ?, C_YTD_PAYMENT = ?, C_PAYMENT_CNT = ? WHERE C_W_ID = ? AND C_D_ID = ? AND C_ID = ?</a:t>
+            </a:r>
+          </a:p>
+          <a:p>
+            <a:r>
+              <a:rPr lang="en-US" sz="350" dirty="0" smtClean="0">
+                <a:solidFill>
+                  <a:schemeClr val="tx1">
+                    <a:lumMod val="65000"/>
+                    <a:lumOff val="35000"/>
+                  </a:schemeClr>
+                </a:solidFill>
+                <a:latin typeface="Courier"/>
+                <a:cs typeface="Courier"/>
+              </a:rPr>
+              <a:t>INSERT INTO NEW_ORDER (NO_O_ID, NO_D_ID, NO_W_ID) VALUES (?, ?, ?)</a:t>
+            </a:r>
+          </a:p>
+          <a:p>
+            <a:r>
+              <a:rPr lang="en-US" sz="350" dirty="0" smtClean="0">
+                <a:solidFill>
+                  <a:schemeClr val="tx1">
+                    <a:lumMod val="65000"/>
+                    <a:lumOff val="35000"/>
+                  </a:schemeClr>
+                </a:solidFill>
+                <a:latin typeface="Courier"/>
+                <a:cs typeface="Courier"/>
+              </a:rPr>
+              <a:t>UPDATE STOCK SET S_QUANTITY = ?, S_YTD = ?, S_ORDER_CNT = ?, S_REMOTE_CNT = ? WHERE S_I_ID = ? AND S_W_ID = ?</a:t>
+            </a:r>
+          </a:p>
+          <a:p>
+            <a:r>
+              <a:rPr lang="en-US" sz="350" dirty="0" smtClean="0">
+                <a:solidFill>
+                  <a:schemeClr val="tx1">
+                    <a:lumMod val="65000"/>
+                    <a:lumOff val="35000"/>
+                  </a:schemeClr>
+                </a:solidFill>
+                <a:latin typeface="Courier"/>
+                <a:cs typeface="Courier"/>
+              </a:rPr>
+              <a:t>UPDATE DISTRICT SET D_YTD = D_YTD + ? WHERE D_W_ID  = ? AND D_ID = ?</a:t>
+            </a:r>
+          </a:p>
+          <a:p>
+            <a:r>
+              <a:rPr lang="en-US" sz="350" dirty="0" smtClean="0">
+                <a:solidFill>
+                  <a:schemeClr val="tx1">
+                    <a:lumMod val="65000"/>
+                    <a:lumOff val="35000"/>
+                  </a:schemeClr>
+                </a:solidFill>
+                <a:latin typeface="Courier"/>
+                <a:cs typeface="Courier"/>
+              </a:rPr>
+              <a:t>UPDATE DISTRICT SET D_NEXT_O_ID = ? WHERE D_ID = ? AND D_W_ID = ?</a:t>
+            </a:r>
+          </a:p>
+          <a:p>
+            <a:r>
+              <a:rPr lang="en-US" sz="350" dirty="0" smtClean="0">
+                <a:solidFill>
+                  <a:schemeClr val="tx1">
+                    <a:lumMod val="65000"/>
+                    <a:lumOff val="35000"/>
+                  </a:schemeClr>
+                </a:solidFill>
+                <a:latin typeface="Courier"/>
+                <a:cs typeface="Courier"/>
+              </a:rPr>
+              <a:t>INSERT INTO HISTORY VALUES (?, ?, ?, ?, ?, ?, ?, ?)</a:t>
+            </a:r>
+          </a:p>
+          <a:p>
+            <a:r>
+              <a:rPr lang="en-US" sz="350" dirty="0" smtClean="0">
+                <a:solidFill>
+                  <a:schemeClr val="tx1">
+                    <a:lumMod val="65000"/>
+                    <a:lumOff val="35000"/>
+                  </a:schemeClr>
+                </a:solidFill>
+                <a:latin typeface="Courier"/>
+                <a:cs typeface="Courier"/>
+              </a:rPr>
+              <a:t>INSERT INTO ORDERS (O_ID, O_D_ID, O_W_ID, O_C_ID, O_ENTRY_D, O_CARRIER_ID, O_OL_CNT, O_ALL_LOCAL) VALUES (?, ?, ?, ?, ?, ?, ?, ?)</a:t>
+            </a:r>
+          </a:p>
+          <a:p>
+            <a:r>
+              <a:rPr lang="en-US" sz="350" dirty="0" smtClean="0">
+                <a:solidFill>
+                  <a:schemeClr val="tx1">
+                    <a:lumMod val="65000"/>
+                    <a:lumOff val="35000"/>
+                  </a:schemeClr>
+                </a:solidFill>
+                <a:latin typeface="Courier"/>
+                <a:cs typeface="Courier"/>
+              </a:rPr>
+              <a:t>DELETE FROM NEW_ORDER WHERE NO_D_ID = ? AND NO_W_ID = ? AND NO_O_ID = ?</a:t>
+            </a:r>
+          </a:p>
+          <a:p>
+            <a:r>
+              <a:rPr lang="en-US" sz="350" dirty="0" smtClean="0">
+                <a:solidFill>
+                  <a:schemeClr val="tx1">
+                    <a:lumMod val="65000"/>
+                    <a:lumOff val="35000"/>
+                  </a:schemeClr>
+                </a:solidFill>
+                <a:latin typeface="Courier"/>
+                <a:cs typeface="Courier"/>
+              </a:rPr>
+              <a:t>INSERT INTO ORDER_LINE (OL_O_ID, OL_D_ID, OL_W_ID, OL_NUMBER, OL_I_ID, OL_SUPPLY_W_ID, OL_DELIVERY_D, OL_QUANTITY, OL_AMOUNT, OL_DIST_INFO) VALUES (?, ?, ?, ?, ?, ?, ?, ?, ?, ?)</a:t>
+            </a:r>
+          </a:p>
+          <a:p>
+            <a:r>
+              <a:rPr lang="en-US" sz="350" dirty="0" smtClean="0">
+                <a:solidFill>
+                  <a:schemeClr val="tx1">
+                    <a:lumMod val="65000"/>
+                    <a:lumOff val="35000"/>
+                  </a:schemeClr>
+                </a:solidFill>
+                <a:latin typeface="Courier"/>
+                <a:cs typeface="Courier"/>
+              </a:rPr>
+              <a:t>UPDATE ORDER_LINE SET OL_DELIVERY_D = ? WHERE OL_O_ID = ? AND OL_D_ID = ? AND OL_W_ID = ?</a:t>
+            </a:r>
+          </a:p>
+        </p:txBody>
+      </p:sp>
+      <p:sp>
+        <p:nvSpPr>
+          <p:cNvPr id="6" name="TextBox 5"/>
+          <p:cNvSpPr txBox="1"/>
+          <p:nvPr/>
+        </p:nvSpPr>
+        <p:spPr>
+          <a:xfrm>
+            <a:off x="891464" y="3235582"/>
+            <a:ext cx="1437889" cy="400110"/>
+          </a:xfrm>
+          <a:prstGeom prst="rect">
+            <a:avLst/>
+          </a:prstGeom>
+          <a:noFill/>
+        </p:spPr>
+        <p:txBody>
+          <a:bodyPr wrap="none" rtlCol="0">
+            <a:spAutoFit/>
+          </a:bodyPr>
+          <a:lstStyle/>
+          <a:p>
+            <a:r>
+              <a:rPr lang="en-US" sz="2000" dirty="0" smtClean="0">
+                <a:latin typeface="Palatino"/>
+                <a:cs typeface="Palatino"/>
+              </a:rPr>
+              <a:t>Query logs</a:t>
+            </a:r>
+            <a:endParaRPr lang="en-US" sz="2000" dirty="0">
+              <a:latin typeface="Palatino"/>
+              <a:cs typeface="Palatino"/>
+            </a:endParaRPr>
+          </a:p>
+        </p:txBody>
+      </p:sp>
+      <p:sp>
+        <p:nvSpPr>
+          <p:cNvPr id="7" name="Folded Corner 6"/>
+          <p:cNvSpPr/>
+          <p:nvPr/>
+        </p:nvSpPr>
+        <p:spPr>
+          <a:xfrm>
+            <a:off x="2847728" y="625756"/>
+            <a:ext cx="2789481" cy="1538752"/>
+          </a:xfrm>
+          <a:prstGeom prst="foldedCorner">
+            <a:avLst/>
+          </a:prstGeom>
+          <a:solidFill>
+            <a:schemeClr val="bg1"/>
+          </a:solidFill>
+          <a:ln>
+            <a:solidFill>
+              <a:schemeClr val="tx1">
+                <a:lumMod val="65000"/>
+                <a:lumOff val="35000"/>
+              </a:schemeClr>
+            </a:solidFill>
+          </a:ln>
+        </p:spPr>
+        <p:style>
+          <a:lnRef idx="1">
+            <a:schemeClr val="accent1"/>
+          </a:lnRef>
+          <a:fillRef idx="3">
+            <a:schemeClr val="accent1"/>
+          </a:fillRef>
+          <a:effectRef idx="2">
+            <a:schemeClr val="accent1"/>
+          </a:effectRef>
+          <a:fontRef idx="minor">
+            <a:schemeClr val="lt1"/>
+          </a:fontRef>
+        </p:style>
+        <p:txBody>
+          <a:bodyPr rtlCol="0" anchor="ctr"/>
+          <a:lstStyle/>
+          <a:p>
+            <a:pPr algn="ctr"/>
+            <a:endParaRPr lang="en-US"/>
+          </a:p>
+        </p:txBody>
+      </p:sp>
+      <p:sp>
+        <p:nvSpPr>
+          <p:cNvPr id="2" name="Oval 1"/>
+          <p:cNvSpPr/>
+          <p:nvPr/>
+        </p:nvSpPr>
+        <p:spPr>
+          <a:xfrm>
+            <a:off x="3157134" y="1127992"/>
+            <a:ext cx="178885" cy="178885"/>
+          </a:xfrm>
+          <a:prstGeom prst="ellipse">
+            <a:avLst/>
+          </a:prstGeom>
+          <a:solidFill>
+            <a:srgbClr val="FFFFFF"/>
+          </a:solidFill>
+          <a:ln>
+            <a:solidFill>
+              <a:srgbClr val="595959"/>
+            </a:solidFill>
+          </a:ln>
+          <a:effectLst/>
+        </p:spPr>
+        <p:style>
+          <a:lnRef idx="1">
+            <a:schemeClr val="accent1"/>
+          </a:lnRef>
+          <a:fillRef idx="3">
+            <a:schemeClr val="accent1"/>
+          </a:fillRef>
+          <a:effectRef idx="2">
+            <a:schemeClr val="accent1"/>
+          </a:effectRef>
+          <a:fontRef idx="minor">
+            <a:schemeClr val="lt1"/>
+          </a:fontRef>
+        </p:style>
+        <p:txBody>
+          <a:bodyPr rtlCol="0" anchor="ctr"/>
+          <a:lstStyle/>
+          <a:p>
+            <a:pPr algn="ctr"/>
+            <a:endParaRPr lang="en-US"/>
+          </a:p>
+        </p:txBody>
+      </p:sp>
+      <p:sp>
+        <p:nvSpPr>
+          <p:cNvPr id="8" name="Oval 7"/>
+          <p:cNvSpPr/>
+          <p:nvPr/>
+        </p:nvSpPr>
+        <p:spPr>
+          <a:xfrm>
+            <a:off x="3483856" y="1127992"/>
+            <a:ext cx="178885" cy="178885"/>
+          </a:xfrm>
+          <a:prstGeom prst="ellipse">
+            <a:avLst/>
+          </a:prstGeom>
+          <a:solidFill>
+            <a:srgbClr val="FFFFFF"/>
+          </a:solidFill>
+          <a:ln>
+            <a:solidFill>
+              <a:srgbClr val="595959"/>
+            </a:solidFill>
+          </a:ln>
+          <a:effectLst/>
+        </p:spPr>
+        <p:style>
+          <a:lnRef idx="1">
+            <a:schemeClr val="accent1"/>
+          </a:lnRef>
+          <a:fillRef idx="3">
+            <a:schemeClr val="accent1"/>
+          </a:fillRef>
+          <a:effectRef idx="2">
+            <a:schemeClr val="accent1"/>
+          </a:effectRef>
+          <a:fontRef idx="minor">
+            <a:schemeClr val="lt1"/>
+          </a:fontRef>
+        </p:style>
+        <p:txBody>
+          <a:bodyPr rtlCol="0" anchor="ctr"/>
+          <a:lstStyle/>
+          <a:p>
+            <a:pPr algn="ctr"/>
+            <a:endParaRPr lang="en-US"/>
+          </a:p>
+        </p:txBody>
+      </p:sp>
+      <p:sp>
+        <p:nvSpPr>
+          <p:cNvPr id="9" name="Oval 8"/>
+          <p:cNvSpPr/>
+          <p:nvPr/>
+        </p:nvSpPr>
+        <p:spPr>
+          <a:xfrm>
+            <a:off x="3810578" y="1127992"/>
+            <a:ext cx="178885" cy="178885"/>
+          </a:xfrm>
+          <a:prstGeom prst="ellipse">
+            <a:avLst/>
+          </a:prstGeom>
+          <a:solidFill>
+            <a:schemeClr val="tx1">
+              <a:lumMod val="65000"/>
+              <a:lumOff val="35000"/>
+            </a:schemeClr>
+          </a:solidFill>
+          <a:ln>
+            <a:solidFill>
+              <a:srgbClr val="595959"/>
+            </a:solidFill>
+          </a:ln>
+          <a:effectLst/>
+        </p:spPr>
+        <p:style>
+          <a:lnRef idx="1">
+            <a:schemeClr val="accent1"/>
+          </a:lnRef>
+          <a:fillRef idx="3">
+            <a:schemeClr val="accent1"/>
+          </a:fillRef>
+          <a:effectRef idx="2">
+            <a:schemeClr val="accent1"/>
+          </a:effectRef>
+          <a:fontRef idx="minor">
+            <a:schemeClr val="lt1"/>
+          </a:fontRef>
+        </p:style>
+        <p:txBody>
+          <a:bodyPr rtlCol="0" anchor="ctr"/>
+          <a:lstStyle/>
+          <a:p>
+            <a:pPr algn="ctr"/>
+            <a:endParaRPr lang="en-US"/>
+          </a:p>
+        </p:txBody>
+      </p:sp>
+      <p:sp>
+        <p:nvSpPr>
+          <p:cNvPr id="10" name="Oval 9"/>
+          <p:cNvSpPr/>
+          <p:nvPr/>
+        </p:nvSpPr>
+        <p:spPr>
+          <a:xfrm>
+            <a:off x="4137300" y="1127992"/>
+            <a:ext cx="178885" cy="178885"/>
+          </a:xfrm>
+          <a:prstGeom prst="ellipse">
+            <a:avLst/>
+          </a:prstGeom>
+          <a:solidFill>
+            <a:srgbClr val="595959"/>
+          </a:solidFill>
+          <a:ln>
+            <a:solidFill>
+              <a:srgbClr val="595959"/>
+            </a:solidFill>
+          </a:ln>
+          <a:effectLst/>
+        </p:spPr>
+        <p:style>
+          <a:lnRef idx="1">
+            <a:schemeClr val="accent1"/>
+          </a:lnRef>
+          <a:fillRef idx="3">
+            <a:schemeClr val="accent1"/>
+          </a:fillRef>
+          <a:effectRef idx="2">
+            <a:schemeClr val="accent1"/>
+          </a:effectRef>
+          <a:fontRef idx="minor">
+            <a:schemeClr val="lt1"/>
+          </a:fontRef>
+        </p:style>
+        <p:txBody>
+          <a:bodyPr rtlCol="0" anchor="ctr"/>
+          <a:lstStyle/>
+          <a:p>
+            <a:pPr algn="ctr"/>
+            <a:endParaRPr lang="en-US"/>
+          </a:p>
+        </p:txBody>
+      </p:sp>
+      <p:sp>
+        <p:nvSpPr>
+          <p:cNvPr id="11" name="Oval 10"/>
+          <p:cNvSpPr/>
+          <p:nvPr/>
+        </p:nvSpPr>
+        <p:spPr>
+          <a:xfrm>
+            <a:off x="4464022" y="1127992"/>
+            <a:ext cx="178885" cy="178885"/>
+          </a:xfrm>
+          <a:prstGeom prst="ellipse">
+            <a:avLst/>
+          </a:prstGeom>
+          <a:solidFill>
+            <a:srgbClr val="595959"/>
+          </a:solidFill>
+          <a:ln>
+            <a:solidFill>
+              <a:srgbClr val="595959"/>
+            </a:solidFill>
+          </a:ln>
+          <a:effectLst/>
+        </p:spPr>
+        <p:style>
+          <a:lnRef idx="1">
+            <a:schemeClr val="accent1"/>
+          </a:lnRef>
+          <a:fillRef idx="3">
+            <a:schemeClr val="accent1"/>
+          </a:fillRef>
+          <a:effectRef idx="2">
+            <a:schemeClr val="accent1"/>
+          </a:effectRef>
+          <a:fontRef idx="minor">
+            <a:schemeClr val="lt1"/>
+          </a:fontRef>
+        </p:style>
+        <p:txBody>
+          <a:bodyPr rtlCol="0" anchor="ctr"/>
+          <a:lstStyle/>
+          <a:p>
+            <a:pPr algn="ctr"/>
+            <a:endParaRPr lang="en-US"/>
+          </a:p>
+        </p:txBody>
+      </p:sp>
+      <p:sp>
+        <p:nvSpPr>
+          <p:cNvPr id="12" name="Oval 11"/>
+          <p:cNvSpPr/>
+          <p:nvPr/>
+        </p:nvSpPr>
+        <p:spPr>
+          <a:xfrm>
+            <a:off x="4790744" y="1127992"/>
+            <a:ext cx="178885" cy="178885"/>
+          </a:xfrm>
+          <a:prstGeom prst="ellipse">
+            <a:avLst/>
+          </a:prstGeom>
+          <a:solidFill>
+            <a:srgbClr val="FFFFFF"/>
+          </a:solidFill>
+          <a:ln>
+            <a:solidFill>
+              <a:srgbClr val="595959"/>
+            </a:solidFill>
+          </a:ln>
+          <a:effectLst/>
+        </p:spPr>
+        <p:style>
+          <a:lnRef idx="1">
+            <a:schemeClr val="accent1"/>
+          </a:lnRef>
+          <a:fillRef idx="3">
+            <a:schemeClr val="accent1"/>
+          </a:fillRef>
+          <a:effectRef idx="2">
+            <a:schemeClr val="accent1"/>
+          </a:effectRef>
+          <a:fontRef idx="minor">
+            <a:schemeClr val="lt1"/>
+          </a:fontRef>
+        </p:style>
+        <p:txBody>
+          <a:bodyPr rtlCol="0" anchor="ctr"/>
+          <a:lstStyle/>
+          <a:p>
+            <a:pPr algn="ctr"/>
+            <a:endParaRPr lang="en-US"/>
+          </a:p>
+        </p:txBody>
+      </p:sp>
+      <p:sp>
+        <p:nvSpPr>
+          <p:cNvPr id="13" name="Oval 12"/>
+          <p:cNvSpPr/>
+          <p:nvPr/>
+        </p:nvSpPr>
+        <p:spPr>
+          <a:xfrm>
+            <a:off x="5117466" y="1127992"/>
+            <a:ext cx="178885" cy="178885"/>
+          </a:xfrm>
+          <a:prstGeom prst="ellipse">
+            <a:avLst/>
+          </a:prstGeom>
+          <a:solidFill>
+            <a:srgbClr val="FFFFFF"/>
+          </a:solidFill>
+          <a:ln>
+            <a:solidFill>
+              <a:srgbClr val="595959"/>
+            </a:solidFill>
+          </a:ln>
+          <a:effectLst/>
+        </p:spPr>
+        <p:style>
+          <a:lnRef idx="1">
+            <a:schemeClr val="accent1"/>
+          </a:lnRef>
+          <a:fillRef idx="3">
+            <a:schemeClr val="accent1"/>
+          </a:fillRef>
+          <a:effectRef idx="2">
+            <a:schemeClr val="accent1"/>
+          </a:effectRef>
+          <a:fontRef idx="minor">
+            <a:schemeClr val="lt1"/>
+          </a:fontRef>
+        </p:style>
+        <p:txBody>
+          <a:bodyPr rtlCol="0" anchor="ctr"/>
+          <a:lstStyle/>
+          <a:p>
+            <a:pPr algn="ctr"/>
+            <a:endParaRPr lang="en-US"/>
+          </a:p>
+        </p:txBody>
+      </p:sp>
+      <p:sp>
+        <p:nvSpPr>
+          <p:cNvPr id="14" name="Oval 13"/>
+          <p:cNvSpPr/>
+          <p:nvPr/>
+        </p:nvSpPr>
+        <p:spPr>
+          <a:xfrm>
+            <a:off x="3157134" y="1468216"/>
+            <a:ext cx="178885" cy="178885"/>
+          </a:xfrm>
+          <a:prstGeom prst="ellipse">
+            <a:avLst/>
+          </a:prstGeom>
+          <a:solidFill>
+            <a:srgbClr val="FFFFFF"/>
+          </a:solidFill>
+          <a:ln>
+            <a:solidFill>
+              <a:srgbClr val="595959"/>
+            </a:solidFill>
+          </a:ln>
+          <a:effectLst/>
+        </p:spPr>
+        <p:style>
+          <a:lnRef idx="1">
+            <a:schemeClr val="accent1"/>
+          </a:lnRef>
+          <a:fillRef idx="3">
+            <a:schemeClr val="accent1"/>
+          </a:fillRef>
+          <a:effectRef idx="2">
+            <a:schemeClr val="accent1"/>
+          </a:effectRef>
+          <a:fontRef idx="minor">
+            <a:schemeClr val="lt1"/>
+          </a:fontRef>
+        </p:style>
+        <p:txBody>
+          <a:bodyPr rtlCol="0" anchor="ctr"/>
+          <a:lstStyle/>
+          <a:p>
+            <a:pPr algn="ctr"/>
+            <a:endParaRPr lang="en-US"/>
+          </a:p>
+        </p:txBody>
+      </p:sp>
+      <p:sp>
+        <p:nvSpPr>
+          <p:cNvPr id="15" name="Oval 14"/>
+          <p:cNvSpPr/>
+          <p:nvPr/>
+        </p:nvSpPr>
+        <p:spPr>
+          <a:xfrm>
+            <a:off x="3483856" y="1468216"/>
+            <a:ext cx="178885" cy="178885"/>
+          </a:xfrm>
+          <a:prstGeom prst="ellipse">
+            <a:avLst/>
+          </a:prstGeom>
+          <a:solidFill>
+            <a:srgbClr val="FFFFFF"/>
+          </a:solidFill>
+          <a:ln>
+            <a:solidFill>
+              <a:srgbClr val="595959"/>
+            </a:solidFill>
+          </a:ln>
+          <a:effectLst/>
+        </p:spPr>
+        <p:style>
+          <a:lnRef idx="1">
+            <a:schemeClr val="accent1"/>
+          </a:lnRef>
+          <a:fillRef idx="3">
+            <a:schemeClr val="accent1"/>
+          </a:fillRef>
+          <a:effectRef idx="2">
+            <a:schemeClr val="accent1"/>
+          </a:effectRef>
+          <a:fontRef idx="minor">
+            <a:schemeClr val="lt1"/>
+          </a:fontRef>
+        </p:style>
+        <p:txBody>
+          <a:bodyPr rtlCol="0" anchor="ctr"/>
+          <a:lstStyle/>
+          <a:p>
+            <a:pPr algn="ctr"/>
+            <a:endParaRPr lang="en-US"/>
+          </a:p>
+        </p:txBody>
+      </p:sp>
+      <p:sp>
+        <p:nvSpPr>
+          <p:cNvPr id="16" name="Oval 15"/>
+          <p:cNvSpPr/>
+          <p:nvPr/>
+        </p:nvSpPr>
+        <p:spPr>
+          <a:xfrm>
+            <a:off x="3810578" y="1468216"/>
+            <a:ext cx="178885" cy="178885"/>
+          </a:xfrm>
+          <a:prstGeom prst="ellipse">
+            <a:avLst/>
+          </a:prstGeom>
+          <a:solidFill>
+            <a:srgbClr val="FFFFFF"/>
+          </a:solidFill>
+          <a:ln>
+            <a:solidFill>
+              <a:srgbClr val="595959"/>
+            </a:solidFill>
+          </a:ln>
+          <a:effectLst/>
+        </p:spPr>
+        <p:style>
+          <a:lnRef idx="1">
+            <a:schemeClr val="accent1"/>
+          </a:lnRef>
+          <a:fillRef idx="3">
+            <a:schemeClr val="accent1"/>
+          </a:fillRef>
+          <a:effectRef idx="2">
+            <a:schemeClr val="accent1"/>
+          </a:effectRef>
+          <a:fontRef idx="minor">
+            <a:schemeClr val="lt1"/>
+          </a:fontRef>
+        </p:style>
+        <p:txBody>
+          <a:bodyPr rtlCol="0" anchor="ctr"/>
+          <a:lstStyle/>
+          <a:p>
+            <a:pPr algn="ctr"/>
+            <a:endParaRPr lang="en-US"/>
+          </a:p>
+        </p:txBody>
+      </p:sp>
+      <p:sp>
+        <p:nvSpPr>
+          <p:cNvPr id="17" name="Oval 16"/>
+          <p:cNvSpPr/>
+          <p:nvPr/>
+        </p:nvSpPr>
+        <p:spPr>
+          <a:xfrm>
+            <a:off x="4137300" y="1468216"/>
+            <a:ext cx="178885" cy="178885"/>
+          </a:xfrm>
+          <a:prstGeom prst="ellipse">
+            <a:avLst/>
+          </a:prstGeom>
+          <a:solidFill>
+            <a:srgbClr val="FFFFFF"/>
+          </a:solidFill>
+          <a:ln>
+            <a:solidFill>
+              <a:srgbClr val="595959"/>
+            </a:solidFill>
+          </a:ln>
+          <a:effectLst/>
+        </p:spPr>
+        <p:style>
+          <a:lnRef idx="1">
+            <a:schemeClr val="accent1"/>
+          </a:lnRef>
+          <a:fillRef idx="3">
+            <a:schemeClr val="accent1"/>
+          </a:fillRef>
+          <a:effectRef idx="2">
+            <a:schemeClr val="accent1"/>
+          </a:effectRef>
+          <a:fontRef idx="minor">
+            <a:schemeClr val="lt1"/>
+          </a:fontRef>
+        </p:style>
+        <p:txBody>
+          <a:bodyPr rtlCol="0" anchor="ctr"/>
+          <a:lstStyle/>
+          <a:p>
+            <a:pPr algn="ctr"/>
+            <a:endParaRPr lang="en-US"/>
+          </a:p>
+        </p:txBody>
+      </p:sp>
+      <p:sp>
+        <p:nvSpPr>
+          <p:cNvPr id="18" name="Oval 17"/>
+          <p:cNvSpPr/>
+          <p:nvPr/>
+        </p:nvSpPr>
+        <p:spPr>
+          <a:xfrm>
+            <a:off x="4464022" y="1468216"/>
+            <a:ext cx="178885" cy="178885"/>
+          </a:xfrm>
+          <a:prstGeom prst="ellipse">
+            <a:avLst/>
+          </a:prstGeom>
+          <a:solidFill>
+            <a:srgbClr val="FFFFFF"/>
+          </a:solidFill>
+          <a:ln>
+            <a:solidFill>
+              <a:srgbClr val="595959"/>
+            </a:solidFill>
+          </a:ln>
+          <a:effectLst/>
+        </p:spPr>
+        <p:style>
+          <a:lnRef idx="1">
+            <a:schemeClr val="accent1"/>
+          </a:lnRef>
+          <a:fillRef idx="3">
+            <a:schemeClr val="accent1"/>
+          </a:fillRef>
+          <a:effectRef idx="2">
+            <a:schemeClr val="accent1"/>
+          </a:effectRef>
+          <a:fontRef idx="minor">
+            <a:schemeClr val="lt1"/>
+          </a:fontRef>
+        </p:style>
+        <p:txBody>
+          <a:bodyPr rtlCol="0" anchor="ctr"/>
+          <a:lstStyle/>
+          <a:p>
+            <a:pPr algn="ctr"/>
+            <a:endParaRPr lang="en-US"/>
+          </a:p>
+        </p:txBody>
+      </p:sp>
+      <p:sp>
+        <p:nvSpPr>
+          <p:cNvPr id="19" name="Oval 18"/>
+          <p:cNvSpPr/>
+          <p:nvPr/>
+        </p:nvSpPr>
+        <p:spPr>
+          <a:xfrm>
+            <a:off x="4790744" y="1468216"/>
+            <a:ext cx="178885" cy="178885"/>
+          </a:xfrm>
+          <a:prstGeom prst="ellipse">
+            <a:avLst/>
+          </a:prstGeom>
+          <a:solidFill>
+            <a:srgbClr val="595959"/>
+          </a:solidFill>
+          <a:ln>
+            <a:solidFill>
+              <a:srgbClr val="595959"/>
+            </a:solidFill>
+          </a:ln>
+          <a:effectLst/>
+        </p:spPr>
+        <p:style>
+          <a:lnRef idx="1">
+            <a:schemeClr val="accent1"/>
+          </a:lnRef>
+          <a:fillRef idx="3">
+            <a:schemeClr val="accent1"/>
+          </a:fillRef>
+          <a:effectRef idx="2">
+            <a:schemeClr val="accent1"/>
+          </a:effectRef>
+          <a:fontRef idx="minor">
+            <a:schemeClr val="lt1"/>
+          </a:fontRef>
+        </p:style>
+        <p:txBody>
+          <a:bodyPr rtlCol="0" anchor="ctr"/>
+          <a:lstStyle/>
+          <a:p>
+            <a:pPr algn="ctr"/>
+            <a:endParaRPr lang="en-US"/>
+          </a:p>
+        </p:txBody>
+      </p:sp>
+      <p:sp>
+        <p:nvSpPr>
+          <p:cNvPr id="20" name="Oval 19"/>
+          <p:cNvSpPr/>
+          <p:nvPr/>
+        </p:nvSpPr>
+        <p:spPr>
+          <a:xfrm>
+            <a:off x="5117466" y="1468216"/>
+            <a:ext cx="178885" cy="178885"/>
+          </a:xfrm>
+          <a:prstGeom prst="ellipse">
+            <a:avLst/>
+          </a:prstGeom>
+          <a:solidFill>
+            <a:srgbClr val="FFFFFF"/>
+          </a:solidFill>
+          <a:ln>
+            <a:solidFill>
+              <a:srgbClr val="595959"/>
+            </a:solidFill>
+          </a:ln>
+          <a:effectLst/>
+        </p:spPr>
+        <p:style>
+          <a:lnRef idx="1">
+            <a:schemeClr val="accent1"/>
+          </a:lnRef>
+          <a:fillRef idx="3">
+            <a:schemeClr val="accent1"/>
+          </a:fillRef>
+          <a:effectRef idx="2">
+            <a:schemeClr val="accent1"/>
+          </a:effectRef>
+          <a:fontRef idx="minor">
+            <a:schemeClr val="lt1"/>
+          </a:fontRef>
+        </p:style>
+        <p:txBody>
+          <a:bodyPr rtlCol="0" anchor="ctr"/>
+          <a:lstStyle/>
+          <a:p>
+            <a:pPr algn="ctr"/>
+            <a:endParaRPr lang="en-US"/>
+          </a:p>
+        </p:txBody>
+      </p:sp>
+      <p:sp>
+        <p:nvSpPr>
+          <p:cNvPr id="21" name="Oval 20"/>
+          <p:cNvSpPr/>
+          <p:nvPr/>
+        </p:nvSpPr>
+        <p:spPr>
+          <a:xfrm>
+            <a:off x="3157134" y="1808440"/>
+            <a:ext cx="178885" cy="178885"/>
+          </a:xfrm>
+          <a:prstGeom prst="ellipse">
+            <a:avLst/>
+          </a:prstGeom>
+          <a:solidFill>
+            <a:srgbClr val="FFFFFF"/>
+          </a:solidFill>
+          <a:ln>
+            <a:solidFill>
+              <a:srgbClr val="595959"/>
+            </a:solidFill>
+          </a:ln>
+          <a:effectLst/>
+        </p:spPr>
+        <p:style>
+          <a:lnRef idx="1">
+            <a:schemeClr val="accent1"/>
+          </a:lnRef>
+          <a:fillRef idx="3">
+            <a:schemeClr val="accent1"/>
+          </a:fillRef>
+          <a:effectRef idx="2">
+            <a:schemeClr val="accent1"/>
+          </a:effectRef>
+          <a:fontRef idx="minor">
+            <a:schemeClr val="lt1"/>
+          </a:fontRef>
+        </p:style>
+        <p:txBody>
+          <a:bodyPr rtlCol="0" anchor="ctr"/>
+          <a:lstStyle/>
+          <a:p>
+            <a:pPr algn="ctr"/>
+            <a:endParaRPr lang="en-US"/>
+          </a:p>
+        </p:txBody>
+      </p:sp>
+      <p:sp>
+        <p:nvSpPr>
+          <p:cNvPr id="22" name="Oval 21"/>
+          <p:cNvSpPr/>
+          <p:nvPr/>
+        </p:nvSpPr>
+        <p:spPr>
+          <a:xfrm>
+            <a:off x="3483856" y="1808440"/>
+            <a:ext cx="178885" cy="178885"/>
+          </a:xfrm>
+          <a:prstGeom prst="ellipse">
+            <a:avLst/>
+          </a:prstGeom>
+          <a:solidFill>
+            <a:srgbClr val="595959"/>
+          </a:solidFill>
+          <a:ln>
+            <a:solidFill>
+              <a:srgbClr val="595959"/>
+            </a:solidFill>
+          </a:ln>
+          <a:effectLst/>
+        </p:spPr>
+        <p:style>
+          <a:lnRef idx="1">
+            <a:schemeClr val="accent1"/>
+          </a:lnRef>
+          <a:fillRef idx="3">
+            <a:schemeClr val="accent1"/>
+          </a:fillRef>
+          <a:effectRef idx="2">
+            <a:schemeClr val="accent1"/>
+          </a:effectRef>
+          <a:fontRef idx="minor">
+            <a:schemeClr val="lt1"/>
+          </a:fontRef>
+        </p:style>
+        <p:txBody>
+          <a:bodyPr rtlCol="0" anchor="ctr"/>
+          <a:lstStyle/>
+          <a:p>
+            <a:pPr algn="ctr"/>
+            <a:endParaRPr lang="en-US"/>
+          </a:p>
+        </p:txBody>
+      </p:sp>
+      <p:sp>
+        <p:nvSpPr>
+          <p:cNvPr id="23" name="Oval 22"/>
+          <p:cNvSpPr/>
+          <p:nvPr/>
+        </p:nvSpPr>
+        <p:spPr>
+          <a:xfrm>
+            <a:off x="3810578" y="1808440"/>
+            <a:ext cx="178885" cy="178885"/>
+          </a:xfrm>
+          <a:prstGeom prst="ellipse">
+            <a:avLst/>
+          </a:prstGeom>
+          <a:solidFill>
+            <a:srgbClr val="FFFFFF"/>
+          </a:solidFill>
+          <a:ln>
+            <a:solidFill>
+              <a:srgbClr val="595959"/>
+            </a:solidFill>
+          </a:ln>
+          <a:effectLst/>
+        </p:spPr>
+        <p:style>
+          <a:lnRef idx="1">
+            <a:schemeClr val="accent1"/>
+          </a:lnRef>
+          <a:fillRef idx="3">
+            <a:schemeClr val="accent1"/>
+          </a:fillRef>
+          <a:effectRef idx="2">
+            <a:schemeClr val="accent1"/>
+          </a:effectRef>
+          <a:fontRef idx="minor">
+            <a:schemeClr val="lt1"/>
+          </a:fontRef>
+        </p:style>
+        <p:txBody>
+          <a:bodyPr rtlCol="0" anchor="ctr"/>
+          <a:lstStyle/>
+          <a:p>
+            <a:pPr algn="ctr"/>
+            <a:endParaRPr lang="en-US"/>
+          </a:p>
+        </p:txBody>
+      </p:sp>
+      <p:sp>
+        <p:nvSpPr>
+          <p:cNvPr id="24" name="Oval 23"/>
+          <p:cNvSpPr/>
+          <p:nvPr/>
+        </p:nvSpPr>
+        <p:spPr>
+          <a:xfrm>
+            <a:off x="4137300" y="1808440"/>
+            <a:ext cx="178885" cy="178885"/>
+          </a:xfrm>
+          <a:prstGeom prst="ellipse">
+            <a:avLst/>
+          </a:prstGeom>
+          <a:solidFill>
+            <a:srgbClr val="FFFFFF"/>
+          </a:solidFill>
+          <a:ln>
+            <a:solidFill>
+              <a:srgbClr val="595959"/>
+            </a:solidFill>
+          </a:ln>
+          <a:effectLst/>
+        </p:spPr>
+        <p:style>
+          <a:lnRef idx="1">
+            <a:schemeClr val="accent1"/>
+          </a:lnRef>
+          <a:fillRef idx="3">
+            <a:schemeClr val="accent1"/>
+          </a:fillRef>
+          <a:effectRef idx="2">
+            <a:schemeClr val="accent1"/>
+          </a:effectRef>
+          <a:fontRef idx="minor">
+            <a:schemeClr val="lt1"/>
+          </a:fontRef>
+        </p:style>
+        <p:txBody>
+          <a:bodyPr rtlCol="0" anchor="ctr"/>
+          <a:lstStyle/>
+          <a:p>
+            <a:pPr algn="ctr"/>
+            <a:endParaRPr lang="en-US"/>
+          </a:p>
+        </p:txBody>
+      </p:sp>
+      <p:sp>
+        <p:nvSpPr>
+          <p:cNvPr id="25" name="Oval 24"/>
+          <p:cNvSpPr/>
+          <p:nvPr/>
+        </p:nvSpPr>
+        <p:spPr>
+          <a:xfrm>
+            <a:off x="4464022" y="1808440"/>
+            <a:ext cx="178885" cy="178885"/>
+          </a:xfrm>
+          <a:prstGeom prst="ellipse">
+            <a:avLst/>
+          </a:prstGeom>
+          <a:solidFill>
+            <a:srgbClr val="FFFFFF"/>
+          </a:solidFill>
+          <a:ln>
+            <a:solidFill>
+              <a:srgbClr val="595959"/>
+            </a:solidFill>
+          </a:ln>
+          <a:effectLst/>
+        </p:spPr>
+        <p:style>
+          <a:lnRef idx="1">
+            <a:schemeClr val="accent1"/>
+          </a:lnRef>
+          <a:fillRef idx="3">
+            <a:schemeClr val="accent1"/>
+          </a:fillRef>
+          <a:effectRef idx="2">
+            <a:schemeClr val="accent1"/>
+          </a:effectRef>
+          <a:fontRef idx="minor">
+            <a:schemeClr val="lt1"/>
+          </a:fontRef>
+        </p:style>
+        <p:txBody>
+          <a:bodyPr rtlCol="0" anchor="ctr"/>
+          <a:lstStyle/>
+          <a:p>
+            <a:pPr algn="ctr"/>
+            <a:endParaRPr lang="en-US"/>
+          </a:p>
+        </p:txBody>
+      </p:sp>
+      <p:sp>
+        <p:nvSpPr>
+          <p:cNvPr id="26" name="Oval 25"/>
+          <p:cNvSpPr/>
+          <p:nvPr/>
+        </p:nvSpPr>
+        <p:spPr>
+          <a:xfrm>
+            <a:off x="4790744" y="1808440"/>
+            <a:ext cx="178885" cy="178885"/>
+          </a:xfrm>
+          <a:prstGeom prst="ellipse">
+            <a:avLst/>
+          </a:prstGeom>
+          <a:solidFill>
+            <a:srgbClr val="FFFFFF"/>
+          </a:solidFill>
+          <a:ln>
+            <a:solidFill>
+              <a:srgbClr val="595959"/>
+            </a:solidFill>
+          </a:ln>
+          <a:effectLst/>
+        </p:spPr>
+        <p:style>
+          <a:lnRef idx="1">
+            <a:schemeClr val="accent1"/>
+          </a:lnRef>
+          <a:fillRef idx="3">
+            <a:schemeClr val="accent1"/>
+          </a:fillRef>
+          <a:effectRef idx="2">
+            <a:schemeClr val="accent1"/>
+          </a:effectRef>
+          <a:fontRef idx="minor">
+            <a:schemeClr val="lt1"/>
+          </a:fontRef>
+        </p:style>
+        <p:txBody>
+          <a:bodyPr rtlCol="0" anchor="ctr"/>
+          <a:lstStyle/>
+          <a:p>
+            <a:pPr algn="ctr"/>
+            <a:endParaRPr lang="en-US"/>
+          </a:p>
+        </p:txBody>
+      </p:sp>
+      <p:sp>
+        <p:nvSpPr>
+          <p:cNvPr id="27" name="Oval 26"/>
+          <p:cNvSpPr/>
+          <p:nvPr/>
+        </p:nvSpPr>
+        <p:spPr>
+          <a:xfrm>
+            <a:off x="5117466" y="1808440"/>
+            <a:ext cx="178885" cy="178885"/>
+          </a:xfrm>
+          <a:prstGeom prst="ellipse">
+            <a:avLst/>
+          </a:prstGeom>
+          <a:solidFill>
+            <a:srgbClr val="FFFFFF"/>
+          </a:solidFill>
+          <a:ln>
+            <a:solidFill>
+              <a:srgbClr val="595959"/>
+            </a:solidFill>
+          </a:ln>
+          <a:effectLst/>
+        </p:spPr>
+        <p:style>
+          <a:lnRef idx="1">
+            <a:schemeClr val="accent1"/>
+          </a:lnRef>
+          <a:fillRef idx="3">
+            <a:schemeClr val="accent1"/>
+          </a:fillRef>
+          <a:effectRef idx="2">
+            <a:schemeClr val="accent1"/>
+          </a:effectRef>
+          <a:fontRef idx="minor">
+            <a:schemeClr val="lt1"/>
+          </a:fontRef>
+        </p:style>
+        <p:txBody>
+          <a:bodyPr rtlCol="0" anchor="ctr"/>
+          <a:lstStyle/>
+          <a:p>
+            <a:pPr algn="ctr"/>
+            <a:endParaRPr lang="en-US"/>
+          </a:p>
+        </p:txBody>
+      </p:sp>
+      <p:sp>
+        <p:nvSpPr>
+          <p:cNvPr id="28" name="TextBox 27"/>
+          <p:cNvSpPr txBox="1"/>
+          <p:nvPr/>
+        </p:nvSpPr>
+        <p:spPr>
+          <a:xfrm>
+            <a:off x="3068624" y="643241"/>
+            <a:ext cx="1506267" cy="400110"/>
+          </a:xfrm>
+          <a:prstGeom prst="rect">
+            <a:avLst/>
+          </a:prstGeom>
+          <a:noFill/>
+        </p:spPr>
+        <p:txBody>
+          <a:bodyPr wrap="none" rtlCol="0">
+            <a:spAutoFit/>
+          </a:bodyPr>
+          <a:lstStyle/>
+          <a:p>
+            <a:r>
+              <a:rPr lang="en-US" sz="2000" dirty="0" smtClean="0">
+                <a:latin typeface="Palatino"/>
+                <a:cs typeface="Palatino"/>
+              </a:rPr>
+              <a:t>Complaints</a:t>
+            </a:r>
+            <a:endParaRPr lang="en-US" sz="2000" dirty="0">
+              <a:latin typeface="Palatino"/>
+              <a:cs typeface="Palatino"/>
+            </a:endParaRPr>
+          </a:p>
+        </p:txBody>
+      </p:sp>
+      <p:pic>
+        <p:nvPicPr>
+          <p:cNvPr id="3" name="Picture 2"/>
+          <p:cNvPicPr>
+            <a:picLocks noChangeAspect="1"/>
+          </p:cNvPicPr>
+          <p:nvPr/>
+        </p:nvPicPr>
+        <p:blipFill>
+          <a:blip r:embed="rId2"/>
+          <a:stretch>
+            <a:fillRect/>
+          </a:stretch>
+        </p:blipFill>
+        <p:spPr>
+          <a:xfrm>
+            <a:off x="604005" y="625756"/>
+            <a:ext cx="1538752" cy="1538752"/>
+          </a:xfrm>
+          <a:prstGeom prst="rect">
+            <a:avLst/>
+          </a:prstGeom>
+        </p:spPr>
+      </p:pic>
+      <p:sp>
+        <p:nvSpPr>
+          <p:cNvPr id="29" name="TextBox 28"/>
+          <p:cNvSpPr txBox="1"/>
+          <p:nvPr/>
+        </p:nvSpPr>
+        <p:spPr>
+          <a:xfrm>
+            <a:off x="960448" y="428101"/>
+            <a:ext cx="825867" cy="400110"/>
+          </a:xfrm>
+          <a:prstGeom prst="rect">
+            <a:avLst/>
+          </a:prstGeom>
+          <a:noFill/>
+        </p:spPr>
+        <p:txBody>
+          <a:bodyPr wrap="none" rtlCol="0">
+            <a:spAutoFit/>
+          </a:bodyPr>
+          <a:lstStyle/>
+          <a:p>
+            <a:r>
+              <a:rPr lang="en-US" sz="2000" dirty="0" smtClean="0">
+                <a:latin typeface="Palatino"/>
+                <a:cs typeface="Palatino"/>
+              </a:rPr>
+              <a:t>Users</a:t>
+            </a:r>
+          </a:p>
+        </p:txBody>
+      </p:sp>
+      <p:cxnSp>
+        <p:nvCxnSpPr>
+          <p:cNvPr id="31" name="Straight Arrow Connector 30"/>
+          <p:cNvCxnSpPr/>
+          <p:nvPr/>
+        </p:nvCxnSpPr>
+        <p:spPr>
+          <a:xfrm>
+            <a:off x="2143495" y="1024979"/>
+            <a:ext cx="704971" cy="0"/>
+          </a:xfrm>
+          <a:prstGeom prst="straightConnector1">
+            <a:avLst/>
+          </a:prstGeom>
+          <a:ln>
+            <a:solidFill>
+              <a:srgbClr val="595959"/>
+            </a:solidFill>
+            <a:tailEnd type="arrow"/>
+          </a:ln>
+          <a:effectLst/>
+        </p:spPr>
+        <p:style>
+          <a:lnRef idx="2">
+            <a:schemeClr val="accent1"/>
+          </a:lnRef>
+          <a:fillRef idx="0">
+            <a:schemeClr val="accent1"/>
+          </a:fillRef>
+          <a:effectRef idx="1">
+            <a:schemeClr val="accent1"/>
+          </a:effectRef>
+          <a:fontRef idx="minor">
+            <a:schemeClr val="tx1"/>
+          </a:fontRef>
+        </p:style>
+      </p:cxnSp>
+      <p:cxnSp>
+        <p:nvCxnSpPr>
+          <p:cNvPr id="32" name="Straight Arrow Connector 31"/>
+          <p:cNvCxnSpPr/>
+          <p:nvPr/>
+        </p:nvCxnSpPr>
+        <p:spPr>
+          <a:xfrm>
+            <a:off x="2143495" y="1231043"/>
+            <a:ext cx="704971" cy="0"/>
+          </a:xfrm>
+          <a:prstGeom prst="straightConnector1">
+            <a:avLst/>
+          </a:prstGeom>
+          <a:ln>
+            <a:solidFill>
+              <a:srgbClr val="595959"/>
+            </a:solidFill>
+            <a:tailEnd type="arrow"/>
+          </a:ln>
+          <a:effectLst/>
+        </p:spPr>
+        <p:style>
+          <a:lnRef idx="2">
+            <a:schemeClr val="accent1"/>
+          </a:lnRef>
+          <a:fillRef idx="0">
+            <a:schemeClr val="accent1"/>
+          </a:fillRef>
+          <a:effectRef idx="1">
+            <a:schemeClr val="accent1"/>
+          </a:effectRef>
+          <a:fontRef idx="minor">
+            <a:schemeClr val="tx1"/>
+          </a:fontRef>
+        </p:style>
+      </p:cxnSp>
+      <p:cxnSp>
+        <p:nvCxnSpPr>
+          <p:cNvPr id="33" name="Straight Arrow Connector 32"/>
+          <p:cNvCxnSpPr/>
+          <p:nvPr/>
+        </p:nvCxnSpPr>
+        <p:spPr>
+          <a:xfrm>
+            <a:off x="2143495" y="1437107"/>
+            <a:ext cx="704971" cy="0"/>
+          </a:xfrm>
+          <a:prstGeom prst="straightConnector1">
+            <a:avLst/>
+          </a:prstGeom>
+          <a:ln>
+            <a:solidFill>
+              <a:srgbClr val="595959"/>
+            </a:solidFill>
+            <a:tailEnd type="arrow"/>
+          </a:ln>
+          <a:effectLst/>
+        </p:spPr>
+        <p:style>
+          <a:lnRef idx="2">
+            <a:schemeClr val="accent1"/>
+          </a:lnRef>
+          <a:fillRef idx="0">
+            <a:schemeClr val="accent1"/>
+          </a:fillRef>
+          <a:effectRef idx="1">
+            <a:schemeClr val="accent1"/>
+          </a:effectRef>
+          <a:fontRef idx="minor">
+            <a:schemeClr val="tx1"/>
+          </a:fontRef>
+        </p:style>
+      </p:cxnSp>
+      <p:cxnSp>
+        <p:nvCxnSpPr>
+          <p:cNvPr id="34" name="Straight Arrow Connector 33"/>
+          <p:cNvCxnSpPr/>
+          <p:nvPr/>
+        </p:nvCxnSpPr>
+        <p:spPr>
+          <a:xfrm>
+            <a:off x="2143495" y="1643171"/>
+            <a:ext cx="704971" cy="0"/>
+          </a:xfrm>
+          <a:prstGeom prst="straightConnector1">
+            <a:avLst/>
+          </a:prstGeom>
+          <a:ln>
+            <a:solidFill>
+              <a:srgbClr val="595959"/>
+            </a:solidFill>
+            <a:tailEnd type="arrow"/>
+          </a:ln>
+          <a:effectLst/>
+        </p:spPr>
+        <p:style>
+          <a:lnRef idx="2">
+            <a:schemeClr val="accent1"/>
+          </a:lnRef>
+          <a:fillRef idx="0">
+            <a:schemeClr val="accent1"/>
+          </a:fillRef>
+          <a:effectRef idx="1">
+            <a:schemeClr val="accent1"/>
+          </a:effectRef>
+          <a:fontRef idx="minor">
+            <a:schemeClr val="tx1"/>
+          </a:fontRef>
+        </p:style>
+      </p:cxnSp>
+      <p:cxnSp>
+        <p:nvCxnSpPr>
+          <p:cNvPr id="35" name="Straight Arrow Connector 34"/>
+          <p:cNvCxnSpPr/>
+          <p:nvPr/>
+        </p:nvCxnSpPr>
+        <p:spPr>
+          <a:xfrm>
+            <a:off x="2143495" y="1849235"/>
+            <a:ext cx="704971" cy="0"/>
+          </a:xfrm>
+          <a:prstGeom prst="straightConnector1">
+            <a:avLst/>
+          </a:prstGeom>
+          <a:ln>
+            <a:solidFill>
+              <a:srgbClr val="595959"/>
+            </a:solidFill>
+            <a:tailEnd type="arrow"/>
+          </a:ln>
+          <a:effectLst/>
+        </p:spPr>
+        <p:style>
+          <a:lnRef idx="2">
+            <a:schemeClr val="accent1"/>
+          </a:lnRef>
+          <a:fillRef idx="0">
+            <a:schemeClr val="accent1"/>
+          </a:fillRef>
+          <a:effectRef idx="1">
+            <a:schemeClr val="accent1"/>
+          </a:effectRef>
+          <a:fontRef idx="minor">
+            <a:schemeClr val="tx1"/>
+          </a:fontRef>
+        </p:style>
+      </p:cxnSp>
+      <p:sp>
+        <p:nvSpPr>
+          <p:cNvPr id="37" name="TextBox 36"/>
+          <p:cNvSpPr txBox="1"/>
+          <p:nvPr/>
+        </p:nvSpPr>
+        <p:spPr>
+          <a:xfrm>
+            <a:off x="6000330" y="2437353"/>
+            <a:ext cx="2069797" cy="461665"/>
+          </a:xfrm>
+          <a:prstGeom prst="rect">
+            <a:avLst/>
+          </a:prstGeom>
+          <a:noFill/>
+        </p:spPr>
+        <p:txBody>
+          <a:bodyPr wrap="none" rtlCol="0">
+            <a:spAutoFit/>
+          </a:bodyPr>
+          <a:lstStyle/>
+          <a:p>
+            <a:r>
+              <a:rPr lang="en-US" sz="2400" cap="small" dirty="0" err="1" smtClean="0">
+                <a:latin typeface="Palatino"/>
+                <a:cs typeface="Palatino"/>
+              </a:rPr>
+              <a:t>DeepCleanse</a:t>
+            </a:r>
+            <a:endParaRPr lang="en-US" sz="2400" cap="small" dirty="0" smtClean="0">
+              <a:latin typeface="Palatino"/>
+              <a:cs typeface="Palatino"/>
+            </a:endParaRPr>
+          </a:p>
+        </p:txBody>
+      </p:sp>
+      <p:sp>
+        <p:nvSpPr>
+          <p:cNvPr id="40" name="TextBox 39"/>
+          <p:cNvSpPr txBox="1"/>
+          <p:nvPr/>
+        </p:nvSpPr>
+        <p:spPr>
+          <a:xfrm>
+            <a:off x="3262302" y="4344620"/>
+            <a:ext cx="1960332" cy="830997"/>
+          </a:xfrm>
+          <a:prstGeom prst="rect">
+            <a:avLst/>
+          </a:prstGeom>
+          <a:solidFill>
+            <a:schemeClr val="bg1">
+              <a:lumMod val="95000"/>
+            </a:schemeClr>
+          </a:solidFill>
+          <a:ln>
+            <a:solidFill>
+              <a:srgbClr val="595959"/>
+            </a:solidFill>
+          </a:ln>
+        </p:spPr>
+        <p:txBody>
+          <a:bodyPr wrap="square" rtlCol="0">
+            <a:spAutoFit/>
+          </a:bodyPr>
+          <a:lstStyle/>
+          <a:p>
+            <a:pPr algn="ctr"/>
+            <a:r>
+              <a:rPr lang="en-US" sz="2400" dirty="0" smtClean="0">
+                <a:latin typeface="Palatino"/>
+                <a:cs typeface="Palatino"/>
+              </a:rPr>
+              <a:t>MIP transform</a:t>
+            </a:r>
+          </a:p>
+        </p:txBody>
+      </p:sp>
+      <p:sp>
+        <p:nvSpPr>
+          <p:cNvPr id="41" name="TextBox 40"/>
+          <p:cNvSpPr txBox="1"/>
+          <p:nvPr/>
+        </p:nvSpPr>
+        <p:spPr>
+          <a:xfrm>
+            <a:off x="3262302" y="3111038"/>
+            <a:ext cx="1960332" cy="830997"/>
+          </a:xfrm>
+          <a:prstGeom prst="rect">
+            <a:avLst/>
+          </a:prstGeom>
+          <a:solidFill>
+            <a:schemeClr val="bg1">
+              <a:lumMod val="95000"/>
+            </a:schemeClr>
+          </a:solidFill>
+          <a:ln>
+            <a:solidFill>
+              <a:srgbClr val="595959"/>
+            </a:solidFill>
+          </a:ln>
+        </p:spPr>
+        <p:txBody>
+          <a:bodyPr wrap="square" rtlCol="0">
+            <a:spAutoFit/>
+          </a:bodyPr>
+          <a:lstStyle/>
+          <a:p>
+            <a:pPr algn="ctr"/>
+            <a:r>
+              <a:rPr lang="en-US" sz="2400" dirty="0" smtClean="0">
+                <a:latin typeface="Palatino"/>
+                <a:cs typeface="Palatino"/>
+              </a:rPr>
+              <a:t>density filtering</a:t>
+            </a:r>
+          </a:p>
+        </p:txBody>
+      </p:sp>
+      <p:sp>
+        <p:nvSpPr>
+          <p:cNvPr id="42" name="TextBox 41"/>
+          <p:cNvSpPr txBox="1"/>
+          <p:nvPr/>
+        </p:nvSpPr>
+        <p:spPr>
+          <a:xfrm>
+            <a:off x="5871635" y="3580255"/>
+            <a:ext cx="1960332" cy="830997"/>
+          </a:xfrm>
+          <a:prstGeom prst="rect">
+            <a:avLst/>
+          </a:prstGeom>
+          <a:solidFill>
+            <a:schemeClr val="bg1"/>
+          </a:solidFill>
+          <a:ln>
+            <a:solidFill>
+              <a:srgbClr val="595959"/>
+            </a:solidFill>
+          </a:ln>
+        </p:spPr>
+        <p:txBody>
+          <a:bodyPr wrap="square" rtlCol="0">
+            <a:spAutoFit/>
+          </a:bodyPr>
+          <a:lstStyle/>
+          <a:p>
+            <a:pPr algn="ctr"/>
+            <a:r>
+              <a:rPr lang="en-US" sz="2400" dirty="0" smtClean="0">
+                <a:latin typeface="Palatino"/>
+                <a:cs typeface="Palatino"/>
+              </a:rPr>
+              <a:t>provenance filtering</a:t>
+            </a:r>
+          </a:p>
+        </p:txBody>
+      </p:sp>
+      <p:sp>
+        <p:nvSpPr>
+          <p:cNvPr id="43" name="TextBox 42"/>
+          <p:cNvSpPr txBox="1"/>
+          <p:nvPr/>
+        </p:nvSpPr>
+        <p:spPr>
+          <a:xfrm>
+            <a:off x="5871635" y="4585245"/>
+            <a:ext cx="1960332" cy="830997"/>
+          </a:xfrm>
+          <a:prstGeom prst="rect">
+            <a:avLst/>
+          </a:prstGeom>
+          <a:solidFill>
+            <a:schemeClr val="bg1"/>
+          </a:solidFill>
+          <a:ln>
+            <a:solidFill>
+              <a:srgbClr val="595959"/>
+            </a:solidFill>
+          </a:ln>
+        </p:spPr>
+        <p:txBody>
+          <a:bodyPr wrap="square" rtlCol="0">
+            <a:spAutoFit/>
+          </a:bodyPr>
+          <a:lstStyle/>
+          <a:p>
+            <a:pPr algn="ctr"/>
+            <a:r>
+              <a:rPr lang="en-US" sz="2400" dirty="0" smtClean="0">
+                <a:latin typeface="Palatino"/>
+                <a:cs typeface="Palatino"/>
+              </a:rPr>
+              <a:t>step-by-step rollback</a:t>
+            </a:r>
+          </a:p>
+        </p:txBody>
+      </p:sp>
+      <p:cxnSp>
+        <p:nvCxnSpPr>
+          <p:cNvPr id="45" name="Straight Arrow Connector 44"/>
+          <p:cNvCxnSpPr>
+            <a:stCxn id="41" idx="2"/>
+            <a:endCxn id="40" idx="0"/>
+          </p:cNvCxnSpPr>
+          <p:nvPr/>
+        </p:nvCxnSpPr>
+        <p:spPr>
+          <a:xfrm>
+            <a:off x="4242468" y="3942035"/>
+            <a:ext cx="0" cy="402585"/>
+          </a:xfrm>
+          <a:prstGeom prst="straightConnector1">
+            <a:avLst/>
+          </a:prstGeom>
+          <a:ln>
+            <a:solidFill>
+              <a:schemeClr val="bg1">
+                <a:lumMod val="50000"/>
+              </a:schemeClr>
+            </a:solidFill>
+            <a:tailEnd type="arrow"/>
+          </a:ln>
+          <a:effectLst/>
+        </p:spPr>
+        <p:style>
+          <a:lnRef idx="2">
+            <a:schemeClr val="accent1"/>
+          </a:lnRef>
+          <a:fillRef idx="0">
+            <a:schemeClr val="accent1"/>
+          </a:fillRef>
+          <a:effectRef idx="1">
+            <a:schemeClr val="accent1"/>
+          </a:effectRef>
+          <a:fontRef idx="minor">
+            <a:schemeClr val="tx1"/>
+          </a:fontRef>
+        </p:style>
+      </p:cxnSp>
+      <p:cxnSp>
+        <p:nvCxnSpPr>
+          <p:cNvPr id="49" name="Straight Arrow Connector 48"/>
+          <p:cNvCxnSpPr>
+            <a:stCxn id="40" idx="3"/>
+          </p:cNvCxnSpPr>
+          <p:nvPr/>
+        </p:nvCxnSpPr>
+        <p:spPr>
+          <a:xfrm flipV="1">
+            <a:off x="5222634" y="4758338"/>
+            <a:ext cx="414575" cy="1781"/>
+          </a:xfrm>
+          <a:prstGeom prst="straightConnector1">
+            <a:avLst/>
+          </a:prstGeom>
+          <a:ln>
+            <a:solidFill>
+              <a:schemeClr val="bg1">
+                <a:lumMod val="50000"/>
+              </a:schemeClr>
+            </a:solidFill>
+            <a:tailEnd type="arrow"/>
+          </a:ln>
+          <a:effectLst/>
+        </p:spPr>
+        <p:style>
+          <a:lnRef idx="2">
+            <a:schemeClr val="accent1"/>
+          </a:lnRef>
+          <a:fillRef idx="0">
+            <a:schemeClr val="accent1"/>
+          </a:fillRef>
+          <a:effectRef idx="1">
+            <a:schemeClr val="accent1"/>
+          </a:effectRef>
+          <a:fontRef idx="minor">
+            <a:schemeClr val="tx1"/>
+          </a:fontRef>
+        </p:style>
+      </p:cxnSp>
+      <p:sp>
+        <p:nvSpPr>
+          <p:cNvPr id="53" name="TextBox 52"/>
+          <p:cNvSpPr txBox="1"/>
+          <p:nvPr/>
+        </p:nvSpPr>
+        <p:spPr>
+          <a:xfrm>
+            <a:off x="6031821" y="621583"/>
+            <a:ext cx="2003824" cy="830997"/>
+          </a:xfrm>
+          <a:prstGeom prst="rect">
+            <a:avLst/>
+          </a:prstGeom>
+          <a:noFill/>
+        </p:spPr>
+        <p:txBody>
+          <a:bodyPr wrap="none" rtlCol="0">
+            <a:spAutoFit/>
+          </a:bodyPr>
+          <a:lstStyle/>
+          <a:p>
+            <a:pPr algn="ctr"/>
+            <a:r>
+              <a:rPr lang="en-US" sz="2400" dirty="0" smtClean="0">
+                <a:latin typeface="Palatino"/>
+                <a:cs typeface="Palatino"/>
+              </a:rPr>
+              <a:t>diagnoses</a:t>
+            </a:r>
+          </a:p>
+          <a:p>
+            <a:pPr algn="ctr"/>
+            <a:r>
+              <a:rPr lang="en-US" sz="2400" dirty="0" smtClean="0">
+                <a:latin typeface="Palatino"/>
+                <a:cs typeface="Palatino"/>
+              </a:rPr>
+              <a:t>query repairs</a:t>
+            </a:r>
+          </a:p>
+        </p:txBody>
+      </p:sp>
+      <p:sp>
+        <p:nvSpPr>
+          <p:cNvPr id="47" name="TextBox 46"/>
+          <p:cNvSpPr txBox="1"/>
+          <p:nvPr/>
+        </p:nvSpPr>
+        <p:spPr>
+          <a:xfrm>
+            <a:off x="6554592" y="2976212"/>
+            <a:ext cx="1511802" cy="461665"/>
+          </a:xfrm>
+          <a:prstGeom prst="rect">
+            <a:avLst/>
+          </a:prstGeom>
+          <a:noFill/>
+        </p:spPr>
+        <p:txBody>
+          <a:bodyPr wrap="none" rtlCol="0">
+            <a:spAutoFit/>
+          </a:bodyPr>
+          <a:lstStyle/>
+          <a:p>
+            <a:r>
+              <a:rPr lang="en-US" sz="2400" dirty="0" smtClean="0">
+                <a:solidFill>
+                  <a:srgbClr val="595959"/>
+                </a:solidFill>
+                <a:latin typeface="Palatino"/>
+                <a:cs typeface="Palatino"/>
+              </a:rPr>
+              <a:t>optimizer</a:t>
+            </a:r>
+          </a:p>
+        </p:txBody>
+      </p:sp>
+    </p:spTree>
+    <p:extLst>
+      <p:ext uri="{BB962C8B-B14F-4D97-AF65-F5344CB8AC3E}">
+        <p14:creationId xmlns:p14="http://schemas.microsoft.com/office/powerpoint/2010/main" val="1214605595"/>
+      </p:ext>
+    </p:extLst>
+  </p:cSld>
+  <p:clrMapOvr>
+    <a:masterClrMapping/>
+  </p:clrMapOvr>
 </p:sld>
 </file>
 

</xml_diff>

<commit_message>
writeup on restricting number of queries fixed
</commit_message>
<xml_diff>
--- a/docs/vldb15/figures/figs.pptx
+++ b/docs/vldb15/figures/figs.pptx
@@ -8,6 +8,7 @@
     <p:sldId id="256" r:id="rId2"/>
     <p:sldId id="257" r:id="rId3"/>
     <p:sldId id="258" r:id="rId4"/>
+    <p:sldId id="259" r:id="rId5"/>
   </p:sldIdLst>
   <p:sldSz cx="9144000" cy="6858000" type="screen4x3"/>
   <p:notesSz cx="6858000" cy="9144000"/>
@@ -290,7 +291,7 @@
           <a:p>
             <a:fld id="{E53DFF73-D480-144E-A535-5E58F29F2980}" type="datetimeFigureOut">
               <a:rPr lang="en-US" smtClean="0"/>
-              <a:t>2/23/15</a:t>
+              <a:t>2/25/15</a:t>
             </a:fld>
             <a:endParaRPr lang="en-US"/>
           </a:p>
@@ -460,7 +461,7 @@
           <a:p>
             <a:fld id="{E53DFF73-D480-144E-A535-5E58F29F2980}" type="datetimeFigureOut">
               <a:rPr lang="en-US" smtClean="0"/>
-              <a:t>2/23/15</a:t>
+              <a:t>2/25/15</a:t>
             </a:fld>
             <a:endParaRPr lang="en-US"/>
           </a:p>
@@ -640,7 +641,7 @@
           <a:p>
             <a:fld id="{E53DFF73-D480-144E-A535-5E58F29F2980}" type="datetimeFigureOut">
               <a:rPr lang="en-US" smtClean="0"/>
-              <a:t>2/23/15</a:t>
+              <a:t>2/25/15</a:t>
             </a:fld>
             <a:endParaRPr lang="en-US"/>
           </a:p>
@@ -810,7 +811,7 @@
           <a:p>
             <a:fld id="{E53DFF73-D480-144E-A535-5E58F29F2980}" type="datetimeFigureOut">
               <a:rPr lang="en-US" smtClean="0"/>
-              <a:t>2/23/15</a:t>
+              <a:t>2/25/15</a:t>
             </a:fld>
             <a:endParaRPr lang="en-US"/>
           </a:p>
@@ -1056,7 +1057,7 @@
           <a:p>
             <a:fld id="{E53DFF73-D480-144E-A535-5E58F29F2980}" type="datetimeFigureOut">
               <a:rPr lang="en-US" smtClean="0"/>
-              <a:t>2/23/15</a:t>
+              <a:t>2/25/15</a:t>
             </a:fld>
             <a:endParaRPr lang="en-US"/>
           </a:p>
@@ -1344,7 +1345,7 @@
           <a:p>
             <a:fld id="{E53DFF73-D480-144E-A535-5E58F29F2980}" type="datetimeFigureOut">
               <a:rPr lang="en-US" smtClean="0"/>
-              <a:t>2/23/15</a:t>
+              <a:t>2/25/15</a:t>
             </a:fld>
             <a:endParaRPr lang="en-US"/>
           </a:p>
@@ -1766,7 +1767,7 @@
           <a:p>
             <a:fld id="{E53DFF73-D480-144E-A535-5E58F29F2980}" type="datetimeFigureOut">
               <a:rPr lang="en-US" smtClean="0"/>
-              <a:t>2/23/15</a:t>
+              <a:t>2/25/15</a:t>
             </a:fld>
             <a:endParaRPr lang="en-US"/>
           </a:p>
@@ -1884,7 +1885,7 @@
           <a:p>
             <a:fld id="{E53DFF73-D480-144E-A535-5E58F29F2980}" type="datetimeFigureOut">
               <a:rPr lang="en-US" smtClean="0"/>
-              <a:t>2/23/15</a:t>
+              <a:t>2/25/15</a:t>
             </a:fld>
             <a:endParaRPr lang="en-US"/>
           </a:p>
@@ -1979,7 +1980,7 @@
           <a:p>
             <a:fld id="{E53DFF73-D480-144E-A535-5E58F29F2980}" type="datetimeFigureOut">
               <a:rPr lang="en-US" smtClean="0"/>
-              <a:t>2/23/15</a:t>
+              <a:t>2/25/15</a:t>
             </a:fld>
             <a:endParaRPr lang="en-US"/>
           </a:p>
@@ -2256,7 +2257,7 @@
           <a:p>
             <a:fld id="{E53DFF73-D480-144E-A535-5E58F29F2980}" type="datetimeFigureOut">
               <a:rPr lang="en-US" smtClean="0"/>
-              <a:t>2/23/15</a:t>
+              <a:t>2/25/15</a:t>
             </a:fld>
             <a:endParaRPr lang="en-US"/>
           </a:p>
@@ -2509,7 +2510,7 @@
           <a:p>
             <a:fld id="{E53DFF73-D480-144E-A535-5E58F29F2980}" type="datetimeFigureOut">
               <a:rPr lang="en-US" smtClean="0"/>
-              <a:t>2/23/15</a:t>
+              <a:t>2/25/15</a:t>
             </a:fld>
             <a:endParaRPr lang="en-US"/>
           </a:p>
@@ -2722,7 +2723,7 @@
           <a:p>
             <a:fld id="{E53DFF73-D480-144E-A535-5E58F29F2980}" type="datetimeFigureOut">
               <a:rPr lang="en-US" smtClean="0"/>
-              <a:t>2/23/15</a:t>
+              <a:t>2/25/15</a:t>
             </a:fld>
             <a:endParaRPr lang="en-US"/>
           </a:p>
@@ -6659,6 +6660,2389 @@
     <p:extLst>
       <p:ext uri="{BB962C8B-B14F-4D97-AF65-F5344CB8AC3E}">
         <p14:creationId xmlns:p14="http://schemas.microsoft.com/office/powerpoint/2010/main" val="1214605595"/>
+      </p:ext>
+    </p:extLst>
+  </p:cSld>
+  <p:clrMapOvr>
+    <a:masterClrMapping/>
+  </p:clrMapOvr>
+</p:sld>
+</file>
+
+<file path=ppt/slides/slide4.xml><?xml version="1.0" encoding="utf-8"?>
+<p:sld xmlns:a="http://schemas.openxmlformats.org/drawingml/2006/main" xmlns:r="http://schemas.openxmlformats.org/officeDocument/2006/relationships" xmlns:p="http://schemas.openxmlformats.org/presentationml/2006/main">
+  <p:cSld>
+    <p:spTree>
+      <p:nvGrpSpPr>
+        <p:cNvPr id="1" name=""/>
+        <p:cNvGrpSpPr/>
+        <p:nvPr/>
+      </p:nvGrpSpPr>
+      <p:grpSpPr>
+        <a:xfrm>
+          <a:off x="0" y="0"/>
+          <a:ext cx="0" cy="0"/>
+          <a:chOff x="0" y="0"/>
+          <a:chExt cx="0" cy="0"/>
+        </a:xfrm>
+      </p:grpSpPr>
+      <p:sp>
+        <p:nvSpPr>
+          <p:cNvPr id="52" name="Down Arrow 51"/>
+          <p:cNvSpPr/>
+          <p:nvPr/>
+        </p:nvSpPr>
+        <p:spPr>
+          <a:xfrm rot="10800000">
+            <a:off x="6067867" y="1481419"/>
+            <a:ext cx="1914120" cy="957293"/>
+          </a:xfrm>
+          <a:prstGeom prst="downArrow">
+            <a:avLst>
+              <a:gd name="adj1" fmla="val 63385"/>
+              <a:gd name="adj2" fmla="val 50000"/>
+            </a:avLst>
+          </a:prstGeom>
+          <a:solidFill>
+            <a:srgbClr val="FFFFFF"/>
+          </a:solidFill>
+          <a:ln>
+            <a:solidFill>
+              <a:srgbClr val="595959"/>
+            </a:solidFill>
+            <a:prstDash val="solid"/>
+          </a:ln>
+          <a:effectLst/>
+        </p:spPr>
+        <p:style>
+          <a:lnRef idx="1">
+            <a:schemeClr val="accent1"/>
+          </a:lnRef>
+          <a:fillRef idx="3">
+            <a:schemeClr val="accent1"/>
+          </a:fillRef>
+          <a:effectRef idx="2">
+            <a:schemeClr val="accent1"/>
+          </a:effectRef>
+          <a:fontRef idx="minor">
+            <a:schemeClr val="lt1"/>
+          </a:fontRef>
+        </p:style>
+        <p:txBody>
+          <a:bodyPr rtlCol="0" anchor="ctr"/>
+          <a:lstStyle/>
+          <a:p>
+            <a:pPr algn="ctr"/>
+            <a:endParaRPr lang="en-US"/>
+          </a:p>
+        </p:txBody>
+      </p:sp>
+      <p:sp>
+        <p:nvSpPr>
+          <p:cNvPr id="50" name="Rounded Rectangle 49"/>
+          <p:cNvSpPr/>
+          <p:nvPr/>
+        </p:nvSpPr>
+        <p:spPr>
+          <a:xfrm>
+            <a:off x="3067530" y="2413169"/>
+            <a:ext cx="5063801" cy="3305206"/>
+          </a:xfrm>
+          <a:custGeom>
+            <a:avLst/>
+            <a:gdLst/>
+            <a:ahLst/>
+            <a:cxnLst/>
+            <a:rect l="l" t="t" r="r" b="b"/>
+            <a:pathLst>
+              <a:path w="5137259" h="3305206">
+                <a:moveTo>
+                  <a:pt x="3088825" y="0"/>
+                </a:moveTo>
+                <a:lnTo>
+                  <a:pt x="4924404" y="0"/>
+                </a:lnTo>
+                <a:cubicBezTo>
+                  <a:pt x="5041961" y="0"/>
+                  <a:pt x="5137259" y="95298"/>
+                  <a:pt x="5137259" y="212855"/>
+                </a:cubicBezTo>
+                <a:lnTo>
+                  <a:pt x="5137259" y="754941"/>
+                </a:lnTo>
+                <a:lnTo>
+                  <a:pt x="5137259" y="2602411"/>
+                </a:lnTo>
+                <a:lnTo>
+                  <a:pt x="5137259" y="3040205"/>
+                </a:lnTo>
+                <a:cubicBezTo>
+                  <a:pt x="5137259" y="3186561"/>
+                  <a:pt x="5018614" y="3305206"/>
+                  <a:pt x="4872258" y="3305206"/>
+                </a:cubicBezTo>
+                <a:lnTo>
+                  <a:pt x="265001" y="3305206"/>
+                </a:lnTo>
+                <a:cubicBezTo>
+                  <a:pt x="118645" y="3305206"/>
+                  <a:pt x="0" y="3186561"/>
+                  <a:pt x="0" y="3040205"/>
+                </a:cubicBezTo>
+                <a:lnTo>
+                  <a:pt x="0" y="754941"/>
+                </a:lnTo>
+                <a:cubicBezTo>
+                  <a:pt x="0" y="608585"/>
+                  <a:pt x="118645" y="489940"/>
+                  <a:pt x="265001" y="489940"/>
+                </a:cubicBezTo>
+                <a:lnTo>
+                  <a:pt x="2875970" y="489940"/>
+                </a:lnTo>
+                <a:lnTo>
+                  <a:pt x="2875970" y="212855"/>
+                </a:lnTo>
+                <a:cubicBezTo>
+                  <a:pt x="2875970" y="95298"/>
+                  <a:pt x="2971268" y="0"/>
+                  <a:pt x="3088825" y="0"/>
+                </a:cubicBezTo>
+                <a:close/>
+              </a:path>
+            </a:pathLst>
+          </a:custGeom>
+          <a:solidFill>
+            <a:srgbClr val="FFFFFF"/>
+          </a:solidFill>
+          <a:ln>
+            <a:solidFill>
+              <a:srgbClr val="595959"/>
+            </a:solidFill>
+            <a:prstDash val="sysDash"/>
+          </a:ln>
+          <a:effectLst/>
+        </p:spPr>
+        <p:style>
+          <a:lnRef idx="1">
+            <a:schemeClr val="accent1"/>
+          </a:lnRef>
+          <a:fillRef idx="3">
+            <a:schemeClr val="accent1"/>
+          </a:fillRef>
+          <a:effectRef idx="2">
+            <a:schemeClr val="accent1"/>
+          </a:effectRef>
+          <a:fontRef idx="minor">
+            <a:schemeClr val="lt1"/>
+          </a:fontRef>
+        </p:style>
+        <p:txBody>
+          <a:bodyPr rtlCol="0" anchor="ctr"/>
+          <a:lstStyle/>
+          <a:p>
+            <a:pPr algn="ctr"/>
+            <a:endParaRPr lang="en-US"/>
+          </a:p>
+        </p:txBody>
+      </p:sp>
+      <p:sp>
+        <p:nvSpPr>
+          <p:cNvPr id="54" name="Rounded Rectangle 53"/>
+          <p:cNvSpPr/>
+          <p:nvPr/>
+        </p:nvSpPr>
+        <p:spPr>
+          <a:xfrm>
+            <a:off x="5637209" y="2955192"/>
+            <a:ext cx="2429185" cy="2673836"/>
+          </a:xfrm>
+          <a:custGeom>
+            <a:avLst/>
+            <a:gdLst/>
+            <a:ahLst/>
+            <a:cxnLst/>
+            <a:rect l="l" t="t" r="r" b="b"/>
+            <a:pathLst>
+              <a:path w="2429185" h="2673836">
+                <a:moveTo>
+                  <a:pt x="1027397" y="0"/>
+                </a:moveTo>
+                <a:lnTo>
+                  <a:pt x="2319171" y="0"/>
+                </a:lnTo>
+                <a:cubicBezTo>
+                  <a:pt x="2379930" y="0"/>
+                  <a:pt x="2429185" y="49255"/>
+                  <a:pt x="2429185" y="110014"/>
+                </a:cubicBezTo>
+                <a:lnTo>
+                  <a:pt x="2429185" y="625549"/>
+                </a:lnTo>
+                <a:lnTo>
+                  <a:pt x="2429185" y="1493214"/>
+                </a:lnTo>
+                <a:lnTo>
+                  <a:pt x="2429185" y="2513084"/>
+                </a:lnTo>
+                <a:cubicBezTo>
+                  <a:pt x="2429185" y="2601865"/>
+                  <a:pt x="2357214" y="2673836"/>
+                  <a:pt x="2268433" y="2673836"/>
+                </a:cubicBezTo>
+                <a:lnTo>
+                  <a:pt x="160752" y="2673836"/>
+                </a:lnTo>
+                <a:cubicBezTo>
+                  <a:pt x="71971" y="2673836"/>
+                  <a:pt x="0" y="2601865"/>
+                  <a:pt x="0" y="2513084"/>
+                </a:cubicBezTo>
+                <a:lnTo>
+                  <a:pt x="0" y="625549"/>
+                </a:lnTo>
+                <a:cubicBezTo>
+                  <a:pt x="0" y="536768"/>
+                  <a:pt x="71971" y="464797"/>
+                  <a:pt x="160752" y="464797"/>
+                </a:cubicBezTo>
+                <a:lnTo>
+                  <a:pt x="917383" y="464797"/>
+                </a:lnTo>
+                <a:lnTo>
+                  <a:pt x="917383" y="110014"/>
+                </a:lnTo>
+                <a:cubicBezTo>
+                  <a:pt x="917383" y="49255"/>
+                  <a:pt x="966638" y="0"/>
+                  <a:pt x="1027397" y="0"/>
+                </a:cubicBezTo>
+                <a:close/>
+              </a:path>
+            </a:pathLst>
+          </a:custGeom>
+          <a:solidFill>
+            <a:schemeClr val="bg1">
+              <a:lumMod val="95000"/>
+            </a:schemeClr>
+          </a:solidFill>
+          <a:ln>
+            <a:solidFill>
+              <a:srgbClr val="595959"/>
+            </a:solidFill>
+            <a:prstDash val="sysDash"/>
+          </a:ln>
+          <a:effectLst/>
+        </p:spPr>
+        <p:style>
+          <a:lnRef idx="1">
+            <a:schemeClr val="accent1"/>
+          </a:lnRef>
+          <a:fillRef idx="3">
+            <a:schemeClr val="accent1"/>
+          </a:fillRef>
+          <a:effectRef idx="2">
+            <a:schemeClr val="accent1"/>
+          </a:effectRef>
+          <a:fontRef idx="minor">
+            <a:schemeClr val="lt1"/>
+          </a:fontRef>
+        </p:style>
+        <p:txBody>
+          <a:bodyPr rtlCol="0" anchor="ctr"/>
+          <a:lstStyle/>
+          <a:p>
+            <a:pPr algn="ctr"/>
+            <a:endParaRPr lang="en-US"/>
+          </a:p>
+        </p:txBody>
+      </p:sp>
+      <p:sp>
+        <p:nvSpPr>
+          <p:cNvPr id="39" name="Down Arrow 38"/>
+          <p:cNvSpPr/>
+          <p:nvPr/>
+        </p:nvSpPr>
+        <p:spPr>
+          <a:xfrm rot="16200000">
+            <a:off x="1826597" y="4281472"/>
+            <a:ext cx="1914120" cy="957293"/>
+          </a:xfrm>
+          <a:prstGeom prst="downArrow">
+            <a:avLst>
+              <a:gd name="adj1" fmla="val 63385"/>
+              <a:gd name="adj2" fmla="val 50000"/>
+            </a:avLst>
+          </a:prstGeom>
+          <a:solidFill>
+            <a:srgbClr val="FFFFFF"/>
+          </a:solidFill>
+          <a:ln>
+            <a:solidFill>
+              <a:srgbClr val="595959"/>
+            </a:solidFill>
+            <a:prstDash val="solid"/>
+          </a:ln>
+          <a:effectLst/>
+        </p:spPr>
+        <p:style>
+          <a:lnRef idx="1">
+            <a:schemeClr val="accent1"/>
+          </a:lnRef>
+          <a:fillRef idx="3">
+            <a:schemeClr val="accent1"/>
+          </a:fillRef>
+          <a:effectRef idx="2">
+            <a:schemeClr val="accent1"/>
+          </a:effectRef>
+          <a:fontRef idx="minor">
+            <a:schemeClr val="lt1"/>
+          </a:fontRef>
+        </p:style>
+        <p:txBody>
+          <a:bodyPr rtlCol="0" anchor="ctr"/>
+          <a:lstStyle/>
+          <a:p>
+            <a:pPr algn="ctr"/>
+            <a:endParaRPr lang="en-US"/>
+          </a:p>
+        </p:txBody>
+      </p:sp>
+      <p:sp>
+        <p:nvSpPr>
+          <p:cNvPr id="38" name="Down Arrow 37"/>
+          <p:cNvSpPr/>
+          <p:nvPr/>
+        </p:nvSpPr>
+        <p:spPr>
+          <a:xfrm>
+            <a:off x="3039846" y="2164508"/>
+            <a:ext cx="2405245" cy="946530"/>
+          </a:xfrm>
+          <a:prstGeom prst="downArrow">
+            <a:avLst>
+              <a:gd name="adj1" fmla="val 63385"/>
+              <a:gd name="adj2" fmla="val 50000"/>
+            </a:avLst>
+          </a:prstGeom>
+          <a:solidFill>
+            <a:schemeClr val="bg1"/>
+          </a:solidFill>
+          <a:ln>
+            <a:solidFill>
+              <a:srgbClr val="595959"/>
+            </a:solidFill>
+            <a:prstDash val="solid"/>
+          </a:ln>
+          <a:effectLst/>
+        </p:spPr>
+        <p:style>
+          <a:lnRef idx="1">
+            <a:schemeClr val="accent1"/>
+          </a:lnRef>
+          <a:fillRef idx="3">
+            <a:schemeClr val="accent1"/>
+          </a:fillRef>
+          <a:effectRef idx="2">
+            <a:schemeClr val="accent1"/>
+          </a:effectRef>
+          <a:fontRef idx="minor">
+            <a:schemeClr val="lt1"/>
+          </a:fontRef>
+        </p:style>
+        <p:txBody>
+          <a:bodyPr rtlCol="0" anchor="ctr"/>
+          <a:lstStyle/>
+          <a:p>
+            <a:pPr algn="ctr"/>
+            <a:endParaRPr lang="en-US"/>
+          </a:p>
+        </p:txBody>
+      </p:sp>
+      <p:sp>
+        <p:nvSpPr>
+          <p:cNvPr id="5" name="Folded Corner 4"/>
+          <p:cNvSpPr/>
+          <p:nvPr/>
+        </p:nvSpPr>
+        <p:spPr>
+          <a:xfrm>
+            <a:off x="891367" y="3207045"/>
+            <a:ext cx="1438083" cy="2511330"/>
+          </a:xfrm>
+          <a:prstGeom prst="foldedCorner">
+            <a:avLst/>
+          </a:prstGeom>
+          <a:solidFill>
+            <a:schemeClr val="bg1"/>
+          </a:solidFill>
+          <a:ln>
+            <a:solidFill>
+              <a:schemeClr val="tx1">
+                <a:lumMod val="65000"/>
+                <a:lumOff val="35000"/>
+              </a:schemeClr>
+            </a:solidFill>
+          </a:ln>
+        </p:spPr>
+        <p:style>
+          <a:lnRef idx="1">
+            <a:schemeClr val="accent1"/>
+          </a:lnRef>
+          <a:fillRef idx="3">
+            <a:schemeClr val="accent1"/>
+          </a:fillRef>
+          <a:effectRef idx="2">
+            <a:schemeClr val="accent1"/>
+          </a:effectRef>
+          <a:fontRef idx="minor">
+            <a:schemeClr val="lt1"/>
+          </a:fontRef>
+        </p:style>
+        <p:txBody>
+          <a:bodyPr rtlCol="0" anchor="ctr"/>
+          <a:lstStyle/>
+          <a:p>
+            <a:pPr algn="ctr"/>
+            <a:endParaRPr lang="en-US"/>
+          </a:p>
+        </p:txBody>
+      </p:sp>
+      <p:sp>
+        <p:nvSpPr>
+          <p:cNvPr id="4" name="TextBox 3"/>
+          <p:cNvSpPr txBox="1"/>
+          <p:nvPr/>
+        </p:nvSpPr>
+        <p:spPr>
+          <a:xfrm>
+            <a:off x="891367" y="3635689"/>
+            <a:ext cx="1484152" cy="1977464"/>
+          </a:xfrm>
+          <a:prstGeom prst="rect">
+            <a:avLst/>
+          </a:prstGeom>
+          <a:noFill/>
+        </p:spPr>
+        <p:txBody>
+          <a:bodyPr wrap="square" rtlCol="0">
+            <a:spAutoFit/>
+          </a:bodyPr>
+          <a:lstStyle/>
+          <a:p>
+            <a:r>
+              <a:rPr lang="en-US" sz="350" dirty="0" smtClean="0">
+                <a:solidFill>
+                  <a:schemeClr val="tx1">
+                    <a:lumMod val="65000"/>
+                    <a:lumOff val="35000"/>
+                  </a:schemeClr>
+                </a:solidFill>
+                <a:latin typeface="Courier"/>
+                <a:cs typeface="Courier"/>
+              </a:rPr>
+              <a:t>UPDATE CUSTOMER SET C_BALANCE = C_BALANCE + ? WHERE C_ID = ? AND C_D_ID = ? AND C_W_ID = ? UPDATE CUSTOMER SET C_BALANCE = ?, C_YTD_PAYMENT = ?, C_PAYMENT_CNT = ?, C_DATA = ? WHERE C_W_ID = ? AND C_D_ID = ? AND C_ID = ?</a:t>
+            </a:r>
+          </a:p>
+          <a:p>
+            <a:r>
+              <a:rPr lang="en-US" sz="350" dirty="0" smtClean="0">
+                <a:solidFill>
+                  <a:schemeClr val="tx1">
+                    <a:lumMod val="65000"/>
+                    <a:lumOff val="35000"/>
+                  </a:schemeClr>
+                </a:solidFill>
+                <a:latin typeface="Courier"/>
+                <a:cs typeface="Courier"/>
+              </a:rPr>
+              <a:t>UPDATE WAREHOUSE SET W_YTD = W_YTD + ? WHERE W_ID = ? </a:t>
+            </a:r>
+          </a:p>
+          <a:p>
+            <a:r>
+              <a:rPr lang="en-US" sz="350" dirty="0" smtClean="0">
+                <a:solidFill>
+                  <a:schemeClr val="tx1">
+                    <a:lumMod val="65000"/>
+                    <a:lumOff val="35000"/>
+                  </a:schemeClr>
+                </a:solidFill>
+                <a:latin typeface="Courier"/>
+                <a:cs typeface="Courier"/>
+              </a:rPr>
+              <a:t>UPDATE ORDERS SET O_CARRIER_ID = ? WHERE O_ID = ? AND O_D_ID = ? AND O_W_ID = ?</a:t>
+            </a:r>
+          </a:p>
+          <a:p>
+            <a:r>
+              <a:rPr lang="en-US" sz="350" dirty="0" smtClean="0">
+                <a:solidFill>
+                  <a:schemeClr val="tx1">
+                    <a:lumMod val="65000"/>
+                    <a:lumOff val="35000"/>
+                  </a:schemeClr>
+                </a:solidFill>
+                <a:latin typeface="Courier"/>
+                <a:cs typeface="Courier"/>
+              </a:rPr>
+              <a:t>UPDATE CUSTOMER SET C_BALANCE = ?, C_YTD_PAYMENT = ?, C_PAYMENT_CNT = ? WHERE C_W_ID = ? AND C_D_ID = ? AND C_ID = ?</a:t>
+            </a:r>
+          </a:p>
+          <a:p>
+            <a:r>
+              <a:rPr lang="en-US" sz="350" dirty="0" smtClean="0">
+                <a:solidFill>
+                  <a:schemeClr val="tx1">
+                    <a:lumMod val="65000"/>
+                    <a:lumOff val="35000"/>
+                  </a:schemeClr>
+                </a:solidFill>
+                <a:latin typeface="Courier"/>
+                <a:cs typeface="Courier"/>
+              </a:rPr>
+              <a:t>INSERT INTO NEW_ORDER (NO_O_ID, NO_D_ID, NO_W_ID) VALUES (?, ?, ?)</a:t>
+            </a:r>
+          </a:p>
+          <a:p>
+            <a:r>
+              <a:rPr lang="en-US" sz="350" dirty="0" smtClean="0">
+                <a:solidFill>
+                  <a:schemeClr val="tx1">
+                    <a:lumMod val="65000"/>
+                    <a:lumOff val="35000"/>
+                  </a:schemeClr>
+                </a:solidFill>
+                <a:latin typeface="Courier"/>
+                <a:cs typeface="Courier"/>
+              </a:rPr>
+              <a:t>UPDATE STOCK SET S_QUANTITY = ?, S_YTD = ?, S_ORDER_CNT = ?, S_REMOTE_CNT = ? WHERE S_I_ID = ? AND S_W_ID = ?</a:t>
+            </a:r>
+          </a:p>
+          <a:p>
+            <a:r>
+              <a:rPr lang="en-US" sz="350" dirty="0" smtClean="0">
+                <a:solidFill>
+                  <a:schemeClr val="tx1">
+                    <a:lumMod val="65000"/>
+                    <a:lumOff val="35000"/>
+                  </a:schemeClr>
+                </a:solidFill>
+                <a:latin typeface="Courier"/>
+                <a:cs typeface="Courier"/>
+              </a:rPr>
+              <a:t>UPDATE DISTRICT SET D_YTD = D_YTD + ? WHERE D_W_ID  = ? AND D_ID = ?</a:t>
+            </a:r>
+          </a:p>
+          <a:p>
+            <a:r>
+              <a:rPr lang="en-US" sz="350" dirty="0" smtClean="0">
+                <a:solidFill>
+                  <a:schemeClr val="tx1">
+                    <a:lumMod val="65000"/>
+                    <a:lumOff val="35000"/>
+                  </a:schemeClr>
+                </a:solidFill>
+                <a:latin typeface="Courier"/>
+                <a:cs typeface="Courier"/>
+              </a:rPr>
+              <a:t>UPDATE DISTRICT SET D_NEXT_O_ID = ? WHERE D_ID = ? AND D_W_ID = ?</a:t>
+            </a:r>
+          </a:p>
+          <a:p>
+            <a:r>
+              <a:rPr lang="en-US" sz="350" dirty="0" smtClean="0">
+                <a:solidFill>
+                  <a:schemeClr val="tx1">
+                    <a:lumMod val="65000"/>
+                    <a:lumOff val="35000"/>
+                  </a:schemeClr>
+                </a:solidFill>
+                <a:latin typeface="Courier"/>
+                <a:cs typeface="Courier"/>
+              </a:rPr>
+              <a:t>INSERT INTO HISTORY VALUES (?, ?, ?, ?, ?, ?, ?, ?)</a:t>
+            </a:r>
+          </a:p>
+          <a:p>
+            <a:r>
+              <a:rPr lang="en-US" sz="350" dirty="0" smtClean="0">
+                <a:solidFill>
+                  <a:schemeClr val="tx1">
+                    <a:lumMod val="65000"/>
+                    <a:lumOff val="35000"/>
+                  </a:schemeClr>
+                </a:solidFill>
+                <a:latin typeface="Courier"/>
+                <a:cs typeface="Courier"/>
+              </a:rPr>
+              <a:t>INSERT INTO ORDERS (O_ID, O_D_ID, O_W_ID, O_C_ID, O_ENTRY_D, O_CARRIER_ID, O_OL_CNT, O_ALL_LOCAL) VALUES (?, ?, ?, ?, ?, ?, ?, ?)</a:t>
+            </a:r>
+          </a:p>
+          <a:p>
+            <a:r>
+              <a:rPr lang="en-US" sz="350" dirty="0" smtClean="0">
+                <a:solidFill>
+                  <a:schemeClr val="tx1">
+                    <a:lumMod val="65000"/>
+                    <a:lumOff val="35000"/>
+                  </a:schemeClr>
+                </a:solidFill>
+                <a:latin typeface="Courier"/>
+                <a:cs typeface="Courier"/>
+              </a:rPr>
+              <a:t>DELETE FROM NEW_ORDER WHERE NO_D_ID = ? AND NO_W_ID = ? AND NO_O_ID = ?</a:t>
+            </a:r>
+          </a:p>
+          <a:p>
+            <a:r>
+              <a:rPr lang="en-US" sz="350" dirty="0" smtClean="0">
+                <a:solidFill>
+                  <a:schemeClr val="tx1">
+                    <a:lumMod val="65000"/>
+                    <a:lumOff val="35000"/>
+                  </a:schemeClr>
+                </a:solidFill>
+                <a:latin typeface="Courier"/>
+                <a:cs typeface="Courier"/>
+              </a:rPr>
+              <a:t>INSERT INTO ORDER_LINE (OL_O_ID, OL_D_ID, OL_W_ID, OL_NUMBER, OL_I_ID, OL_SUPPLY_W_ID, OL_DELIVERY_D, OL_QUANTITY, OL_AMOUNT, OL_DIST_INFO) VALUES (?, ?, ?, ?, ?, ?, ?, ?, ?, ?)</a:t>
+            </a:r>
+          </a:p>
+          <a:p>
+            <a:r>
+              <a:rPr lang="en-US" sz="350" dirty="0" smtClean="0">
+                <a:solidFill>
+                  <a:schemeClr val="tx1">
+                    <a:lumMod val="65000"/>
+                    <a:lumOff val="35000"/>
+                  </a:schemeClr>
+                </a:solidFill>
+                <a:latin typeface="Courier"/>
+                <a:cs typeface="Courier"/>
+              </a:rPr>
+              <a:t>UPDATE ORDER_LINE SET OL_DELIVERY_D = ? WHERE OL_O_ID = ? AND OL_D_ID = ? AND OL_W_ID = ?</a:t>
+            </a:r>
+          </a:p>
+        </p:txBody>
+      </p:sp>
+      <p:sp>
+        <p:nvSpPr>
+          <p:cNvPr id="6" name="TextBox 5"/>
+          <p:cNvSpPr txBox="1"/>
+          <p:nvPr/>
+        </p:nvSpPr>
+        <p:spPr>
+          <a:xfrm>
+            <a:off x="891464" y="3235582"/>
+            <a:ext cx="1437889" cy="400110"/>
+          </a:xfrm>
+          <a:prstGeom prst="rect">
+            <a:avLst/>
+          </a:prstGeom>
+          <a:noFill/>
+        </p:spPr>
+        <p:txBody>
+          <a:bodyPr wrap="none" rtlCol="0">
+            <a:spAutoFit/>
+          </a:bodyPr>
+          <a:lstStyle/>
+          <a:p>
+            <a:r>
+              <a:rPr lang="en-US" sz="2000" dirty="0" smtClean="0">
+                <a:latin typeface="Palatino"/>
+                <a:cs typeface="Palatino"/>
+              </a:rPr>
+              <a:t>Query logs</a:t>
+            </a:r>
+            <a:endParaRPr lang="en-US" sz="2000" dirty="0">
+              <a:latin typeface="Palatino"/>
+              <a:cs typeface="Palatino"/>
+            </a:endParaRPr>
+          </a:p>
+        </p:txBody>
+      </p:sp>
+      <p:sp>
+        <p:nvSpPr>
+          <p:cNvPr id="7" name="Folded Corner 6"/>
+          <p:cNvSpPr/>
+          <p:nvPr/>
+        </p:nvSpPr>
+        <p:spPr>
+          <a:xfrm>
+            <a:off x="2847728" y="625756"/>
+            <a:ext cx="2789481" cy="1538752"/>
+          </a:xfrm>
+          <a:prstGeom prst="foldedCorner">
+            <a:avLst/>
+          </a:prstGeom>
+          <a:solidFill>
+            <a:schemeClr val="bg1"/>
+          </a:solidFill>
+          <a:ln>
+            <a:solidFill>
+              <a:schemeClr val="tx1">
+                <a:lumMod val="65000"/>
+                <a:lumOff val="35000"/>
+              </a:schemeClr>
+            </a:solidFill>
+          </a:ln>
+        </p:spPr>
+        <p:style>
+          <a:lnRef idx="1">
+            <a:schemeClr val="accent1"/>
+          </a:lnRef>
+          <a:fillRef idx="3">
+            <a:schemeClr val="accent1"/>
+          </a:fillRef>
+          <a:effectRef idx="2">
+            <a:schemeClr val="accent1"/>
+          </a:effectRef>
+          <a:fontRef idx="minor">
+            <a:schemeClr val="lt1"/>
+          </a:fontRef>
+        </p:style>
+        <p:txBody>
+          <a:bodyPr rtlCol="0" anchor="ctr"/>
+          <a:lstStyle/>
+          <a:p>
+            <a:pPr algn="ctr"/>
+            <a:endParaRPr lang="en-US"/>
+          </a:p>
+        </p:txBody>
+      </p:sp>
+      <p:sp>
+        <p:nvSpPr>
+          <p:cNvPr id="2" name="Oval 1"/>
+          <p:cNvSpPr/>
+          <p:nvPr/>
+        </p:nvSpPr>
+        <p:spPr>
+          <a:xfrm>
+            <a:off x="3157134" y="1127992"/>
+            <a:ext cx="178885" cy="178885"/>
+          </a:xfrm>
+          <a:prstGeom prst="ellipse">
+            <a:avLst/>
+          </a:prstGeom>
+          <a:solidFill>
+            <a:srgbClr val="FFFFFF"/>
+          </a:solidFill>
+          <a:ln>
+            <a:solidFill>
+              <a:srgbClr val="595959"/>
+            </a:solidFill>
+          </a:ln>
+          <a:effectLst/>
+        </p:spPr>
+        <p:style>
+          <a:lnRef idx="1">
+            <a:schemeClr val="accent1"/>
+          </a:lnRef>
+          <a:fillRef idx="3">
+            <a:schemeClr val="accent1"/>
+          </a:fillRef>
+          <a:effectRef idx="2">
+            <a:schemeClr val="accent1"/>
+          </a:effectRef>
+          <a:fontRef idx="minor">
+            <a:schemeClr val="lt1"/>
+          </a:fontRef>
+        </p:style>
+        <p:txBody>
+          <a:bodyPr rtlCol="0" anchor="ctr"/>
+          <a:lstStyle/>
+          <a:p>
+            <a:pPr algn="ctr"/>
+            <a:endParaRPr lang="en-US"/>
+          </a:p>
+        </p:txBody>
+      </p:sp>
+      <p:sp>
+        <p:nvSpPr>
+          <p:cNvPr id="8" name="Oval 7"/>
+          <p:cNvSpPr/>
+          <p:nvPr/>
+        </p:nvSpPr>
+        <p:spPr>
+          <a:xfrm>
+            <a:off x="3483856" y="1127992"/>
+            <a:ext cx="178885" cy="178885"/>
+          </a:xfrm>
+          <a:prstGeom prst="ellipse">
+            <a:avLst/>
+          </a:prstGeom>
+          <a:solidFill>
+            <a:srgbClr val="FFFFFF"/>
+          </a:solidFill>
+          <a:ln>
+            <a:solidFill>
+              <a:srgbClr val="595959"/>
+            </a:solidFill>
+          </a:ln>
+          <a:effectLst/>
+        </p:spPr>
+        <p:style>
+          <a:lnRef idx="1">
+            <a:schemeClr val="accent1"/>
+          </a:lnRef>
+          <a:fillRef idx="3">
+            <a:schemeClr val="accent1"/>
+          </a:fillRef>
+          <a:effectRef idx="2">
+            <a:schemeClr val="accent1"/>
+          </a:effectRef>
+          <a:fontRef idx="minor">
+            <a:schemeClr val="lt1"/>
+          </a:fontRef>
+        </p:style>
+        <p:txBody>
+          <a:bodyPr rtlCol="0" anchor="ctr"/>
+          <a:lstStyle/>
+          <a:p>
+            <a:pPr algn="ctr"/>
+            <a:endParaRPr lang="en-US"/>
+          </a:p>
+        </p:txBody>
+      </p:sp>
+      <p:sp>
+        <p:nvSpPr>
+          <p:cNvPr id="9" name="Oval 8"/>
+          <p:cNvSpPr/>
+          <p:nvPr/>
+        </p:nvSpPr>
+        <p:spPr>
+          <a:xfrm>
+            <a:off x="3810578" y="1127992"/>
+            <a:ext cx="178885" cy="178885"/>
+          </a:xfrm>
+          <a:prstGeom prst="ellipse">
+            <a:avLst/>
+          </a:prstGeom>
+          <a:solidFill>
+            <a:schemeClr val="tx1">
+              <a:lumMod val="65000"/>
+              <a:lumOff val="35000"/>
+            </a:schemeClr>
+          </a:solidFill>
+          <a:ln>
+            <a:solidFill>
+              <a:srgbClr val="595959"/>
+            </a:solidFill>
+          </a:ln>
+          <a:effectLst/>
+        </p:spPr>
+        <p:style>
+          <a:lnRef idx="1">
+            <a:schemeClr val="accent1"/>
+          </a:lnRef>
+          <a:fillRef idx="3">
+            <a:schemeClr val="accent1"/>
+          </a:fillRef>
+          <a:effectRef idx="2">
+            <a:schemeClr val="accent1"/>
+          </a:effectRef>
+          <a:fontRef idx="minor">
+            <a:schemeClr val="lt1"/>
+          </a:fontRef>
+        </p:style>
+        <p:txBody>
+          <a:bodyPr rtlCol="0" anchor="ctr"/>
+          <a:lstStyle/>
+          <a:p>
+            <a:pPr algn="ctr"/>
+            <a:endParaRPr lang="en-US"/>
+          </a:p>
+        </p:txBody>
+      </p:sp>
+      <p:sp>
+        <p:nvSpPr>
+          <p:cNvPr id="10" name="Oval 9"/>
+          <p:cNvSpPr/>
+          <p:nvPr/>
+        </p:nvSpPr>
+        <p:spPr>
+          <a:xfrm>
+            <a:off x="4137300" y="1127992"/>
+            <a:ext cx="178885" cy="178885"/>
+          </a:xfrm>
+          <a:prstGeom prst="ellipse">
+            <a:avLst/>
+          </a:prstGeom>
+          <a:solidFill>
+            <a:srgbClr val="595959"/>
+          </a:solidFill>
+          <a:ln>
+            <a:solidFill>
+              <a:srgbClr val="595959"/>
+            </a:solidFill>
+          </a:ln>
+          <a:effectLst/>
+        </p:spPr>
+        <p:style>
+          <a:lnRef idx="1">
+            <a:schemeClr val="accent1"/>
+          </a:lnRef>
+          <a:fillRef idx="3">
+            <a:schemeClr val="accent1"/>
+          </a:fillRef>
+          <a:effectRef idx="2">
+            <a:schemeClr val="accent1"/>
+          </a:effectRef>
+          <a:fontRef idx="minor">
+            <a:schemeClr val="lt1"/>
+          </a:fontRef>
+        </p:style>
+        <p:txBody>
+          <a:bodyPr rtlCol="0" anchor="ctr"/>
+          <a:lstStyle/>
+          <a:p>
+            <a:pPr algn="ctr"/>
+            <a:endParaRPr lang="en-US"/>
+          </a:p>
+        </p:txBody>
+      </p:sp>
+      <p:sp>
+        <p:nvSpPr>
+          <p:cNvPr id="11" name="Oval 10"/>
+          <p:cNvSpPr/>
+          <p:nvPr/>
+        </p:nvSpPr>
+        <p:spPr>
+          <a:xfrm>
+            <a:off x="4464022" y="1127992"/>
+            <a:ext cx="178885" cy="178885"/>
+          </a:xfrm>
+          <a:prstGeom prst="ellipse">
+            <a:avLst/>
+          </a:prstGeom>
+          <a:solidFill>
+            <a:srgbClr val="595959"/>
+          </a:solidFill>
+          <a:ln>
+            <a:solidFill>
+              <a:srgbClr val="595959"/>
+            </a:solidFill>
+          </a:ln>
+          <a:effectLst/>
+        </p:spPr>
+        <p:style>
+          <a:lnRef idx="1">
+            <a:schemeClr val="accent1"/>
+          </a:lnRef>
+          <a:fillRef idx="3">
+            <a:schemeClr val="accent1"/>
+          </a:fillRef>
+          <a:effectRef idx="2">
+            <a:schemeClr val="accent1"/>
+          </a:effectRef>
+          <a:fontRef idx="minor">
+            <a:schemeClr val="lt1"/>
+          </a:fontRef>
+        </p:style>
+        <p:txBody>
+          <a:bodyPr rtlCol="0" anchor="ctr"/>
+          <a:lstStyle/>
+          <a:p>
+            <a:pPr algn="ctr"/>
+            <a:endParaRPr lang="en-US"/>
+          </a:p>
+        </p:txBody>
+      </p:sp>
+      <p:sp>
+        <p:nvSpPr>
+          <p:cNvPr id="12" name="Oval 11"/>
+          <p:cNvSpPr/>
+          <p:nvPr/>
+        </p:nvSpPr>
+        <p:spPr>
+          <a:xfrm>
+            <a:off x="4790744" y="1127992"/>
+            <a:ext cx="178885" cy="178885"/>
+          </a:xfrm>
+          <a:prstGeom prst="ellipse">
+            <a:avLst/>
+          </a:prstGeom>
+          <a:solidFill>
+            <a:srgbClr val="FFFFFF"/>
+          </a:solidFill>
+          <a:ln>
+            <a:solidFill>
+              <a:srgbClr val="595959"/>
+            </a:solidFill>
+          </a:ln>
+          <a:effectLst/>
+        </p:spPr>
+        <p:style>
+          <a:lnRef idx="1">
+            <a:schemeClr val="accent1"/>
+          </a:lnRef>
+          <a:fillRef idx="3">
+            <a:schemeClr val="accent1"/>
+          </a:fillRef>
+          <a:effectRef idx="2">
+            <a:schemeClr val="accent1"/>
+          </a:effectRef>
+          <a:fontRef idx="minor">
+            <a:schemeClr val="lt1"/>
+          </a:fontRef>
+        </p:style>
+        <p:txBody>
+          <a:bodyPr rtlCol="0" anchor="ctr"/>
+          <a:lstStyle/>
+          <a:p>
+            <a:pPr algn="ctr"/>
+            <a:endParaRPr lang="en-US"/>
+          </a:p>
+        </p:txBody>
+      </p:sp>
+      <p:sp>
+        <p:nvSpPr>
+          <p:cNvPr id="13" name="Oval 12"/>
+          <p:cNvSpPr/>
+          <p:nvPr/>
+        </p:nvSpPr>
+        <p:spPr>
+          <a:xfrm>
+            <a:off x="5117466" y="1127992"/>
+            <a:ext cx="178885" cy="178885"/>
+          </a:xfrm>
+          <a:prstGeom prst="ellipse">
+            <a:avLst/>
+          </a:prstGeom>
+          <a:solidFill>
+            <a:srgbClr val="FFFFFF"/>
+          </a:solidFill>
+          <a:ln>
+            <a:solidFill>
+              <a:srgbClr val="595959"/>
+            </a:solidFill>
+          </a:ln>
+          <a:effectLst/>
+        </p:spPr>
+        <p:style>
+          <a:lnRef idx="1">
+            <a:schemeClr val="accent1"/>
+          </a:lnRef>
+          <a:fillRef idx="3">
+            <a:schemeClr val="accent1"/>
+          </a:fillRef>
+          <a:effectRef idx="2">
+            <a:schemeClr val="accent1"/>
+          </a:effectRef>
+          <a:fontRef idx="minor">
+            <a:schemeClr val="lt1"/>
+          </a:fontRef>
+        </p:style>
+        <p:txBody>
+          <a:bodyPr rtlCol="0" anchor="ctr"/>
+          <a:lstStyle/>
+          <a:p>
+            <a:pPr algn="ctr"/>
+            <a:endParaRPr lang="en-US"/>
+          </a:p>
+        </p:txBody>
+      </p:sp>
+      <p:sp>
+        <p:nvSpPr>
+          <p:cNvPr id="14" name="Oval 13"/>
+          <p:cNvSpPr/>
+          <p:nvPr/>
+        </p:nvSpPr>
+        <p:spPr>
+          <a:xfrm>
+            <a:off x="3157134" y="1468216"/>
+            <a:ext cx="178885" cy="178885"/>
+          </a:xfrm>
+          <a:prstGeom prst="ellipse">
+            <a:avLst/>
+          </a:prstGeom>
+          <a:solidFill>
+            <a:srgbClr val="FFFFFF"/>
+          </a:solidFill>
+          <a:ln>
+            <a:solidFill>
+              <a:srgbClr val="595959"/>
+            </a:solidFill>
+          </a:ln>
+          <a:effectLst/>
+        </p:spPr>
+        <p:style>
+          <a:lnRef idx="1">
+            <a:schemeClr val="accent1"/>
+          </a:lnRef>
+          <a:fillRef idx="3">
+            <a:schemeClr val="accent1"/>
+          </a:fillRef>
+          <a:effectRef idx="2">
+            <a:schemeClr val="accent1"/>
+          </a:effectRef>
+          <a:fontRef idx="minor">
+            <a:schemeClr val="lt1"/>
+          </a:fontRef>
+        </p:style>
+        <p:txBody>
+          <a:bodyPr rtlCol="0" anchor="ctr"/>
+          <a:lstStyle/>
+          <a:p>
+            <a:pPr algn="ctr"/>
+            <a:endParaRPr lang="en-US"/>
+          </a:p>
+        </p:txBody>
+      </p:sp>
+      <p:sp>
+        <p:nvSpPr>
+          <p:cNvPr id="15" name="Oval 14"/>
+          <p:cNvSpPr/>
+          <p:nvPr/>
+        </p:nvSpPr>
+        <p:spPr>
+          <a:xfrm>
+            <a:off x="3483856" y="1468216"/>
+            <a:ext cx="178885" cy="178885"/>
+          </a:xfrm>
+          <a:prstGeom prst="ellipse">
+            <a:avLst/>
+          </a:prstGeom>
+          <a:solidFill>
+            <a:srgbClr val="FFFFFF"/>
+          </a:solidFill>
+          <a:ln>
+            <a:solidFill>
+              <a:srgbClr val="595959"/>
+            </a:solidFill>
+          </a:ln>
+          <a:effectLst/>
+        </p:spPr>
+        <p:style>
+          <a:lnRef idx="1">
+            <a:schemeClr val="accent1"/>
+          </a:lnRef>
+          <a:fillRef idx="3">
+            <a:schemeClr val="accent1"/>
+          </a:fillRef>
+          <a:effectRef idx="2">
+            <a:schemeClr val="accent1"/>
+          </a:effectRef>
+          <a:fontRef idx="minor">
+            <a:schemeClr val="lt1"/>
+          </a:fontRef>
+        </p:style>
+        <p:txBody>
+          <a:bodyPr rtlCol="0" anchor="ctr"/>
+          <a:lstStyle/>
+          <a:p>
+            <a:pPr algn="ctr"/>
+            <a:endParaRPr lang="en-US"/>
+          </a:p>
+        </p:txBody>
+      </p:sp>
+      <p:sp>
+        <p:nvSpPr>
+          <p:cNvPr id="16" name="Oval 15"/>
+          <p:cNvSpPr/>
+          <p:nvPr/>
+        </p:nvSpPr>
+        <p:spPr>
+          <a:xfrm>
+            <a:off x="3810578" y="1468216"/>
+            <a:ext cx="178885" cy="178885"/>
+          </a:xfrm>
+          <a:prstGeom prst="ellipse">
+            <a:avLst/>
+          </a:prstGeom>
+          <a:solidFill>
+            <a:srgbClr val="FFFFFF"/>
+          </a:solidFill>
+          <a:ln>
+            <a:solidFill>
+              <a:srgbClr val="595959"/>
+            </a:solidFill>
+          </a:ln>
+          <a:effectLst/>
+        </p:spPr>
+        <p:style>
+          <a:lnRef idx="1">
+            <a:schemeClr val="accent1"/>
+          </a:lnRef>
+          <a:fillRef idx="3">
+            <a:schemeClr val="accent1"/>
+          </a:fillRef>
+          <a:effectRef idx="2">
+            <a:schemeClr val="accent1"/>
+          </a:effectRef>
+          <a:fontRef idx="minor">
+            <a:schemeClr val="lt1"/>
+          </a:fontRef>
+        </p:style>
+        <p:txBody>
+          <a:bodyPr rtlCol="0" anchor="ctr"/>
+          <a:lstStyle/>
+          <a:p>
+            <a:pPr algn="ctr"/>
+            <a:endParaRPr lang="en-US"/>
+          </a:p>
+        </p:txBody>
+      </p:sp>
+      <p:sp>
+        <p:nvSpPr>
+          <p:cNvPr id="17" name="Oval 16"/>
+          <p:cNvSpPr/>
+          <p:nvPr/>
+        </p:nvSpPr>
+        <p:spPr>
+          <a:xfrm>
+            <a:off x="4137300" y="1468216"/>
+            <a:ext cx="178885" cy="178885"/>
+          </a:xfrm>
+          <a:prstGeom prst="ellipse">
+            <a:avLst/>
+          </a:prstGeom>
+          <a:solidFill>
+            <a:srgbClr val="FFFFFF"/>
+          </a:solidFill>
+          <a:ln>
+            <a:solidFill>
+              <a:srgbClr val="595959"/>
+            </a:solidFill>
+          </a:ln>
+          <a:effectLst/>
+        </p:spPr>
+        <p:style>
+          <a:lnRef idx="1">
+            <a:schemeClr val="accent1"/>
+          </a:lnRef>
+          <a:fillRef idx="3">
+            <a:schemeClr val="accent1"/>
+          </a:fillRef>
+          <a:effectRef idx="2">
+            <a:schemeClr val="accent1"/>
+          </a:effectRef>
+          <a:fontRef idx="minor">
+            <a:schemeClr val="lt1"/>
+          </a:fontRef>
+        </p:style>
+        <p:txBody>
+          <a:bodyPr rtlCol="0" anchor="ctr"/>
+          <a:lstStyle/>
+          <a:p>
+            <a:pPr algn="ctr"/>
+            <a:endParaRPr lang="en-US"/>
+          </a:p>
+        </p:txBody>
+      </p:sp>
+      <p:sp>
+        <p:nvSpPr>
+          <p:cNvPr id="18" name="Oval 17"/>
+          <p:cNvSpPr/>
+          <p:nvPr/>
+        </p:nvSpPr>
+        <p:spPr>
+          <a:xfrm>
+            <a:off x="4464022" y="1468216"/>
+            <a:ext cx="178885" cy="178885"/>
+          </a:xfrm>
+          <a:prstGeom prst="ellipse">
+            <a:avLst/>
+          </a:prstGeom>
+          <a:solidFill>
+            <a:srgbClr val="FFFFFF"/>
+          </a:solidFill>
+          <a:ln>
+            <a:solidFill>
+              <a:srgbClr val="595959"/>
+            </a:solidFill>
+          </a:ln>
+          <a:effectLst/>
+        </p:spPr>
+        <p:style>
+          <a:lnRef idx="1">
+            <a:schemeClr val="accent1"/>
+          </a:lnRef>
+          <a:fillRef idx="3">
+            <a:schemeClr val="accent1"/>
+          </a:fillRef>
+          <a:effectRef idx="2">
+            <a:schemeClr val="accent1"/>
+          </a:effectRef>
+          <a:fontRef idx="minor">
+            <a:schemeClr val="lt1"/>
+          </a:fontRef>
+        </p:style>
+        <p:txBody>
+          <a:bodyPr rtlCol="0" anchor="ctr"/>
+          <a:lstStyle/>
+          <a:p>
+            <a:pPr algn="ctr"/>
+            <a:endParaRPr lang="en-US"/>
+          </a:p>
+        </p:txBody>
+      </p:sp>
+      <p:sp>
+        <p:nvSpPr>
+          <p:cNvPr id="19" name="Oval 18"/>
+          <p:cNvSpPr/>
+          <p:nvPr/>
+        </p:nvSpPr>
+        <p:spPr>
+          <a:xfrm>
+            <a:off x="4790744" y="1468216"/>
+            <a:ext cx="178885" cy="178885"/>
+          </a:xfrm>
+          <a:prstGeom prst="ellipse">
+            <a:avLst/>
+          </a:prstGeom>
+          <a:solidFill>
+            <a:srgbClr val="595959"/>
+          </a:solidFill>
+          <a:ln>
+            <a:solidFill>
+              <a:srgbClr val="595959"/>
+            </a:solidFill>
+          </a:ln>
+          <a:effectLst/>
+        </p:spPr>
+        <p:style>
+          <a:lnRef idx="1">
+            <a:schemeClr val="accent1"/>
+          </a:lnRef>
+          <a:fillRef idx="3">
+            <a:schemeClr val="accent1"/>
+          </a:fillRef>
+          <a:effectRef idx="2">
+            <a:schemeClr val="accent1"/>
+          </a:effectRef>
+          <a:fontRef idx="minor">
+            <a:schemeClr val="lt1"/>
+          </a:fontRef>
+        </p:style>
+        <p:txBody>
+          <a:bodyPr rtlCol="0" anchor="ctr"/>
+          <a:lstStyle/>
+          <a:p>
+            <a:pPr algn="ctr"/>
+            <a:endParaRPr lang="en-US"/>
+          </a:p>
+        </p:txBody>
+      </p:sp>
+      <p:sp>
+        <p:nvSpPr>
+          <p:cNvPr id="20" name="Oval 19"/>
+          <p:cNvSpPr/>
+          <p:nvPr/>
+        </p:nvSpPr>
+        <p:spPr>
+          <a:xfrm>
+            <a:off x="5117466" y="1468216"/>
+            <a:ext cx="178885" cy="178885"/>
+          </a:xfrm>
+          <a:prstGeom prst="ellipse">
+            <a:avLst/>
+          </a:prstGeom>
+          <a:solidFill>
+            <a:srgbClr val="FFFFFF"/>
+          </a:solidFill>
+          <a:ln>
+            <a:solidFill>
+              <a:srgbClr val="595959"/>
+            </a:solidFill>
+          </a:ln>
+          <a:effectLst/>
+        </p:spPr>
+        <p:style>
+          <a:lnRef idx="1">
+            <a:schemeClr val="accent1"/>
+          </a:lnRef>
+          <a:fillRef idx="3">
+            <a:schemeClr val="accent1"/>
+          </a:fillRef>
+          <a:effectRef idx="2">
+            <a:schemeClr val="accent1"/>
+          </a:effectRef>
+          <a:fontRef idx="minor">
+            <a:schemeClr val="lt1"/>
+          </a:fontRef>
+        </p:style>
+        <p:txBody>
+          <a:bodyPr rtlCol="0" anchor="ctr"/>
+          <a:lstStyle/>
+          <a:p>
+            <a:pPr algn="ctr"/>
+            <a:endParaRPr lang="en-US"/>
+          </a:p>
+        </p:txBody>
+      </p:sp>
+      <p:sp>
+        <p:nvSpPr>
+          <p:cNvPr id="21" name="Oval 20"/>
+          <p:cNvSpPr/>
+          <p:nvPr/>
+        </p:nvSpPr>
+        <p:spPr>
+          <a:xfrm>
+            <a:off x="3157134" y="1808440"/>
+            <a:ext cx="178885" cy="178885"/>
+          </a:xfrm>
+          <a:prstGeom prst="ellipse">
+            <a:avLst/>
+          </a:prstGeom>
+          <a:solidFill>
+            <a:srgbClr val="FFFFFF"/>
+          </a:solidFill>
+          <a:ln>
+            <a:solidFill>
+              <a:srgbClr val="595959"/>
+            </a:solidFill>
+          </a:ln>
+          <a:effectLst/>
+        </p:spPr>
+        <p:style>
+          <a:lnRef idx="1">
+            <a:schemeClr val="accent1"/>
+          </a:lnRef>
+          <a:fillRef idx="3">
+            <a:schemeClr val="accent1"/>
+          </a:fillRef>
+          <a:effectRef idx="2">
+            <a:schemeClr val="accent1"/>
+          </a:effectRef>
+          <a:fontRef idx="minor">
+            <a:schemeClr val="lt1"/>
+          </a:fontRef>
+        </p:style>
+        <p:txBody>
+          <a:bodyPr rtlCol="0" anchor="ctr"/>
+          <a:lstStyle/>
+          <a:p>
+            <a:pPr algn="ctr"/>
+            <a:endParaRPr lang="en-US"/>
+          </a:p>
+        </p:txBody>
+      </p:sp>
+      <p:sp>
+        <p:nvSpPr>
+          <p:cNvPr id="22" name="Oval 21"/>
+          <p:cNvSpPr/>
+          <p:nvPr/>
+        </p:nvSpPr>
+        <p:spPr>
+          <a:xfrm>
+            <a:off x="3483856" y="1808440"/>
+            <a:ext cx="178885" cy="178885"/>
+          </a:xfrm>
+          <a:prstGeom prst="ellipse">
+            <a:avLst/>
+          </a:prstGeom>
+          <a:solidFill>
+            <a:srgbClr val="595959"/>
+          </a:solidFill>
+          <a:ln>
+            <a:solidFill>
+              <a:srgbClr val="595959"/>
+            </a:solidFill>
+          </a:ln>
+          <a:effectLst/>
+        </p:spPr>
+        <p:style>
+          <a:lnRef idx="1">
+            <a:schemeClr val="accent1"/>
+          </a:lnRef>
+          <a:fillRef idx="3">
+            <a:schemeClr val="accent1"/>
+          </a:fillRef>
+          <a:effectRef idx="2">
+            <a:schemeClr val="accent1"/>
+          </a:effectRef>
+          <a:fontRef idx="minor">
+            <a:schemeClr val="lt1"/>
+          </a:fontRef>
+        </p:style>
+        <p:txBody>
+          <a:bodyPr rtlCol="0" anchor="ctr"/>
+          <a:lstStyle/>
+          <a:p>
+            <a:pPr algn="ctr"/>
+            <a:endParaRPr lang="en-US"/>
+          </a:p>
+        </p:txBody>
+      </p:sp>
+      <p:sp>
+        <p:nvSpPr>
+          <p:cNvPr id="23" name="Oval 22"/>
+          <p:cNvSpPr/>
+          <p:nvPr/>
+        </p:nvSpPr>
+        <p:spPr>
+          <a:xfrm>
+            <a:off x="3810578" y="1808440"/>
+            <a:ext cx="178885" cy="178885"/>
+          </a:xfrm>
+          <a:prstGeom prst="ellipse">
+            <a:avLst/>
+          </a:prstGeom>
+          <a:solidFill>
+            <a:srgbClr val="FFFFFF"/>
+          </a:solidFill>
+          <a:ln>
+            <a:solidFill>
+              <a:srgbClr val="595959"/>
+            </a:solidFill>
+          </a:ln>
+          <a:effectLst/>
+        </p:spPr>
+        <p:style>
+          <a:lnRef idx="1">
+            <a:schemeClr val="accent1"/>
+          </a:lnRef>
+          <a:fillRef idx="3">
+            <a:schemeClr val="accent1"/>
+          </a:fillRef>
+          <a:effectRef idx="2">
+            <a:schemeClr val="accent1"/>
+          </a:effectRef>
+          <a:fontRef idx="minor">
+            <a:schemeClr val="lt1"/>
+          </a:fontRef>
+        </p:style>
+        <p:txBody>
+          <a:bodyPr rtlCol="0" anchor="ctr"/>
+          <a:lstStyle/>
+          <a:p>
+            <a:pPr algn="ctr"/>
+            <a:endParaRPr lang="en-US"/>
+          </a:p>
+        </p:txBody>
+      </p:sp>
+      <p:sp>
+        <p:nvSpPr>
+          <p:cNvPr id="24" name="Oval 23"/>
+          <p:cNvSpPr/>
+          <p:nvPr/>
+        </p:nvSpPr>
+        <p:spPr>
+          <a:xfrm>
+            <a:off x="4137300" y="1808440"/>
+            <a:ext cx="178885" cy="178885"/>
+          </a:xfrm>
+          <a:prstGeom prst="ellipse">
+            <a:avLst/>
+          </a:prstGeom>
+          <a:solidFill>
+            <a:srgbClr val="FFFFFF"/>
+          </a:solidFill>
+          <a:ln>
+            <a:solidFill>
+              <a:srgbClr val="595959"/>
+            </a:solidFill>
+          </a:ln>
+          <a:effectLst/>
+        </p:spPr>
+        <p:style>
+          <a:lnRef idx="1">
+            <a:schemeClr val="accent1"/>
+          </a:lnRef>
+          <a:fillRef idx="3">
+            <a:schemeClr val="accent1"/>
+          </a:fillRef>
+          <a:effectRef idx="2">
+            <a:schemeClr val="accent1"/>
+          </a:effectRef>
+          <a:fontRef idx="minor">
+            <a:schemeClr val="lt1"/>
+          </a:fontRef>
+        </p:style>
+        <p:txBody>
+          <a:bodyPr rtlCol="0" anchor="ctr"/>
+          <a:lstStyle/>
+          <a:p>
+            <a:pPr algn="ctr"/>
+            <a:endParaRPr lang="en-US"/>
+          </a:p>
+        </p:txBody>
+      </p:sp>
+      <p:sp>
+        <p:nvSpPr>
+          <p:cNvPr id="25" name="Oval 24"/>
+          <p:cNvSpPr/>
+          <p:nvPr/>
+        </p:nvSpPr>
+        <p:spPr>
+          <a:xfrm>
+            <a:off x="4464022" y="1808440"/>
+            <a:ext cx="178885" cy="178885"/>
+          </a:xfrm>
+          <a:prstGeom prst="ellipse">
+            <a:avLst/>
+          </a:prstGeom>
+          <a:solidFill>
+            <a:srgbClr val="FFFFFF"/>
+          </a:solidFill>
+          <a:ln>
+            <a:solidFill>
+              <a:srgbClr val="595959"/>
+            </a:solidFill>
+          </a:ln>
+          <a:effectLst/>
+        </p:spPr>
+        <p:style>
+          <a:lnRef idx="1">
+            <a:schemeClr val="accent1"/>
+          </a:lnRef>
+          <a:fillRef idx="3">
+            <a:schemeClr val="accent1"/>
+          </a:fillRef>
+          <a:effectRef idx="2">
+            <a:schemeClr val="accent1"/>
+          </a:effectRef>
+          <a:fontRef idx="minor">
+            <a:schemeClr val="lt1"/>
+          </a:fontRef>
+        </p:style>
+        <p:txBody>
+          <a:bodyPr rtlCol="0" anchor="ctr"/>
+          <a:lstStyle/>
+          <a:p>
+            <a:pPr algn="ctr"/>
+            <a:endParaRPr lang="en-US"/>
+          </a:p>
+        </p:txBody>
+      </p:sp>
+      <p:sp>
+        <p:nvSpPr>
+          <p:cNvPr id="26" name="Oval 25"/>
+          <p:cNvSpPr/>
+          <p:nvPr/>
+        </p:nvSpPr>
+        <p:spPr>
+          <a:xfrm>
+            <a:off x="4790744" y="1808440"/>
+            <a:ext cx="178885" cy="178885"/>
+          </a:xfrm>
+          <a:prstGeom prst="ellipse">
+            <a:avLst/>
+          </a:prstGeom>
+          <a:solidFill>
+            <a:srgbClr val="FFFFFF"/>
+          </a:solidFill>
+          <a:ln>
+            <a:solidFill>
+              <a:srgbClr val="595959"/>
+            </a:solidFill>
+          </a:ln>
+          <a:effectLst/>
+        </p:spPr>
+        <p:style>
+          <a:lnRef idx="1">
+            <a:schemeClr val="accent1"/>
+          </a:lnRef>
+          <a:fillRef idx="3">
+            <a:schemeClr val="accent1"/>
+          </a:fillRef>
+          <a:effectRef idx="2">
+            <a:schemeClr val="accent1"/>
+          </a:effectRef>
+          <a:fontRef idx="minor">
+            <a:schemeClr val="lt1"/>
+          </a:fontRef>
+        </p:style>
+        <p:txBody>
+          <a:bodyPr rtlCol="0" anchor="ctr"/>
+          <a:lstStyle/>
+          <a:p>
+            <a:pPr algn="ctr"/>
+            <a:endParaRPr lang="en-US"/>
+          </a:p>
+        </p:txBody>
+      </p:sp>
+      <p:sp>
+        <p:nvSpPr>
+          <p:cNvPr id="27" name="Oval 26"/>
+          <p:cNvSpPr/>
+          <p:nvPr/>
+        </p:nvSpPr>
+        <p:spPr>
+          <a:xfrm>
+            <a:off x="5117466" y="1808440"/>
+            <a:ext cx="178885" cy="178885"/>
+          </a:xfrm>
+          <a:prstGeom prst="ellipse">
+            <a:avLst/>
+          </a:prstGeom>
+          <a:solidFill>
+            <a:srgbClr val="FFFFFF"/>
+          </a:solidFill>
+          <a:ln>
+            <a:solidFill>
+              <a:srgbClr val="595959"/>
+            </a:solidFill>
+          </a:ln>
+          <a:effectLst/>
+        </p:spPr>
+        <p:style>
+          <a:lnRef idx="1">
+            <a:schemeClr val="accent1"/>
+          </a:lnRef>
+          <a:fillRef idx="3">
+            <a:schemeClr val="accent1"/>
+          </a:fillRef>
+          <a:effectRef idx="2">
+            <a:schemeClr val="accent1"/>
+          </a:effectRef>
+          <a:fontRef idx="minor">
+            <a:schemeClr val="lt1"/>
+          </a:fontRef>
+        </p:style>
+        <p:txBody>
+          <a:bodyPr rtlCol="0" anchor="ctr"/>
+          <a:lstStyle/>
+          <a:p>
+            <a:pPr algn="ctr"/>
+            <a:endParaRPr lang="en-US"/>
+          </a:p>
+        </p:txBody>
+      </p:sp>
+      <p:sp>
+        <p:nvSpPr>
+          <p:cNvPr id="28" name="TextBox 27"/>
+          <p:cNvSpPr txBox="1"/>
+          <p:nvPr/>
+        </p:nvSpPr>
+        <p:spPr>
+          <a:xfrm>
+            <a:off x="3068624" y="643241"/>
+            <a:ext cx="1506267" cy="400110"/>
+          </a:xfrm>
+          <a:prstGeom prst="rect">
+            <a:avLst/>
+          </a:prstGeom>
+          <a:noFill/>
+        </p:spPr>
+        <p:txBody>
+          <a:bodyPr wrap="none" rtlCol="0">
+            <a:spAutoFit/>
+          </a:bodyPr>
+          <a:lstStyle/>
+          <a:p>
+            <a:r>
+              <a:rPr lang="en-US" sz="2000" dirty="0" smtClean="0">
+                <a:latin typeface="Palatino"/>
+                <a:cs typeface="Palatino"/>
+              </a:rPr>
+              <a:t>Complaints</a:t>
+            </a:r>
+            <a:endParaRPr lang="en-US" sz="2000" dirty="0">
+              <a:latin typeface="Palatino"/>
+              <a:cs typeface="Palatino"/>
+            </a:endParaRPr>
+          </a:p>
+        </p:txBody>
+      </p:sp>
+      <p:pic>
+        <p:nvPicPr>
+          <p:cNvPr id="3" name="Picture 2"/>
+          <p:cNvPicPr>
+            <a:picLocks noChangeAspect="1"/>
+          </p:cNvPicPr>
+          <p:nvPr/>
+        </p:nvPicPr>
+        <p:blipFill>
+          <a:blip r:embed="rId2"/>
+          <a:stretch>
+            <a:fillRect/>
+          </a:stretch>
+        </p:blipFill>
+        <p:spPr>
+          <a:xfrm>
+            <a:off x="604005" y="625756"/>
+            <a:ext cx="1538752" cy="1538752"/>
+          </a:xfrm>
+          <a:prstGeom prst="rect">
+            <a:avLst/>
+          </a:prstGeom>
+        </p:spPr>
+      </p:pic>
+      <p:sp>
+        <p:nvSpPr>
+          <p:cNvPr id="29" name="TextBox 28"/>
+          <p:cNvSpPr txBox="1"/>
+          <p:nvPr/>
+        </p:nvSpPr>
+        <p:spPr>
+          <a:xfrm>
+            <a:off x="960448" y="428101"/>
+            <a:ext cx="825867" cy="400110"/>
+          </a:xfrm>
+          <a:prstGeom prst="rect">
+            <a:avLst/>
+          </a:prstGeom>
+          <a:noFill/>
+        </p:spPr>
+        <p:txBody>
+          <a:bodyPr wrap="none" rtlCol="0">
+            <a:spAutoFit/>
+          </a:bodyPr>
+          <a:lstStyle/>
+          <a:p>
+            <a:r>
+              <a:rPr lang="en-US" sz="2000" dirty="0" smtClean="0">
+                <a:latin typeface="Palatino"/>
+                <a:cs typeface="Palatino"/>
+              </a:rPr>
+              <a:t>Users</a:t>
+            </a:r>
+          </a:p>
+        </p:txBody>
+      </p:sp>
+      <p:cxnSp>
+        <p:nvCxnSpPr>
+          <p:cNvPr id="31" name="Straight Arrow Connector 30"/>
+          <p:cNvCxnSpPr/>
+          <p:nvPr/>
+        </p:nvCxnSpPr>
+        <p:spPr>
+          <a:xfrm>
+            <a:off x="2143495" y="1024979"/>
+            <a:ext cx="704971" cy="0"/>
+          </a:xfrm>
+          <a:prstGeom prst="straightConnector1">
+            <a:avLst/>
+          </a:prstGeom>
+          <a:ln>
+            <a:solidFill>
+              <a:srgbClr val="595959"/>
+            </a:solidFill>
+            <a:tailEnd type="arrow"/>
+          </a:ln>
+          <a:effectLst/>
+        </p:spPr>
+        <p:style>
+          <a:lnRef idx="2">
+            <a:schemeClr val="accent1"/>
+          </a:lnRef>
+          <a:fillRef idx="0">
+            <a:schemeClr val="accent1"/>
+          </a:fillRef>
+          <a:effectRef idx="1">
+            <a:schemeClr val="accent1"/>
+          </a:effectRef>
+          <a:fontRef idx="minor">
+            <a:schemeClr val="tx1"/>
+          </a:fontRef>
+        </p:style>
+      </p:cxnSp>
+      <p:cxnSp>
+        <p:nvCxnSpPr>
+          <p:cNvPr id="32" name="Straight Arrow Connector 31"/>
+          <p:cNvCxnSpPr/>
+          <p:nvPr/>
+        </p:nvCxnSpPr>
+        <p:spPr>
+          <a:xfrm>
+            <a:off x="2143495" y="1231043"/>
+            <a:ext cx="704971" cy="0"/>
+          </a:xfrm>
+          <a:prstGeom prst="straightConnector1">
+            <a:avLst/>
+          </a:prstGeom>
+          <a:ln>
+            <a:solidFill>
+              <a:srgbClr val="595959"/>
+            </a:solidFill>
+            <a:tailEnd type="arrow"/>
+          </a:ln>
+          <a:effectLst/>
+        </p:spPr>
+        <p:style>
+          <a:lnRef idx="2">
+            <a:schemeClr val="accent1"/>
+          </a:lnRef>
+          <a:fillRef idx="0">
+            <a:schemeClr val="accent1"/>
+          </a:fillRef>
+          <a:effectRef idx="1">
+            <a:schemeClr val="accent1"/>
+          </a:effectRef>
+          <a:fontRef idx="minor">
+            <a:schemeClr val="tx1"/>
+          </a:fontRef>
+        </p:style>
+      </p:cxnSp>
+      <p:cxnSp>
+        <p:nvCxnSpPr>
+          <p:cNvPr id="33" name="Straight Arrow Connector 32"/>
+          <p:cNvCxnSpPr/>
+          <p:nvPr/>
+        </p:nvCxnSpPr>
+        <p:spPr>
+          <a:xfrm>
+            <a:off x="2143495" y="1437107"/>
+            <a:ext cx="704971" cy="0"/>
+          </a:xfrm>
+          <a:prstGeom prst="straightConnector1">
+            <a:avLst/>
+          </a:prstGeom>
+          <a:ln>
+            <a:solidFill>
+              <a:srgbClr val="595959"/>
+            </a:solidFill>
+            <a:tailEnd type="arrow"/>
+          </a:ln>
+          <a:effectLst/>
+        </p:spPr>
+        <p:style>
+          <a:lnRef idx="2">
+            <a:schemeClr val="accent1"/>
+          </a:lnRef>
+          <a:fillRef idx="0">
+            <a:schemeClr val="accent1"/>
+          </a:fillRef>
+          <a:effectRef idx="1">
+            <a:schemeClr val="accent1"/>
+          </a:effectRef>
+          <a:fontRef idx="minor">
+            <a:schemeClr val="tx1"/>
+          </a:fontRef>
+        </p:style>
+      </p:cxnSp>
+      <p:cxnSp>
+        <p:nvCxnSpPr>
+          <p:cNvPr id="34" name="Straight Arrow Connector 33"/>
+          <p:cNvCxnSpPr/>
+          <p:nvPr/>
+        </p:nvCxnSpPr>
+        <p:spPr>
+          <a:xfrm>
+            <a:off x="2143495" y="1643171"/>
+            <a:ext cx="704971" cy="0"/>
+          </a:xfrm>
+          <a:prstGeom prst="straightConnector1">
+            <a:avLst/>
+          </a:prstGeom>
+          <a:ln>
+            <a:solidFill>
+              <a:srgbClr val="595959"/>
+            </a:solidFill>
+            <a:tailEnd type="arrow"/>
+          </a:ln>
+          <a:effectLst/>
+        </p:spPr>
+        <p:style>
+          <a:lnRef idx="2">
+            <a:schemeClr val="accent1"/>
+          </a:lnRef>
+          <a:fillRef idx="0">
+            <a:schemeClr val="accent1"/>
+          </a:fillRef>
+          <a:effectRef idx="1">
+            <a:schemeClr val="accent1"/>
+          </a:effectRef>
+          <a:fontRef idx="minor">
+            <a:schemeClr val="tx1"/>
+          </a:fontRef>
+        </p:style>
+      </p:cxnSp>
+      <p:cxnSp>
+        <p:nvCxnSpPr>
+          <p:cNvPr id="35" name="Straight Arrow Connector 34"/>
+          <p:cNvCxnSpPr/>
+          <p:nvPr/>
+        </p:nvCxnSpPr>
+        <p:spPr>
+          <a:xfrm>
+            <a:off x="2143495" y="1849235"/>
+            <a:ext cx="704971" cy="0"/>
+          </a:xfrm>
+          <a:prstGeom prst="straightConnector1">
+            <a:avLst/>
+          </a:prstGeom>
+          <a:ln>
+            <a:solidFill>
+              <a:srgbClr val="595959"/>
+            </a:solidFill>
+            <a:tailEnd type="arrow"/>
+          </a:ln>
+          <a:effectLst/>
+        </p:spPr>
+        <p:style>
+          <a:lnRef idx="2">
+            <a:schemeClr val="accent1"/>
+          </a:lnRef>
+          <a:fillRef idx="0">
+            <a:schemeClr val="accent1"/>
+          </a:fillRef>
+          <a:effectRef idx="1">
+            <a:schemeClr val="accent1"/>
+          </a:effectRef>
+          <a:fontRef idx="minor">
+            <a:schemeClr val="tx1"/>
+          </a:fontRef>
+        </p:style>
+      </p:cxnSp>
+      <p:sp>
+        <p:nvSpPr>
+          <p:cNvPr id="37" name="TextBox 36"/>
+          <p:cNvSpPr txBox="1"/>
+          <p:nvPr/>
+        </p:nvSpPr>
+        <p:spPr>
+          <a:xfrm>
+            <a:off x="6143418" y="2437353"/>
+            <a:ext cx="1827544" cy="461665"/>
+          </a:xfrm>
+          <a:prstGeom prst="rect">
+            <a:avLst/>
+          </a:prstGeom>
+          <a:noFill/>
+        </p:spPr>
+        <p:txBody>
+          <a:bodyPr wrap="none" rtlCol="0">
+            <a:spAutoFit/>
+          </a:bodyPr>
+          <a:lstStyle/>
+          <a:p>
+            <a:r>
+              <a:rPr lang="en-US" sz="2400" cap="small" dirty="0" err="1" smtClean="0">
+                <a:latin typeface="Palatino"/>
+                <a:cs typeface="Palatino"/>
+              </a:rPr>
+              <a:t>QueryXRay</a:t>
+            </a:r>
+            <a:endParaRPr lang="en-US" sz="2400" cap="small" dirty="0" smtClean="0">
+              <a:latin typeface="Palatino"/>
+              <a:cs typeface="Palatino"/>
+            </a:endParaRPr>
+          </a:p>
+        </p:txBody>
+      </p:sp>
+      <p:sp>
+        <p:nvSpPr>
+          <p:cNvPr id="40" name="TextBox 39"/>
+          <p:cNvSpPr txBox="1"/>
+          <p:nvPr/>
+        </p:nvSpPr>
+        <p:spPr>
+          <a:xfrm>
+            <a:off x="3262302" y="4344620"/>
+            <a:ext cx="1960332" cy="830997"/>
+          </a:xfrm>
+          <a:prstGeom prst="rect">
+            <a:avLst/>
+          </a:prstGeom>
+          <a:solidFill>
+            <a:schemeClr val="bg1">
+              <a:lumMod val="95000"/>
+            </a:schemeClr>
+          </a:solidFill>
+          <a:ln>
+            <a:solidFill>
+              <a:srgbClr val="595959"/>
+            </a:solidFill>
+          </a:ln>
+        </p:spPr>
+        <p:txBody>
+          <a:bodyPr wrap="square" rtlCol="0">
+            <a:spAutoFit/>
+          </a:bodyPr>
+          <a:lstStyle/>
+          <a:p>
+            <a:pPr algn="ctr"/>
+            <a:r>
+              <a:rPr lang="en-US" sz="2400" dirty="0" smtClean="0">
+                <a:latin typeface="Palatino"/>
+                <a:cs typeface="Palatino"/>
+              </a:rPr>
+              <a:t>MIP transform</a:t>
+            </a:r>
+          </a:p>
+        </p:txBody>
+      </p:sp>
+      <p:sp>
+        <p:nvSpPr>
+          <p:cNvPr id="41" name="TextBox 40"/>
+          <p:cNvSpPr txBox="1"/>
+          <p:nvPr/>
+        </p:nvSpPr>
+        <p:spPr>
+          <a:xfrm>
+            <a:off x="3262302" y="3111038"/>
+            <a:ext cx="1960332" cy="830997"/>
+          </a:xfrm>
+          <a:prstGeom prst="rect">
+            <a:avLst/>
+          </a:prstGeom>
+          <a:solidFill>
+            <a:schemeClr val="bg1">
+              <a:lumMod val="95000"/>
+            </a:schemeClr>
+          </a:solidFill>
+          <a:ln>
+            <a:solidFill>
+              <a:srgbClr val="595959"/>
+            </a:solidFill>
+          </a:ln>
+        </p:spPr>
+        <p:txBody>
+          <a:bodyPr wrap="square" rtlCol="0">
+            <a:spAutoFit/>
+          </a:bodyPr>
+          <a:lstStyle/>
+          <a:p>
+            <a:pPr algn="ctr"/>
+            <a:r>
+              <a:rPr lang="en-US" sz="2400" dirty="0" smtClean="0">
+                <a:latin typeface="Palatino"/>
+                <a:cs typeface="Palatino"/>
+              </a:rPr>
+              <a:t>density filtering</a:t>
+            </a:r>
+          </a:p>
+        </p:txBody>
+      </p:sp>
+      <p:sp>
+        <p:nvSpPr>
+          <p:cNvPr id="42" name="TextBox 41"/>
+          <p:cNvSpPr txBox="1"/>
+          <p:nvPr/>
+        </p:nvSpPr>
+        <p:spPr>
+          <a:xfrm>
+            <a:off x="5871635" y="3580255"/>
+            <a:ext cx="1960332" cy="830997"/>
+          </a:xfrm>
+          <a:prstGeom prst="rect">
+            <a:avLst/>
+          </a:prstGeom>
+          <a:solidFill>
+            <a:schemeClr val="bg1"/>
+          </a:solidFill>
+          <a:ln>
+            <a:solidFill>
+              <a:srgbClr val="595959"/>
+            </a:solidFill>
+          </a:ln>
+        </p:spPr>
+        <p:txBody>
+          <a:bodyPr wrap="square" rtlCol="0">
+            <a:spAutoFit/>
+          </a:bodyPr>
+          <a:lstStyle/>
+          <a:p>
+            <a:pPr algn="ctr"/>
+            <a:r>
+              <a:rPr lang="en-US" sz="2400" dirty="0" smtClean="0">
+                <a:latin typeface="Palatino"/>
+                <a:cs typeface="Palatino"/>
+              </a:rPr>
+              <a:t>provenance filtering</a:t>
+            </a:r>
+          </a:p>
+        </p:txBody>
+      </p:sp>
+      <p:sp>
+        <p:nvSpPr>
+          <p:cNvPr id="43" name="TextBox 42"/>
+          <p:cNvSpPr txBox="1"/>
+          <p:nvPr/>
+        </p:nvSpPr>
+        <p:spPr>
+          <a:xfrm>
+            <a:off x="5871635" y="4585245"/>
+            <a:ext cx="1960332" cy="830997"/>
+          </a:xfrm>
+          <a:prstGeom prst="rect">
+            <a:avLst/>
+          </a:prstGeom>
+          <a:solidFill>
+            <a:schemeClr val="bg1"/>
+          </a:solidFill>
+          <a:ln>
+            <a:solidFill>
+              <a:srgbClr val="595959"/>
+            </a:solidFill>
+          </a:ln>
+        </p:spPr>
+        <p:txBody>
+          <a:bodyPr wrap="square" rtlCol="0">
+            <a:spAutoFit/>
+          </a:bodyPr>
+          <a:lstStyle/>
+          <a:p>
+            <a:pPr algn="ctr"/>
+            <a:r>
+              <a:rPr lang="en-US" sz="2400" dirty="0" smtClean="0">
+                <a:latin typeface="Palatino"/>
+                <a:cs typeface="Palatino"/>
+              </a:rPr>
+              <a:t>step-by-step rollback</a:t>
+            </a:r>
+          </a:p>
+        </p:txBody>
+      </p:sp>
+      <p:cxnSp>
+        <p:nvCxnSpPr>
+          <p:cNvPr id="45" name="Straight Arrow Connector 44"/>
+          <p:cNvCxnSpPr>
+            <a:stCxn id="41" idx="2"/>
+            <a:endCxn id="40" idx="0"/>
+          </p:cNvCxnSpPr>
+          <p:nvPr/>
+        </p:nvCxnSpPr>
+        <p:spPr>
+          <a:xfrm>
+            <a:off x="4242468" y="3942035"/>
+            <a:ext cx="0" cy="402585"/>
+          </a:xfrm>
+          <a:prstGeom prst="straightConnector1">
+            <a:avLst/>
+          </a:prstGeom>
+          <a:ln>
+            <a:solidFill>
+              <a:schemeClr val="bg1">
+                <a:lumMod val="50000"/>
+              </a:schemeClr>
+            </a:solidFill>
+            <a:tailEnd type="arrow"/>
+          </a:ln>
+          <a:effectLst/>
+        </p:spPr>
+        <p:style>
+          <a:lnRef idx="2">
+            <a:schemeClr val="accent1"/>
+          </a:lnRef>
+          <a:fillRef idx="0">
+            <a:schemeClr val="accent1"/>
+          </a:fillRef>
+          <a:effectRef idx="1">
+            <a:schemeClr val="accent1"/>
+          </a:effectRef>
+          <a:fontRef idx="minor">
+            <a:schemeClr val="tx1"/>
+          </a:fontRef>
+        </p:style>
+      </p:cxnSp>
+      <p:cxnSp>
+        <p:nvCxnSpPr>
+          <p:cNvPr id="49" name="Straight Arrow Connector 48"/>
+          <p:cNvCxnSpPr>
+            <a:stCxn id="40" idx="3"/>
+          </p:cNvCxnSpPr>
+          <p:nvPr/>
+        </p:nvCxnSpPr>
+        <p:spPr>
+          <a:xfrm flipV="1">
+            <a:off x="5222634" y="4758338"/>
+            <a:ext cx="414575" cy="1781"/>
+          </a:xfrm>
+          <a:prstGeom prst="straightConnector1">
+            <a:avLst/>
+          </a:prstGeom>
+          <a:ln>
+            <a:solidFill>
+              <a:schemeClr val="bg1">
+                <a:lumMod val="50000"/>
+              </a:schemeClr>
+            </a:solidFill>
+            <a:tailEnd type="arrow"/>
+          </a:ln>
+          <a:effectLst/>
+        </p:spPr>
+        <p:style>
+          <a:lnRef idx="2">
+            <a:schemeClr val="accent1"/>
+          </a:lnRef>
+          <a:fillRef idx="0">
+            <a:schemeClr val="accent1"/>
+          </a:fillRef>
+          <a:effectRef idx="1">
+            <a:schemeClr val="accent1"/>
+          </a:effectRef>
+          <a:fontRef idx="minor">
+            <a:schemeClr val="tx1"/>
+          </a:fontRef>
+        </p:style>
+      </p:cxnSp>
+      <p:sp>
+        <p:nvSpPr>
+          <p:cNvPr id="53" name="TextBox 52"/>
+          <p:cNvSpPr txBox="1"/>
+          <p:nvPr/>
+        </p:nvSpPr>
+        <p:spPr>
+          <a:xfrm>
+            <a:off x="6031821" y="621583"/>
+            <a:ext cx="2003824" cy="830997"/>
+          </a:xfrm>
+          <a:prstGeom prst="rect">
+            <a:avLst/>
+          </a:prstGeom>
+          <a:noFill/>
+        </p:spPr>
+        <p:txBody>
+          <a:bodyPr wrap="none" rtlCol="0">
+            <a:spAutoFit/>
+          </a:bodyPr>
+          <a:lstStyle/>
+          <a:p>
+            <a:pPr algn="ctr"/>
+            <a:r>
+              <a:rPr lang="en-US" sz="2400" dirty="0" smtClean="0">
+                <a:latin typeface="Palatino"/>
+                <a:cs typeface="Palatino"/>
+              </a:rPr>
+              <a:t>diagnoses</a:t>
+            </a:r>
+          </a:p>
+          <a:p>
+            <a:pPr algn="ctr"/>
+            <a:r>
+              <a:rPr lang="en-US" sz="2400" dirty="0" smtClean="0">
+                <a:latin typeface="Palatino"/>
+                <a:cs typeface="Palatino"/>
+              </a:rPr>
+              <a:t>query repairs</a:t>
+            </a:r>
+          </a:p>
+        </p:txBody>
+      </p:sp>
+      <p:sp>
+        <p:nvSpPr>
+          <p:cNvPr id="47" name="TextBox 46"/>
+          <p:cNvSpPr txBox="1"/>
+          <p:nvPr/>
+        </p:nvSpPr>
+        <p:spPr>
+          <a:xfrm>
+            <a:off x="6554592" y="2976212"/>
+            <a:ext cx="1511802" cy="461665"/>
+          </a:xfrm>
+          <a:prstGeom prst="rect">
+            <a:avLst/>
+          </a:prstGeom>
+          <a:noFill/>
+        </p:spPr>
+        <p:txBody>
+          <a:bodyPr wrap="none" rtlCol="0">
+            <a:spAutoFit/>
+          </a:bodyPr>
+          <a:lstStyle/>
+          <a:p>
+            <a:r>
+              <a:rPr lang="en-US" sz="2400" dirty="0" smtClean="0">
+                <a:solidFill>
+                  <a:srgbClr val="595959"/>
+                </a:solidFill>
+                <a:latin typeface="Palatino"/>
+                <a:cs typeface="Palatino"/>
+              </a:rPr>
+              <a:t>optimizer</a:t>
+            </a:r>
+          </a:p>
+        </p:txBody>
+      </p:sp>
+    </p:spTree>
+    <p:extLst>
+      <p:ext uri="{BB962C8B-B14F-4D97-AF65-F5344CB8AC3E}">
+        <p14:creationId xmlns:p14="http://schemas.microsoft.com/office/powerpoint/2010/main" val="1649287303"/>
       </p:ext>
     </p:extLst>
   </p:cSld>

</xml_diff>

<commit_message>
figure and table update
</commit_message>
<xml_diff>
--- a/docs/vldb15/figures/figs.pptx
+++ b/docs/vldb15/figures/figs.pptx
@@ -7,8 +7,9 @@
   <p:sldIdLst>
     <p:sldId id="256" r:id="rId2"/>
     <p:sldId id="257" r:id="rId3"/>
-    <p:sldId id="258" r:id="rId4"/>
-    <p:sldId id="259" r:id="rId5"/>
+    <p:sldId id="260" r:id="rId4"/>
+    <p:sldId id="258" r:id="rId5"/>
+    <p:sldId id="259" r:id="rId6"/>
   </p:sldIdLst>
   <p:sldSz cx="9144000" cy="6858000" type="screen4x3"/>
   <p:notesSz cx="6858000" cy="9144000"/>
@@ -291,7 +292,7 @@
           <a:p>
             <a:fld id="{E53DFF73-D480-144E-A535-5E58F29F2980}" type="datetimeFigureOut">
               <a:rPr lang="en-US" smtClean="0"/>
-              <a:t>2/25/15</a:t>
+              <a:t>2/27/15</a:t>
             </a:fld>
             <a:endParaRPr lang="en-US"/>
           </a:p>
@@ -461,7 +462,7 @@
           <a:p>
             <a:fld id="{E53DFF73-D480-144E-A535-5E58F29F2980}" type="datetimeFigureOut">
               <a:rPr lang="en-US" smtClean="0"/>
-              <a:t>2/25/15</a:t>
+              <a:t>2/27/15</a:t>
             </a:fld>
             <a:endParaRPr lang="en-US"/>
           </a:p>
@@ -641,7 +642,7 @@
           <a:p>
             <a:fld id="{E53DFF73-D480-144E-A535-5E58F29F2980}" type="datetimeFigureOut">
               <a:rPr lang="en-US" smtClean="0"/>
-              <a:t>2/25/15</a:t>
+              <a:t>2/27/15</a:t>
             </a:fld>
             <a:endParaRPr lang="en-US"/>
           </a:p>
@@ -811,7 +812,7 @@
           <a:p>
             <a:fld id="{E53DFF73-D480-144E-A535-5E58F29F2980}" type="datetimeFigureOut">
               <a:rPr lang="en-US" smtClean="0"/>
-              <a:t>2/25/15</a:t>
+              <a:t>2/27/15</a:t>
             </a:fld>
             <a:endParaRPr lang="en-US"/>
           </a:p>
@@ -1057,7 +1058,7 @@
           <a:p>
             <a:fld id="{E53DFF73-D480-144E-A535-5E58F29F2980}" type="datetimeFigureOut">
               <a:rPr lang="en-US" smtClean="0"/>
-              <a:t>2/25/15</a:t>
+              <a:t>2/27/15</a:t>
             </a:fld>
             <a:endParaRPr lang="en-US"/>
           </a:p>
@@ -1345,7 +1346,7 @@
           <a:p>
             <a:fld id="{E53DFF73-D480-144E-A535-5E58F29F2980}" type="datetimeFigureOut">
               <a:rPr lang="en-US" smtClean="0"/>
-              <a:t>2/25/15</a:t>
+              <a:t>2/27/15</a:t>
             </a:fld>
             <a:endParaRPr lang="en-US"/>
           </a:p>
@@ -1767,7 +1768,7 @@
           <a:p>
             <a:fld id="{E53DFF73-D480-144E-A535-5E58F29F2980}" type="datetimeFigureOut">
               <a:rPr lang="en-US" smtClean="0"/>
-              <a:t>2/25/15</a:t>
+              <a:t>2/27/15</a:t>
             </a:fld>
             <a:endParaRPr lang="en-US"/>
           </a:p>
@@ -1885,7 +1886,7 @@
           <a:p>
             <a:fld id="{E53DFF73-D480-144E-A535-5E58F29F2980}" type="datetimeFigureOut">
               <a:rPr lang="en-US" smtClean="0"/>
-              <a:t>2/25/15</a:t>
+              <a:t>2/27/15</a:t>
             </a:fld>
             <a:endParaRPr lang="en-US"/>
           </a:p>
@@ -1980,7 +1981,7 @@
           <a:p>
             <a:fld id="{E53DFF73-D480-144E-A535-5E58F29F2980}" type="datetimeFigureOut">
               <a:rPr lang="en-US" smtClean="0"/>
-              <a:t>2/25/15</a:t>
+              <a:t>2/27/15</a:t>
             </a:fld>
             <a:endParaRPr lang="en-US"/>
           </a:p>
@@ -2257,7 +2258,7 @@
           <a:p>
             <a:fld id="{E53DFF73-D480-144E-A535-5E58F29F2980}" type="datetimeFigureOut">
               <a:rPr lang="en-US" smtClean="0"/>
-              <a:t>2/25/15</a:t>
+              <a:t>2/27/15</a:t>
             </a:fld>
             <a:endParaRPr lang="en-US"/>
           </a:p>
@@ -2510,7 +2511,7 @@
           <a:p>
             <a:fld id="{E53DFF73-D480-144E-A535-5E58F29F2980}" type="datetimeFigureOut">
               <a:rPr lang="en-US" smtClean="0"/>
-              <a:t>2/25/15</a:t>
+              <a:t>2/27/15</a:t>
             </a:fld>
             <a:endParaRPr lang="en-US"/>
           </a:p>
@@ -2723,7 +2724,7 @@
           <a:p>
             <a:fld id="{E53DFF73-D480-144E-A535-5E58F29F2980}" type="datetimeFigureOut">
               <a:rPr lang="en-US" smtClean="0"/>
-              <a:t>2/25/15</a:t>
+              <a:t>2/27/15</a:t>
             </a:fld>
             <a:endParaRPr lang="en-US"/>
           </a:p>
@@ -4303,6 +4304,568 @@
           <a:chExt cx="0" cy="0"/>
         </a:xfrm>
       </p:grpSpPr>
+      <p:cxnSp>
+        <p:nvCxnSpPr>
+          <p:cNvPr id="13" name="Straight Arrow Connector 12"/>
+          <p:cNvCxnSpPr/>
+          <p:nvPr/>
+        </p:nvCxnSpPr>
+        <p:spPr>
+          <a:xfrm flipV="1">
+            <a:off x="2858486" y="2283486"/>
+            <a:ext cx="1164226" cy="438582"/>
+          </a:xfrm>
+          <a:prstGeom prst="straightConnector1">
+            <a:avLst/>
+          </a:prstGeom>
+          <a:ln>
+            <a:solidFill>
+              <a:schemeClr val="bg1">
+                <a:lumMod val="50000"/>
+              </a:schemeClr>
+            </a:solidFill>
+            <a:tailEnd type="arrow"/>
+          </a:ln>
+          <a:effectLst/>
+        </p:spPr>
+        <p:style>
+          <a:lnRef idx="2">
+            <a:schemeClr val="accent1"/>
+          </a:lnRef>
+          <a:fillRef idx="0">
+            <a:schemeClr val="accent1"/>
+          </a:fillRef>
+          <a:effectRef idx="1">
+            <a:schemeClr val="accent1"/>
+          </a:effectRef>
+          <a:fontRef idx="minor">
+            <a:schemeClr val="tx1"/>
+          </a:fontRef>
+        </p:style>
+      </p:cxnSp>
+      <p:sp>
+        <p:nvSpPr>
+          <p:cNvPr id="29" name="Left Brace 28"/>
+          <p:cNvSpPr/>
+          <p:nvPr/>
+        </p:nvSpPr>
+        <p:spPr>
+          <a:xfrm rot="16200000">
+            <a:off x="4208301" y="945713"/>
+            <a:ext cx="248413" cy="1875550"/>
+          </a:xfrm>
+          <a:prstGeom prst="leftBrace">
+            <a:avLst>
+              <a:gd name="adj1" fmla="val 44354"/>
+              <a:gd name="adj2" fmla="val 50000"/>
+            </a:avLst>
+          </a:prstGeom>
+          <a:ln>
+            <a:solidFill>
+              <a:schemeClr val="bg1">
+                <a:lumMod val="50000"/>
+              </a:schemeClr>
+            </a:solidFill>
+            <a:headEnd type="none"/>
+            <a:tailEnd type="none"/>
+          </a:ln>
+          <a:effectLst/>
+        </p:spPr>
+        <p:style>
+          <a:lnRef idx="2">
+            <a:schemeClr val="accent1"/>
+          </a:lnRef>
+          <a:fillRef idx="0">
+            <a:schemeClr val="accent1"/>
+          </a:fillRef>
+          <a:effectRef idx="1">
+            <a:schemeClr val="accent1"/>
+          </a:effectRef>
+          <a:fontRef idx="minor">
+            <a:schemeClr val="tx1"/>
+          </a:fontRef>
+        </p:style>
+        <p:txBody>
+          <a:bodyPr rtlCol="0" anchor="ctr"/>
+          <a:lstStyle/>
+          <a:p>
+            <a:pPr algn="ctr"/>
+            <a:endParaRPr lang="en-US"/>
+          </a:p>
+        </p:txBody>
+      </p:sp>
+      <p:cxnSp>
+        <p:nvCxnSpPr>
+          <p:cNvPr id="32" name="Straight Arrow Connector 31"/>
+          <p:cNvCxnSpPr/>
+          <p:nvPr/>
+        </p:nvCxnSpPr>
+        <p:spPr>
+          <a:xfrm>
+            <a:off x="4332507" y="2460457"/>
+            <a:ext cx="0" cy="640966"/>
+          </a:xfrm>
+          <a:prstGeom prst="straightConnector1">
+            <a:avLst/>
+          </a:prstGeom>
+          <a:ln>
+            <a:solidFill>
+              <a:schemeClr val="bg1">
+                <a:lumMod val="50000"/>
+              </a:schemeClr>
+            </a:solidFill>
+            <a:tailEnd type="arrow"/>
+          </a:ln>
+          <a:effectLst/>
+        </p:spPr>
+        <p:style>
+          <a:lnRef idx="2">
+            <a:schemeClr val="accent1"/>
+          </a:lnRef>
+          <a:fillRef idx="0">
+            <a:schemeClr val="accent1"/>
+          </a:fillRef>
+          <a:effectRef idx="1">
+            <a:schemeClr val="accent1"/>
+          </a:effectRef>
+          <a:fontRef idx="minor">
+            <a:schemeClr val="tx1"/>
+          </a:fontRef>
+        </p:style>
+      </p:cxnSp>
+      <p:cxnSp>
+        <p:nvCxnSpPr>
+          <p:cNvPr id="36" name="Straight Arrow Connector 35"/>
+          <p:cNvCxnSpPr/>
+          <p:nvPr/>
+        </p:nvCxnSpPr>
+        <p:spPr>
+          <a:xfrm>
+            <a:off x="2858486" y="2722068"/>
+            <a:ext cx="1132141" cy="580274"/>
+          </a:xfrm>
+          <a:prstGeom prst="straightConnector1">
+            <a:avLst/>
+          </a:prstGeom>
+          <a:ln>
+            <a:solidFill>
+              <a:schemeClr val="bg1">
+                <a:lumMod val="50000"/>
+              </a:schemeClr>
+            </a:solidFill>
+            <a:tailEnd type="arrow"/>
+          </a:ln>
+          <a:effectLst/>
+        </p:spPr>
+        <p:style>
+          <a:lnRef idx="2">
+            <a:schemeClr val="accent1"/>
+          </a:lnRef>
+          <a:fillRef idx="0">
+            <a:schemeClr val="accent1"/>
+          </a:fillRef>
+          <a:effectRef idx="1">
+            <a:schemeClr val="accent1"/>
+          </a:effectRef>
+          <a:fontRef idx="minor">
+            <a:schemeClr val="tx1"/>
+          </a:fontRef>
+        </p:style>
+      </p:cxnSp>
+      <p:cxnSp>
+        <p:nvCxnSpPr>
+          <p:cNvPr id="39" name="Straight Arrow Connector 38"/>
+          <p:cNvCxnSpPr/>
+          <p:nvPr/>
+        </p:nvCxnSpPr>
+        <p:spPr>
+          <a:xfrm>
+            <a:off x="4742488" y="3347659"/>
+            <a:ext cx="1419415" cy="0"/>
+          </a:xfrm>
+          <a:prstGeom prst="straightConnector1">
+            <a:avLst/>
+          </a:prstGeom>
+          <a:ln>
+            <a:solidFill>
+              <a:schemeClr val="bg1">
+                <a:lumMod val="50000"/>
+              </a:schemeClr>
+            </a:solidFill>
+            <a:tailEnd type="arrow"/>
+          </a:ln>
+          <a:effectLst/>
+        </p:spPr>
+        <p:style>
+          <a:lnRef idx="2">
+            <a:schemeClr val="accent1"/>
+          </a:lnRef>
+          <a:fillRef idx="0">
+            <a:schemeClr val="accent1"/>
+          </a:fillRef>
+          <a:effectRef idx="1">
+            <a:schemeClr val="accent1"/>
+          </a:effectRef>
+          <a:fontRef idx="minor">
+            <a:schemeClr val="tx1"/>
+          </a:fontRef>
+        </p:style>
+      </p:cxnSp>
+      <p:cxnSp>
+        <p:nvCxnSpPr>
+          <p:cNvPr id="45" name="Straight Arrow Connector 44"/>
+          <p:cNvCxnSpPr/>
+          <p:nvPr/>
+        </p:nvCxnSpPr>
+        <p:spPr>
+          <a:xfrm>
+            <a:off x="4696143" y="2254646"/>
+            <a:ext cx="1510644" cy="0"/>
+          </a:xfrm>
+          <a:prstGeom prst="straightConnector1">
+            <a:avLst/>
+          </a:prstGeom>
+          <a:ln>
+            <a:solidFill>
+              <a:schemeClr val="bg1">
+                <a:lumMod val="50000"/>
+              </a:schemeClr>
+            </a:solidFill>
+            <a:tailEnd type="arrow"/>
+          </a:ln>
+          <a:effectLst/>
+        </p:spPr>
+        <p:style>
+          <a:lnRef idx="2">
+            <a:schemeClr val="accent1"/>
+          </a:lnRef>
+          <a:fillRef idx="0">
+            <a:schemeClr val="accent1"/>
+          </a:fillRef>
+          <a:effectRef idx="1">
+            <a:schemeClr val="accent1"/>
+          </a:effectRef>
+          <a:fontRef idx="minor">
+            <a:schemeClr val="tx1"/>
+          </a:fontRef>
+        </p:style>
+      </p:cxnSp>
+      <p:pic>
+        <p:nvPicPr>
+          <p:cNvPr id="2" name="Picture 1" descr="latex-image-1.pdf"/>
+          <p:cNvPicPr>
+            <a:picLocks noChangeAspect="1"/>
+          </p:cNvPicPr>
+          <p:nvPr/>
+        </p:nvPicPr>
+        <p:blipFill>
+          <a:blip r:embed="rId2">
+            <a:extLst>
+              <a:ext uri="{28A0092B-C50C-407E-A947-70E740481C1C}">
+                <a14:useLocalDpi xmlns:a14="http://schemas.microsoft.com/office/drawing/2010/main" val="0"/>
+              </a:ext>
+            </a:extLst>
+          </a:blip>
+          <a:stretch>
+            <a:fillRect/>
+          </a:stretch>
+        </p:blipFill>
+        <p:spPr>
+          <a:xfrm>
+            <a:off x="2336943" y="2623460"/>
+            <a:ext cx="426720" cy="314960"/>
+          </a:xfrm>
+          <a:prstGeom prst="rect">
+            <a:avLst/>
+          </a:prstGeom>
+        </p:spPr>
+      </p:pic>
+      <p:pic>
+        <p:nvPicPr>
+          <p:cNvPr id="3" name="Picture 2" descr="latex-image-1.pdf"/>
+          <p:cNvPicPr>
+            <a:picLocks noChangeAspect="1"/>
+          </p:cNvPicPr>
+          <p:nvPr/>
+        </p:nvPicPr>
+        <p:blipFill>
+          <a:blip r:embed="rId3">
+            <a:extLst>
+              <a:ext uri="{28A0092B-C50C-407E-A947-70E740481C1C}">
+                <a14:useLocalDpi xmlns:a14="http://schemas.microsoft.com/office/drawing/2010/main" val="0"/>
+              </a:ext>
+            </a:extLst>
+          </a:blip>
+          <a:stretch>
+            <a:fillRect/>
+          </a:stretch>
+        </p:blipFill>
+        <p:spPr>
+          <a:xfrm>
+            <a:off x="6273814" y="2097166"/>
+            <a:ext cx="467360" cy="314960"/>
+          </a:xfrm>
+          <a:prstGeom prst="rect">
+            <a:avLst/>
+          </a:prstGeom>
+        </p:spPr>
+      </p:pic>
+      <p:pic>
+        <p:nvPicPr>
+          <p:cNvPr id="5" name="Picture 4" descr="latex-image-1.pdf"/>
+          <p:cNvPicPr>
+            <a:picLocks noChangeAspect="1"/>
+          </p:cNvPicPr>
+          <p:nvPr/>
+        </p:nvPicPr>
+        <p:blipFill>
+          <a:blip r:embed="rId4">
+            <a:extLst>
+              <a:ext uri="{28A0092B-C50C-407E-A947-70E740481C1C}">
+                <a14:useLocalDpi xmlns:a14="http://schemas.microsoft.com/office/drawing/2010/main" val="0"/>
+              </a:ext>
+            </a:extLst>
+          </a:blip>
+          <a:stretch>
+            <a:fillRect/>
+          </a:stretch>
+        </p:blipFill>
+        <p:spPr>
+          <a:xfrm>
+            <a:off x="6273814" y="3164779"/>
+            <a:ext cx="467360" cy="365760"/>
+          </a:xfrm>
+          <a:prstGeom prst="rect">
+            <a:avLst/>
+          </a:prstGeom>
+        </p:spPr>
+      </p:pic>
+      <p:pic>
+        <p:nvPicPr>
+          <p:cNvPr id="8" name="Picture 7" descr="latex-image-1.pdf"/>
+          <p:cNvPicPr>
+            <a:picLocks noChangeAspect="1"/>
+          </p:cNvPicPr>
+          <p:nvPr/>
+        </p:nvPicPr>
+        <p:blipFill>
+          <a:blip r:embed="rId5">
+            <a:extLst>
+              <a:ext uri="{28A0092B-C50C-407E-A947-70E740481C1C}">
+                <a14:useLocalDpi xmlns:a14="http://schemas.microsoft.com/office/drawing/2010/main" val="0"/>
+              </a:ext>
+            </a:extLst>
+          </a:blip>
+          <a:stretch>
+            <a:fillRect/>
+          </a:stretch>
+        </p:blipFill>
+        <p:spPr>
+          <a:xfrm>
+            <a:off x="6705402" y="2638700"/>
+            <a:ext cx="203200" cy="284480"/>
+          </a:xfrm>
+          <a:prstGeom prst="rect">
+            <a:avLst/>
+          </a:prstGeom>
+        </p:spPr>
+      </p:pic>
+      <p:pic>
+        <p:nvPicPr>
+          <p:cNvPr id="12" name="Picture 11" descr="latex-image-1.pdf"/>
+          <p:cNvPicPr>
+            <a:picLocks noChangeAspect="1"/>
+          </p:cNvPicPr>
+          <p:nvPr/>
+        </p:nvPicPr>
+        <p:blipFill>
+          <a:blip r:embed="rId6">
+            <a:extLst>
+              <a:ext uri="{28A0092B-C50C-407E-A947-70E740481C1C}">
+                <a14:useLocalDpi xmlns:a14="http://schemas.microsoft.com/office/drawing/2010/main" val="0"/>
+              </a:ext>
+            </a:extLst>
+          </a:blip>
+          <a:stretch>
+            <a:fillRect/>
+          </a:stretch>
+        </p:blipFill>
+        <p:spPr>
+          <a:xfrm>
+            <a:off x="4445001" y="2628540"/>
+            <a:ext cx="304800" cy="304800"/>
+          </a:xfrm>
+          <a:prstGeom prst="rect">
+            <a:avLst/>
+          </a:prstGeom>
+        </p:spPr>
+      </p:pic>
+      <p:pic>
+        <p:nvPicPr>
+          <p:cNvPr id="15" name="Picture 14" descr="latex-image-1.pdf"/>
+          <p:cNvPicPr>
+            <a:picLocks noChangeAspect="1"/>
+          </p:cNvPicPr>
+          <p:nvPr/>
+        </p:nvPicPr>
+        <p:blipFill>
+          <a:blip r:embed="rId7">
+            <a:extLst>
+              <a:ext uri="{28A0092B-C50C-407E-A947-70E740481C1C}">
+                <a14:useLocalDpi xmlns:a14="http://schemas.microsoft.com/office/drawing/2010/main" val="0"/>
+              </a:ext>
+            </a:extLst>
+          </a:blip>
+          <a:stretch>
+            <a:fillRect/>
+          </a:stretch>
+        </p:blipFill>
+        <p:spPr>
+          <a:xfrm>
+            <a:off x="4205507" y="2097166"/>
+            <a:ext cx="254000" cy="314960"/>
+          </a:xfrm>
+          <a:prstGeom prst="rect">
+            <a:avLst/>
+          </a:prstGeom>
+        </p:spPr>
+      </p:pic>
+      <p:pic>
+        <p:nvPicPr>
+          <p:cNvPr id="16" name="Picture 15" descr="latex-image-1.pdf"/>
+          <p:cNvPicPr>
+            <a:picLocks noChangeAspect="1"/>
+          </p:cNvPicPr>
+          <p:nvPr/>
+        </p:nvPicPr>
+        <p:blipFill>
+          <a:blip r:embed="rId8">
+            <a:extLst>
+              <a:ext uri="{28A0092B-C50C-407E-A947-70E740481C1C}">
+                <a14:useLocalDpi xmlns:a14="http://schemas.microsoft.com/office/drawing/2010/main" val="0"/>
+              </a:ext>
+            </a:extLst>
+          </a:blip>
+          <a:stretch>
+            <a:fillRect/>
+          </a:stretch>
+        </p:blipFill>
+        <p:spPr>
+          <a:xfrm>
+            <a:off x="4134387" y="3185099"/>
+            <a:ext cx="396240" cy="325120"/>
+          </a:xfrm>
+          <a:prstGeom prst="rect">
+            <a:avLst/>
+          </a:prstGeom>
+        </p:spPr>
+      </p:pic>
+      <p:pic>
+        <p:nvPicPr>
+          <p:cNvPr id="17" name="Picture 16" descr="latex-image-1.pdf"/>
+          <p:cNvPicPr>
+            <a:picLocks noChangeAspect="1"/>
+          </p:cNvPicPr>
+          <p:nvPr/>
+        </p:nvPicPr>
+        <p:blipFill>
+          <a:blip r:embed="rId9">
+            <a:extLst>
+              <a:ext uri="{28A0092B-C50C-407E-A947-70E740481C1C}">
+                <a14:useLocalDpi xmlns:a14="http://schemas.microsoft.com/office/drawing/2010/main" val="0"/>
+              </a:ext>
+            </a:extLst>
+          </a:blip>
+          <a:stretch>
+            <a:fillRect/>
+          </a:stretch>
+        </p:blipFill>
+        <p:spPr>
+          <a:xfrm>
+            <a:off x="3423187" y="1358950"/>
+            <a:ext cx="1818640" cy="375920"/>
+          </a:xfrm>
+          <a:prstGeom prst="rect">
+            <a:avLst/>
+          </a:prstGeom>
+        </p:spPr>
+      </p:pic>
+      <p:cxnSp>
+        <p:nvCxnSpPr>
+          <p:cNvPr id="28" name="Straight Arrow Connector 27"/>
+          <p:cNvCxnSpPr/>
+          <p:nvPr/>
+        </p:nvCxnSpPr>
+        <p:spPr>
+          <a:xfrm>
+            <a:off x="6507494" y="2460457"/>
+            <a:ext cx="0" cy="640966"/>
+          </a:xfrm>
+          <a:prstGeom prst="straightConnector1">
+            <a:avLst/>
+          </a:prstGeom>
+          <a:ln>
+            <a:solidFill>
+              <a:schemeClr val="bg1">
+                <a:lumMod val="50000"/>
+              </a:schemeClr>
+            </a:solidFill>
+            <a:tailEnd type="arrow"/>
+          </a:ln>
+          <a:effectLst/>
+        </p:spPr>
+        <p:style>
+          <a:lnRef idx="2">
+            <a:schemeClr val="accent1"/>
+          </a:lnRef>
+          <a:fillRef idx="0">
+            <a:schemeClr val="accent1"/>
+          </a:fillRef>
+          <a:effectRef idx="1">
+            <a:schemeClr val="accent1"/>
+          </a:effectRef>
+          <a:fontRef idx="minor">
+            <a:schemeClr val="tx1"/>
+          </a:fontRef>
+        </p:style>
+      </p:cxnSp>
+    </p:spTree>
+    <p:extLst>
+      <p:ext uri="{BB962C8B-B14F-4D97-AF65-F5344CB8AC3E}">
+        <p14:creationId xmlns:p14="http://schemas.microsoft.com/office/powerpoint/2010/main" val="621426774"/>
+      </p:ext>
+    </p:extLst>
+  </p:cSld>
+  <p:clrMapOvr>
+    <a:masterClrMapping/>
+  </p:clrMapOvr>
+  <p:timing>
+    <p:tnLst>
+      <p:par>
+        <p:cTn xmlns:p14="http://schemas.microsoft.com/office/powerpoint/2010/main" id="1" dur="indefinite" restart="never" nodeType="tmRoot"/>
+      </p:par>
+    </p:tnLst>
+  </p:timing>
+</p:sld>
+</file>
+
+<file path=ppt/slides/slide4.xml><?xml version="1.0" encoding="utf-8"?>
+<p:sld xmlns:a="http://schemas.openxmlformats.org/drawingml/2006/main" xmlns:r="http://schemas.openxmlformats.org/officeDocument/2006/relationships" xmlns:p="http://schemas.openxmlformats.org/presentationml/2006/main">
+  <p:cSld>
+    <p:spTree>
+      <p:nvGrpSpPr>
+        <p:cNvPr id="1" name=""/>
+        <p:cNvGrpSpPr/>
+        <p:nvPr/>
+      </p:nvGrpSpPr>
+      <p:grpSpPr>
+        <a:xfrm>
+          <a:off x="0" y="0"/>
+          <a:ext cx="0" cy="0"/>
+          <a:chOff x="0" y="0"/>
+          <a:chExt cx="0" cy="0"/>
+        </a:xfrm>
+      </p:grpSpPr>
       <p:sp>
         <p:nvSpPr>
           <p:cNvPr id="52" name="Down Arrow 51"/>
@@ -6669,7 +7232,7 @@
 </p:sld>
 </file>
 
-<file path=ppt/slides/slide4.xml><?xml version="1.0" encoding="utf-8"?>
+<file path=ppt/slides/slide5.xml><?xml version="1.0" encoding="utf-8"?>
 <p:sld xmlns:a="http://schemas.openxmlformats.org/drawingml/2006/main" xmlns:r="http://schemas.openxmlformats.org/officeDocument/2006/relationships" xmlns:p="http://schemas.openxmlformats.org/presentationml/2006/main">
   <p:cSld>
     <p:spTree>

</xml_diff>

<commit_message>
Revised notations and definitions
</commit_message>
<xml_diff>
--- a/docs/vldb15/figures/figs.pptx
+++ b/docs/vldb15/figures/figs.pptx
@@ -4312,7 +4312,7 @@
         </p:nvCxnSpPr>
         <p:spPr>
           <a:xfrm flipV="1">
-            <a:off x="2858486" y="2283486"/>
+            <a:off x="1635180" y="2220130"/>
             <a:ext cx="1164226" cy="438582"/>
           </a:xfrm>
           <a:prstGeom prst="straightConnector1">
@@ -4351,7 +4351,7 @@
         </p:nvSpPr>
         <p:spPr>
           <a:xfrm rot="16200000">
-            <a:off x="4208301" y="945713"/>
+            <a:off x="2984995" y="882357"/>
             <a:ext cx="248413" cy="1875550"/>
           </a:xfrm>
           <a:prstGeom prst="leftBrace">
@@ -4402,7 +4402,7 @@
         </p:nvCxnSpPr>
         <p:spPr>
           <a:xfrm>
-            <a:off x="4332507" y="2460457"/>
+            <a:off x="3109201" y="2397101"/>
             <a:ext cx="0" cy="640966"/>
           </a:xfrm>
           <a:prstGeom prst="straightConnector1">
@@ -4441,7 +4441,7 @@
         </p:nvCxnSpPr>
         <p:spPr>
           <a:xfrm>
-            <a:off x="2858486" y="2722068"/>
+            <a:off x="1635180" y="2658712"/>
             <a:ext cx="1132141" cy="580274"/>
           </a:xfrm>
           <a:prstGeom prst="straightConnector1">
@@ -4480,8 +4480,8 @@
         </p:nvCxnSpPr>
         <p:spPr>
           <a:xfrm>
-            <a:off x="4742488" y="3347659"/>
-            <a:ext cx="1419415" cy="0"/>
+            <a:off x="3519182" y="3270513"/>
+            <a:ext cx="987983" cy="0"/>
           </a:xfrm>
           <a:prstGeom prst="straightConnector1">
             <a:avLst/>
@@ -4519,8 +4519,8 @@
         </p:nvCxnSpPr>
         <p:spPr>
           <a:xfrm>
-            <a:off x="4696143" y="2254646"/>
-            <a:ext cx="1510644" cy="0"/>
+            <a:off x="3472837" y="2191290"/>
+            <a:ext cx="2071691" cy="0"/>
           </a:xfrm>
           <a:prstGeom prst="straightConnector1">
             <a:avLst/>
@@ -4572,7 +4572,7 @@
         </p:blipFill>
         <p:spPr>
           <a:xfrm>
-            <a:off x="2336943" y="2623460"/>
+            <a:off x="1113637" y="2560104"/>
             <a:ext cx="426720" cy="314960"/>
           </a:xfrm>
           <a:prstGeom prst="rect">
@@ -4602,7 +4602,7 @@
         </p:blipFill>
         <p:spPr>
           <a:xfrm>
-            <a:off x="6273814" y="2097166"/>
+            <a:off x="5622860" y="2033810"/>
             <a:ext cx="467360" cy="314960"/>
           </a:xfrm>
           <a:prstGeom prst="rect">
@@ -4632,7 +4632,7 @@
         </p:blipFill>
         <p:spPr>
           <a:xfrm>
-            <a:off x="6273814" y="3164779"/>
+            <a:off x="4587665" y="3087633"/>
             <a:ext cx="467360" cy="365760"/>
           </a:xfrm>
           <a:prstGeom prst="rect">
@@ -4662,7 +4662,7 @@
         </p:blipFill>
         <p:spPr>
           <a:xfrm>
-            <a:off x="6705402" y="2638700"/>
+            <a:off x="6054448" y="2575344"/>
             <a:ext cx="203200" cy="284480"/>
           </a:xfrm>
           <a:prstGeom prst="rect">
@@ -4692,7 +4692,7 @@
         </p:blipFill>
         <p:spPr>
           <a:xfrm>
-            <a:off x="4445001" y="2628540"/>
+            <a:off x="3221695" y="2565184"/>
             <a:ext cx="304800" cy="304800"/>
           </a:xfrm>
           <a:prstGeom prst="rect">
@@ -4722,7 +4722,7 @@
         </p:blipFill>
         <p:spPr>
           <a:xfrm>
-            <a:off x="4205507" y="2097166"/>
+            <a:off x="2982201" y="2033810"/>
             <a:ext cx="254000" cy="314960"/>
           </a:xfrm>
           <a:prstGeom prst="rect">
@@ -4752,7 +4752,7 @@
         </p:blipFill>
         <p:spPr>
           <a:xfrm>
-            <a:off x="4134387" y="3185099"/>
+            <a:off x="2911081" y="3107953"/>
             <a:ext cx="396240" cy="325120"/>
           </a:xfrm>
           <a:prstGeom prst="rect">
@@ -4782,7 +4782,7 @@
         </p:blipFill>
         <p:spPr>
           <a:xfrm>
-            <a:off x="3423187" y="1358950"/>
+            <a:off x="2199881" y="1295594"/>
             <a:ext cx="1818640" cy="375920"/>
           </a:xfrm>
           <a:prstGeom prst="rect">
@@ -4798,7 +4798,7 @@
         </p:nvCxnSpPr>
         <p:spPr>
           <a:xfrm>
-            <a:off x="6507494" y="2460457"/>
+            <a:off x="5856540" y="2397101"/>
             <a:ext cx="0" cy="640966"/>
           </a:xfrm>
           <a:prstGeom prst="straightConnector1">
@@ -4809,6 +4809,185 @@
               <a:schemeClr val="bg1">
                 <a:lumMod val="50000"/>
               </a:schemeClr>
+            </a:solidFill>
+            <a:tailEnd type="arrow"/>
+          </a:ln>
+          <a:effectLst/>
+        </p:spPr>
+        <p:style>
+          <a:lnRef idx="2">
+            <a:schemeClr val="accent1"/>
+          </a:lnRef>
+          <a:fillRef idx="0">
+            <a:schemeClr val="accent1"/>
+          </a:fillRef>
+          <a:effectRef idx="1">
+            <a:schemeClr val="accent1"/>
+          </a:effectRef>
+          <a:fontRef idx="minor">
+            <a:schemeClr val="tx1"/>
+          </a:fontRef>
+        </p:style>
+      </p:cxnSp>
+      <p:sp>
+        <p:nvSpPr>
+          <p:cNvPr id="4" name="TextBox 3"/>
+          <p:cNvSpPr txBox="1"/>
+          <p:nvPr/>
+        </p:nvSpPr>
+        <p:spPr>
+          <a:xfrm>
+            <a:off x="604959" y="6169811"/>
+            <a:ext cx="7934083" cy="461665"/>
+          </a:xfrm>
+          <a:prstGeom prst="rect">
+            <a:avLst/>
+          </a:prstGeom>
+          <a:noFill/>
+        </p:spPr>
+        <p:txBody>
+          <a:bodyPr wrap="none" rtlCol="0">
+            <a:spAutoFit/>
+          </a:bodyPr>
+          <a:lstStyle/>
+          <a:p>
+            <a:r>
+              <a:rPr lang="en-US" sz="2400" dirty="0" smtClean="0">
+                <a:latin typeface="Gill Sans"/>
+                <a:cs typeface="Gill Sans"/>
+              </a:rPr>
+              <a:t>If the complaint set is not complete, it does not give us </a:t>
+            </a:r>
+            <a:r>
+              <a:rPr lang="en-US" sz="2400" dirty="0" err="1" smtClean="0">
+                <a:latin typeface="Gill Sans"/>
+                <a:cs typeface="Gill Sans"/>
+              </a:rPr>
+              <a:t>D_n</a:t>
+            </a:r>
+            <a:r>
+              <a:rPr lang="en-US" sz="2400" dirty="0" smtClean="0">
+                <a:latin typeface="Gill Sans"/>
+                <a:cs typeface="Gill Sans"/>
+              </a:rPr>
+              <a:t>^*</a:t>
+            </a:r>
+            <a:endParaRPr lang="en-US" sz="2400" dirty="0" smtClean="0">
+              <a:latin typeface="Gill Sans"/>
+              <a:cs typeface="Gill Sans"/>
+            </a:endParaRPr>
+          </a:p>
+        </p:txBody>
+      </p:sp>
+      <p:pic>
+        <p:nvPicPr>
+          <p:cNvPr id="9" name="Picture 8" descr="latex-image-1.pdf"/>
+          <p:cNvPicPr>
+            <a:picLocks noChangeAspect="1"/>
+          </p:cNvPicPr>
+          <p:nvPr/>
+        </p:nvPicPr>
+        <p:blipFill>
+          <a:blip r:embed="rId10">
+            <a:extLst>
+              <a:ext uri="{28A0092B-C50C-407E-A947-70E740481C1C}">
+                <a14:useLocalDpi xmlns:a14="http://schemas.microsoft.com/office/drawing/2010/main" val="0"/>
+              </a:ext>
+            </a:extLst>
+          </a:blip>
+          <a:stretch>
+            <a:fillRect/>
+          </a:stretch>
+        </p:blipFill>
+        <p:spPr>
+          <a:xfrm>
+            <a:off x="5622860" y="3072393"/>
+            <a:ext cx="2123440" cy="396240"/>
+          </a:xfrm>
+          <a:prstGeom prst="rect">
+            <a:avLst/>
+          </a:prstGeom>
+        </p:spPr>
+      </p:pic>
+      <p:pic>
+        <p:nvPicPr>
+          <p:cNvPr id="18" name="Picture 17" descr="latex-image-1.pdf"/>
+          <p:cNvPicPr>
+            <a:picLocks noChangeAspect="1"/>
+          </p:cNvPicPr>
+          <p:nvPr/>
+        </p:nvPicPr>
+        <p:blipFill>
+          <a:blip r:embed="rId11">
+            <a:extLst>
+              <a:ext uri="{28A0092B-C50C-407E-A947-70E740481C1C}">
+                <a14:useLocalDpi xmlns:a14="http://schemas.microsoft.com/office/drawing/2010/main" val="0"/>
+              </a:ext>
+            </a:extLst>
+          </a:blip>
+          <a:stretch>
+            <a:fillRect/>
+          </a:stretch>
+        </p:blipFill>
+        <p:spPr>
+          <a:xfrm>
+            <a:off x="5222146" y="3144349"/>
+            <a:ext cx="304800" cy="215900"/>
+          </a:xfrm>
+          <a:prstGeom prst="rect">
+            <a:avLst/>
+          </a:prstGeom>
+        </p:spPr>
+      </p:pic>
+      <p:pic>
+        <p:nvPicPr>
+          <p:cNvPr id="19" name="Picture 18" descr="latex-image-1.pdf"/>
+          <p:cNvPicPr>
+            <a:picLocks noChangeAspect="1"/>
+          </p:cNvPicPr>
+          <p:nvPr/>
+        </p:nvPicPr>
+        <p:blipFill>
+          <a:blip r:embed="rId12">
+            <a:extLst>
+              <a:ext uri="{28A0092B-C50C-407E-A947-70E740481C1C}">
+                <a14:useLocalDpi xmlns:a14="http://schemas.microsoft.com/office/drawing/2010/main" val="0"/>
+              </a:ext>
+            </a:extLst>
+          </a:blip>
+          <a:stretch>
+            <a:fillRect/>
+          </a:stretch>
+        </p:blipFill>
+        <p:spPr>
+          <a:xfrm>
+            <a:off x="4379661" y="3728315"/>
+            <a:ext cx="1989771" cy="273594"/>
+          </a:xfrm>
+          <a:prstGeom prst="rect">
+            <a:avLst/>
+          </a:prstGeom>
+        </p:spPr>
+      </p:pic>
+      <p:cxnSp>
+        <p:nvCxnSpPr>
+          <p:cNvPr id="21" name="Straight Arrow Connector 20"/>
+          <p:cNvCxnSpPr>
+            <a:stCxn id="19" idx="0"/>
+          </p:cNvCxnSpPr>
+          <p:nvPr/>
+        </p:nvCxnSpPr>
+        <p:spPr>
+          <a:xfrm flipH="1" flipV="1">
+            <a:off x="5374546" y="3453393"/>
+            <a:ext cx="1" cy="274922"/>
+          </a:xfrm>
+          <a:prstGeom prst="straightConnector1">
+            <a:avLst/>
+          </a:prstGeom>
+          <a:ln>
+            <a:solidFill>
+              <a:srgbClr val="C60000"/>
             </a:solidFill>
             <a:tailEnd type="arrow"/>
           </a:ln>

</xml_diff>